<commit_message>
update powerpoint based on feedback
</commit_message>
<xml_diff>
--- a/Project (1).pptx
+++ b/Project (1).pptx
@@ -20,10 +20,11 @@
     <p:sldId id="274" r:id="rId14"/>
     <p:sldId id="277" r:id="rId15"/>
     <p:sldId id="279" r:id="rId16"/>
-    <p:sldId id="280" r:id="rId17"/>
-    <p:sldId id="275" r:id="rId18"/>
-    <p:sldId id="276" r:id="rId19"/>
-    <p:sldId id="281" r:id="rId20"/>
+    <p:sldId id="282" r:id="rId17"/>
+    <p:sldId id="280" r:id="rId18"/>
+    <p:sldId id="275" r:id="rId19"/>
+    <p:sldId id="276" r:id="rId20"/>
+    <p:sldId id="281" r:id="rId21"/>
   </p:sldIdLst>
   <p:sldSz cx="12192000" cy="6858000"/>
   <p:notesSz cx="6858000" cy="9144000"/>
@@ -259,7 +260,7 @@
           <a:p>
             <a:fld id="{0EF72338-4246-47CB-95B5-D03CAD77A9D7}" type="datetimeFigureOut">
               <a:rPr lang="en-US" smtClean="0"/>
-              <a:t>5/2/2022</a:t>
+              <a:t>5/4/2022</a:t>
             </a:fld>
             <a:endParaRPr lang="en-US"/>
           </a:p>
@@ -427,7 +428,7 @@
           <a:p>
             <a:fld id="{0EF72338-4246-47CB-95B5-D03CAD77A9D7}" type="datetimeFigureOut">
               <a:rPr lang="en-US" smtClean="0"/>
-              <a:t>5/2/2022</a:t>
+              <a:t>5/4/2022</a:t>
             </a:fld>
             <a:endParaRPr lang="en-US"/>
           </a:p>
@@ -605,7 +606,7 @@
           <a:p>
             <a:fld id="{0EF72338-4246-47CB-95B5-D03CAD77A9D7}" type="datetimeFigureOut">
               <a:rPr lang="en-US" smtClean="0"/>
-              <a:t>5/2/2022</a:t>
+              <a:t>5/4/2022</a:t>
             </a:fld>
             <a:endParaRPr lang="en-US"/>
           </a:p>
@@ -773,7 +774,7 @@
           <a:p>
             <a:fld id="{0EF72338-4246-47CB-95B5-D03CAD77A9D7}" type="datetimeFigureOut">
               <a:rPr lang="en-US" smtClean="0"/>
-              <a:t>5/2/2022</a:t>
+              <a:t>5/4/2022</a:t>
             </a:fld>
             <a:endParaRPr lang="en-US"/>
           </a:p>
@@ -1018,7 +1019,7 @@
           <a:p>
             <a:fld id="{0EF72338-4246-47CB-95B5-D03CAD77A9D7}" type="datetimeFigureOut">
               <a:rPr lang="en-US" smtClean="0"/>
-              <a:t>5/2/2022</a:t>
+              <a:t>5/4/2022</a:t>
             </a:fld>
             <a:endParaRPr lang="en-US"/>
           </a:p>
@@ -1247,7 +1248,7 @@
           <a:p>
             <a:fld id="{0EF72338-4246-47CB-95B5-D03CAD77A9D7}" type="datetimeFigureOut">
               <a:rPr lang="en-US" smtClean="0"/>
-              <a:t>5/2/2022</a:t>
+              <a:t>5/4/2022</a:t>
             </a:fld>
             <a:endParaRPr lang="en-US"/>
           </a:p>
@@ -1611,7 +1612,7 @@
           <a:p>
             <a:fld id="{0EF72338-4246-47CB-95B5-D03CAD77A9D7}" type="datetimeFigureOut">
               <a:rPr lang="en-US" smtClean="0"/>
-              <a:t>5/2/2022</a:t>
+              <a:t>5/4/2022</a:t>
             </a:fld>
             <a:endParaRPr lang="en-US"/>
           </a:p>
@@ -1728,7 +1729,7 @@
           <a:p>
             <a:fld id="{0EF72338-4246-47CB-95B5-D03CAD77A9D7}" type="datetimeFigureOut">
               <a:rPr lang="en-US" smtClean="0"/>
-              <a:t>5/2/2022</a:t>
+              <a:t>5/4/2022</a:t>
             </a:fld>
             <a:endParaRPr lang="en-US"/>
           </a:p>
@@ -1823,7 +1824,7 @@
           <a:p>
             <a:fld id="{0EF72338-4246-47CB-95B5-D03CAD77A9D7}" type="datetimeFigureOut">
               <a:rPr lang="en-US" smtClean="0"/>
-              <a:t>5/2/2022</a:t>
+              <a:t>5/4/2022</a:t>
             </a:fld>
             <a:endParaRPr lang="en-US"/>
           </a:p>
@@ -2098,7 +2099,7 @@
           <a:p>
             <a:fld id="{0EF72338-4246-47CB-95B5-D03CAD77A9D7}" type="datetimeFigureOut">
               <a:rPr lang="en-US" smtClean="0"/>
-              <a:t>5/2/2022</a:t>
+              <a:t>5/4/2022</a:t>
             </a:fld>
             <a:endParaRPr lang="en-US"/>
           </a:p>
@@ -2350,7 +2351,7 @@
           <a:p>
             <a:fld id="{0EF72338-4246-47CB-95B5-D03CAD77A9D7}" type="datetimeFigureOut">
               <a:rPr lang="en-US" smtClean="0"/>
-              <a:t>5/2/2022</a:t>
+              <a:t>5/4/2022</a:t>
             </a:fld>
             <a:endParaRPr lang="en-US"/>
           </a:p>
@@ -2561,7 +2562,7 @@
           <a:p>
             <a:fld id="{0EF72338-4246-47CB-95B5-D03CAD77A9D7}" type="datetimeFigureOut">
               <a:rPr lang="en-US" smtClean="0"/>
-              <a:t>5/2/2022</a:t>
+              <a:t>5/4/2022</a:t>
             </a:fld>
             <a:endParaRPr lang="en-US"/>
           </a:p>
@@ -3104,13 +3105,22 @@
           <a:p>
             <a:r>
               <a:rPr lang="en-US" dirty="0" smtClean="0"/>
-              <a:t>Two Decision Tree classifiers were run – 1 with Gini criterion, 1 with Entropy criterion </a:t>
-            </a:r>
+              <a:t>Run with entropy measure</a:t>
+            </a:r>
+            <a:endParaRPr lang="en-US" dirty="0" smtClean="0"/>
           </a:p>
           <a:p>
             <a:r>
               <a:rPr lang="en-US" dirty="0" smtClean="0"/>
-              <a:t>Cutoff was 8 levels</a:t>
+              <a:t>Cutoff was </a:t>
+            </a:r>
+            <a:r>
+              <a:rPr lang="en-US" dirty="0" smtClean="0"/>
+              <a:t>5 </a:t>
+            </a:r>
+            <a:r>
+              <a:rPr lang="en-US" dirty="0" smtClean="0"/>
+              <a:t>levels</a:t>
             </a:r>
           </a:p>
           <a:p>
@@ -3124,22 +3134,28 @@
       </p:sp>
       <p:pic>
         <p:nvPicPr>
-          <p:cNvPr id="5" name="Picture 4"/>
+          <p:cNvPr id="4" name="Picture 3"/>
           <p:cNvPicPr>
             <a:picLocks noChangeAspect="1"/>
           </p:cNvPicPr>
           <p:nvPr/>
         </p:nvPicPr>
         <p:blipFill>
-          <a:blip r:embed="rId2"/>
+          <a:blip r:embed="rId2">
+            <a:extLst>
+              <a:ext uri="{28A0092B-C50C-407E-A947-70E740481C1C}">
+                <a14:useLocalDpi xmlns:a14="http://schemas.microsoft.com/office/drawing/2010/main" val="0"/>
+              </a:ext>
+            </a:extLst>
+          </a:blip>
           <a:stretch>
             <a:fillRect/>
           </a:stretch>
         </p:blipFill>
         <p:spPr>
           <a:xfrm>
-            <a:off x="4657725" y="0"/>
-            <a:ext cx="8234362" cy="6434374"/>
+            <a:off x="5527672" y="1282573"/>
+            <a:ext cx="6460300" cy="4276016"/>
           </a:xfrm>
           <a:prstGeom prst="rect">
             <a:avLst/>
@@ -4948,14 +4964,23 @@
             <p:ph type="title"/>
           </p:nvPr>
         </p:nvSpPr>
-        <p:spPr/>
+        <p:spPr>
+          <a:xfrm>
+            <a:off x="305937" y="353822"/>
+            <a:ext cx="10515600" cy="1325563"/>
+          </a:xfrm>
+        </p:spPr>
         <p:txBody>
           <a:bodyPr/>
           <a:lstStyle/>
           <a:p>
             <a:r>
               <a:rPr lang="en-US" dirty="0" smtClean="0"/>
-              <a:t>ANN Performance</a:t>
+              <a:t>ANN </a:t>
+            </a:r>
+            <a:r>
+              <a:rPr lang="en-US" dirty="0" smtClean="0"/>
+              <a:t>Training Curves</a:t>
             </a:r>
             <a:endParaRPr lang="en-US" dirty="0"/>
           </a:p>
@@ -4973,26 +4998,27 @@
         </p:nvSpPr>
         <p:spPr>
           <a:xfrm>
-            <a:off x="305937" y="1639094"/>
-            <a:ext cx="7825914" cy="4351338"/>
+            <a:off x="305937" y="1386431"/>
+            <a:ext cx="11277807" cy="4351338"/>
           </a:xfrm>
         </p:spPr>
         <p:txBody>
           <a:bodyPr/>
           <a:lstStyle/>
           <a:p>
-            <a:r>
-              <a:rPr lang="en-US" i="1" dirty="0" smtClean="0"/>
-              <a:t>This model was assessed using the F1-score, Sensitivity, Specificity, Accuracy, and the ROC</a:t>
-            </a:r>
-            <a:endParaRPr lang="en-US" i="1" dirty="0"/>
-          </a:p>
-          <a:p>
-            <a:r>
-              <a:rPr lang="en-US" i="1" dirty="0" smtClean="0"/>
-              <a:t>Training data was 70% and Validation data was 30%</a:t>
-            </a:r>
-            <a:endParaRPr lang="en-US" dirty="0"/>
+            <a:pPr lvl="1"/>
+            <a:r>
+              <a:rPr lang="en-US" sz="2800" i="1" dirty="0" smtClean="0"/>
+              <a:t>No evidence of overfitting as validation and training data experience similar trends</a:t>
+            </a:r>
+          </a:p>
+          <a:p>
+            <a:pPr lvl="1"/>
+            <a:r>
+              <a:rPr lang="en-US" sz="2800" i="1" dirty="0" smtClean="0"/>
+              <a:t>Model approaches a loss of 0.1 and accuracy approaches 97% toward epoch 100</a:t>
+            </a:r>
+            <a:endParaRPr lang="en-US" sz="2800" dirty="0"/>
           </a:p>
           <a:p>
             <a:pPr lvl="1"/>
@@ -5002,7 +5028,7 @@
       </p:sp>
       <p:pic>
         <p:nvPicPr>
-          <p:cNvPr id="8" name="Picture 7"/>
+          <p:cNvPr id="6" name="Picture 5"/>
           <p:cNvPicPr>
             <a:picLocks noChangeAspect="1"/>
           </p:cNvPicPr>
@@ -5016,8 +5042,8 @@
         </p:blipFill>
         <p:spPr>
           <a:xfrm>
-            <a:off x="8436105" y="172570"/>
-            <a:ext cx="3239046" cy="2298678"/>
+            <a:off x="120316" y="3090110"/>
+            <a:ext cx="5606716" cy="3778439"/>
           </a:xfrm>
           <a:prstGeom prst="rect">
             <a:avLst/>
@@ -5026,7 +5052,7 @@
       </p:pic>
       <p:pic>
         <p:nvPicPr>
-          <p:cNvPr id="9" name="Picture 8"/>
+          <p:cNvPr id="7" name="Picture 6"/>
           <p:cNvPicPr>
             <a:picLocks noChangeAspect="1"/>
           </p:cNvPicPr>
@@ -5040,936 +5066,18 @@
         </p:blipFill>
         <p:spPr>
           <a:xfrm>
-            <a:off x="8436105" y="4704593"/>
-            <a:ext cx="3215176" cy="2143451"/>
+            <a:off x="5919593" y="3039492"/>
+            <a:ext cx="5664151" cy="3776101"/>
           </a:xfrm>
           <a:prstGeom prst="rect">
             <a:avLst/>
           </a:prstGeom>
         </p:spPr>
       </p:pic>
-      <p:pic>
-        <p:nvPicPr>
-          <p:cNvPr id="10" name="Picture 9"/>
-          <p:cNvPicPr>
-            <a:picLocks noChangeAspect="1"/>
-          </p:cNvPicPr>
-          <p:nvPr/>
-        </p:nvPicPr>
-        <p:blipFill>
-          <a:blip r:embed="rId4"/>
-          <a:stretch>
-            <a:fillRect/>
-          </a:stretch>
-        </p:blipFill>
-        <p:spPr>
-          <a:xfrm>
-            <a:off x="8325134" y="2471248"/>
-            <a:ext cx="3350017" cy="2233345"/>
-          </a:xfrm>
-          <a:prstGeom prst="rect">
-            <a:avLst/>
-          </a:prstGeom>
-        </p:spPr>
-      </p:pic>
-      <mc:AlternateContent xmlns:mc="http://schemas.openxmlformats.org/markup-compatibility/2006" xmlns:a14="http://schemas.microsoft.com/office/drawing/2010/main">
-        <mc:Choice Requires="a14">
-          <p:sp>
-            <p:nvSpPr>
-              <p:cNvPr id="11" name="Rectangle 10"/>
-              <p:cNvSpPr/>
-              <p:nvPr/>
-            </p:nvSpPr>
-            <p:spPr>
-              <a:xfrm>
-                <a:off x="305937" y="3222820"/>
-                <a:ext cx="8130168" cy="3787191"/>
-              </a:xfrm>
-              <a:prstGeom prst="rect">
-                <a:avLst/>
-              </a:prstGeom>
-            </p:spPr>
-            <p:txBody>
-              <a:bodyPr wrap="square">
-                <a:spAutoFit/>
-              </a:bodyPr>
-              <a:lstStyle/>
-              <a:p>
-                <a:pPr>
-                  <a:lnSpc>
-                    <a:spcPct val="107000"/>
-                  </a:lnSpc>
-                  <a:spcAft>
-                    <a:spcPts val="800"/>
-                  </a:spcAft>
-                </a:pPr>
-                <a14:m>
-                  <m:oMathPara xmlns:m="http://schemas.openxmlformats.org/officeDocument/2006/math">
-                    <m:oMathParaPr>
-                      <m:jc m:val="left"/>
-                    </m:oMathParaPr>
-                    <m:oMath xmlns:m="http://schemas.openxmlformats.org/officeDocument/2006/math">
-                      <m:r>
-                        <a:rPr lang="en-US" sz="1600" b="1" i="1" smtClean="0">
-                          <a:latin typeface="Cambria Math" panose="02040503050406030204" pitchFamily="18" charset="0"/>
-                          <a:ea typeface="Calibri" panose="020F0502020204030204" pitchFamily="34" charset="0"/>
-                          <a:cs typeface="Calibri" panose="020F0502020204030204" pitchFamily="34" charset="0"/>
-                        </a:rPr>
-                        <m:t>𝑺𝒆𝒏𝒔𝒊𝒕𝒊𝒗𝒊𝒕𝒚</m:t>
-                      </m:r>
-                      <m:r>
-                        <a:rPr lang="en-US" sz="1600" b="1" i="1" smtClean="0">
-                          <a:latin typeface="Cambria Math" panose="02040503050406030204" pitchFamily="18" charset="0"/>
-                          <a:ea typeface="Calibri" panose="020F0502020204030204" pitchFamily="34" charset="0"/>
-                          <a:cs typeface="Calibri" panose="020F0502020204030204" pitchFamily="34" charset="0"/>
-                        </a:rPr>
-                        <m:t>=</m:t>
-                      </m:r>
-                      <m:f>
-                        <m:fPr>
-                          <m:ctrlPr>
-                            <a:rPr lang="en-US" sz="1600" b="1" i="1">
-                              <a:latin typeface="Cambria Math" panose="02040503050406030204" pitchFamily="18" charset="0"/>
-                              <a:ea typeface="Calibri" panose="020F0502020204030204" pitchFamily="34" charset="0"/>
-                              <a:cs typeface="Calibri" panose="020F0502020204030204" pitchFamily="34" charset="0"/>
-                            </a:rPr>
-                          </m:ctrlPr>
-                        </m:fPr>
-                        <m:num>
-                          <m:r>
-                            <a:rPr lang="en-US" sz="1600" b="1" i="1">
-                              <a:latin typeface="Cambria Math" panose="02040503050406030204" pitchFamily="18" charset="0"/>
-                              <a:ea typeface="Calibri" panose="020F0502020204030204" pitchFamily="34" charset="0"/>
-                              <a:cs typeface="Calibri" panose="020F0502020204030204" pitchFamily="34" charset="0"/>
-                            </a:rPr>
-                            <m:t>𝑇𝑃</m:t>
-                          </m:r>
-                        </m:num>
-                        <m:den>
-                          <m:r>
-                            <a:rPr lang="en-US" sz="1600" b="1" i="1">
-                              <a:latin typeface="Cambria Math" panose="02040503050406030204" pitchFamily="18" charset="0"/>
-                              <a:ea typeface="Calibri" panose="020F0502020204030204" pitchFamily="34" charset="0"/>
-                              <a:cs typeface="Calibri" panose="020F0502020204030204" pitchFamily="34" charset="0"/>
-                            </a:rPr>
-                            <m:t>𝑇𝑃</m:t>
-                          </m:r>
-                          <m:r>
-                            <a:rPr lang="en-US" sz="1600" b="1" i="1">
-                              <a:latin typeface="Cambria Math" panose="02040503050406030204" pitchFamily="18" charset="0"/>
-                              <a:ea typeface="Calibri" panose="020F0502020204030204" pitchFamily="34" charset="0"/>
-                              <a:cs typeface="Calibri" panose="020F0502020204030204" pitchFamily="34" charset="0"/>
-                            </a:rPr>
-                            <m:t>+</m:t>
-                          </m:r>
-                          <m:r>
-                            <a:rPr lang="en-US" sz="1600" b="1" i="1">
-                              <a:latin typeface="Cambria Math" panose="02040503050406030204" pitchFamily="18" charset="0"/>
-                              <a:ea typeface="Calibri" panose="020F0502020204030204" pitchFamily="34" charset="0"/>
-                              <a:cs typeface="Calibri" panose="020F0502020204030204" pitchFamily="34" charset="0"/>
-                            </a:rPr>
-                            <m:t>𝐹𝑁</m:t>
-                          </m:r>
-                        </m:den>
-                      </m:f>
-                      <m:r>
-                        <a:rPr lang="en-US" sz="1600" b="1" i="1" smtClean="0">
-                          <a:latin typeface="Cambria Math" panose="02040503050406030204" pitchFamily="18" charset="0"/>
-                          <a:ea typeface="Calibri" panose="020F0502020204030204" pitchFamily="34" charset="0"/>
-                          <a:cs typeface="Calibri" panose="020F0502020204030204" pitchFamily="34" charset="0"/>
-                        </a:rPr>
-                        <m:t>=</m:t>
-                      </m:r>
-                      <m:r>
-                        <a:rPr lang="en-US" sz="1600" b="1" i="1" smtClean="0">
-                          <a:latin typeface="Cambria Math" panose="02040503050406030204" pitchFamily="18" charset="0"/>
-                          <a:ea typeface="Calibri" panose="020F0502020204030204" pitchFamily="34" charset="0"/>
-                          <a:cs typeface="Calibri" panose="020F0502020204030204" pitchFamily="34" charset="0"/>
-                        </a:rPr>
-                        <m:t>𝟏</m:t>
-                      </m:r>
-                      <m:r>
-                        <a:rPr lang="en-US" sz="1600" b="1" i="1" smtClean="0">
-                          <a:latin typeface="Cambria Math" panose="02040503050406030204" pitchFamily="18" charset="0"/>
-                          <a:ea typeface="Calibri" panose="020F0502020204030204" pitchFamily="34" charset="0"/>
-                          <a:cs typeface="Calibri" panose="020F0502020204030204" pitchFamily="34" charset="0"/>
-                        </a:rPr>
-                        <m:t> →</m:t>
-                      </m:r>
-                      <m:r>
-                        <a:rPr lang="en-US" sz="1600" b="1" i="1">
-                          <a:latin typeface="Cambria Math" panose="02040503050406030204" pitchFamily="18" charset="0"/>
-                          <a:ea typeface="Calibri" panose="020F0502020204030204" pitchFamily="34" charset="0"/>
-                          <a:cs typeface="Calibri" panose="020F0502020204030204" pitchFamily="34" charset="0"/>
-                        </a:rPr>
-                        <m:t>𝑨𝒍𝒍</m:t>
-                      </m:r>
-                      <m:r>
-                        <a:rPr lang="en-US" sz="1600" b="1" i="1">
-                          <a:latin typeface="Cambria Math" panose="02040503050406030204" pitchFamily="18" charset="0"/>
-                          <a:ea typeface="Calibri" panose="020F0502020204030204" pitchFamily="34" charset="0"/>
-                          <a:cs typeface="Calibri" panose="020F0502020204030204" pitchFamily="34" charset="0"/>
-                        </a:rPr>
-                        <m:t> </m:t>
-                      </m:r>
-                      <m:r>
-                        <a:rPr lang="en-US" sz="1600" b="1" i="1">
-                          <a:latin typeface="Cambria Math" panose="02040503050406030204" pitchFamily="18" charset="0"/>
-                          <a:ea typeface="Calibri" panose="020F0502020204030204" pitchFamily="34" charset="0"/>
-                          <a:cs typeface="Calibri" panose="020F0502020204030204" pitchFamily="34" charset="0"/>
-                        </a:rPr>
-                        <m:t>𝒑𝒓𝒆𝒅𝒊𝒄𝒕𝒆𝒅</m:t>
-                      </m:r>
-                      <m:r>
-                        <a:rPr lang="en-US" sz="1600" b="1" i="1">
-                          <a:latin typeface="Cambria Math" panose="02040503050406030204" pitchFamily="18" charset="0"/>
-                          <a:ea typeface="Calibri" panose="020F0502020204030204" pitchFamily="34" charset="0"/>
-                          <a:cs typeface="Calibri" panose="020F0502020204030204" pitchFamily="34" charset="0"/>
-                        </a:rPr>
-                        <m:t> </m:t>
-                      </m:r>
-                      <m:r>
-                        <a:rPr lang="en-US" sz="1600" b="1" i="1">
-                          <a:latin typeface="Cambria Math" panose="02040503050406030204" pitchFamily="18" charset="0"/>
-                          <a:ea typeface="Calibri" panose="020F0502020204030204" pitchFamily="34" charset="0"/>
-                          <a:cs typeface="Calibri" panose="020F0502020204030204" pitchFamily="34" charset="0"/>
-                        </a:rPr>
-                        <m:t>𝒑𝒐𝒔𝒊𝒕𝒊𝒗𝒆</m:t>
-                      </m:r>
-                      <m:r>
-                        <a:rPr lang="en-US" sz="1600" b="1" i="1">
-                          <a:latin typeface="Cambria Math" panose="02040503050406030204" pitchFamily="18" charset="0"/>
-                          <a:ea typeface="Calibri" panose="020F0502020204030204" pitchFamily="34" charset="0"/>
-                          <a:cs typeface="Calibri" panose="020F0502020204030204" pitchFamily="34" charset="0"/>
-                        </a:rPr>
-                        <m:t> </m:t>
-                      </m:r>
-                      <m:r>
-                        <a:rPr lang="en-US" sz="1600" b="1" i="1">
-                          <a:latin typeface="Cambria Math" panose="02040503050406030204" pitchFamily="18" charset="0"/>
-                          <a:ea typeface="Calibri" panose="020F0502020204030204" pitchFamily="34" charset="0"/>
-                          <a:cs typeface="Calibri" panose="020F0502020204030204" pitchFamily="34" charset="0"/>
-                        </a:rPr>
-                        <m:t>𝒂𝒓𝒆</m:t>
-                      </m:r>
-                      <m:r>
-                        <a:rPr lang="en-US" sz="1600" b="1" i="1">
-                          <a:latin typeface="Cambria Math" panose="02040503050406030204" pitchFamily="18" charset="0"/>
-                          <a:ea typeface="Calibri" panose="020F0502020204030204" pitchFamily="34" charset="0"/>
-                          <a:cs typeface="Calibri" panose="020F0502020204030204" pitchFamily="34" charset="0"/>
-                        </a:rPr>
-                        <m:t> </m:t>
-                      </m:r>
-                      <m:r>
-                        <a:rPr lang="en-US" sz="1600" b="1" i="1">
-                          <a:latin typeface="Cambria Math" panose="02040503050406030204" pitchFamily="18" charset="0"/>
-                          <a:ea typeface="Calibri" panose="020F0502020204030204" pitchFamily="34" charset="0"/>
-                          <a:cs typeface="Calibri" panose="020F0502020204030204" pitchFamily="34" charset="0"/>
-                        </a:rPr>
-                        <m:t>𝒕𝒓𝒖𝒍𝒚</m:t>
-                      </m:r>
-                      <m:r>
-                        <a:rPr lang="en-US" sz="1600" b="1" i="1">
-                          <a:latin typeface="Cambria Math" panose="02040503050406030204" pitchFamily="18" charset="0"/>
-                          <a:ea typeface="Calibri" panose="020F0502020204030204" pitchFamily="34" charset="0"/>
-                          <a:cs typeface="Calibri" panose="020F0502020204030204" pitchFamily="34" charset="0"/>
-                        </a:rPr>
-                        <m:t> </m:t>
-                      </m:r>
-                      <m:r>
-                        <a:rPr lang="en-US" sz="1600" b="1" i="1">
-                          <a:latin typeface="Cambria Math" panose="02040503050406030204" pitchFamily="18" charset="0"/>
-                          <a:ea typeface="Calibri" panose="020F0502020204030204" pitchFamily="34" charset="0"/>
-                          <a:cs typeface="Calibri" panose="020F0502020204030204" pitchFamily="34" charset="0"/>
-                        </a:rPr>
-                        <m:t>𝒑𝒐𝒔𝒊𝒕𝒊𝒗𝒆</m:t>
-                      </m:r>
-                    </m:oMath>
-                  </m:oMathPara>
-                </a14:m>
-                <a:endParaRPr lang="en-US" b="1" i="1" dirty="0">
-                  <a:latin typeface="Cambria Math" panose="02040503050406030204" pitchFamily="18" charset="0"/>
-                  <a:ea typeface="Calibri" panose="020F0502020204030204" pitchFamily="34" charset="0"/>
-                  <a:cs typeface="Calibri" panose="020F0502020204030204" pitchFamily="34" charset="0"/>
-                </a:endParaRPr>
-              </a:p>
-              <a:p>
-                <a:pPr>
-                  <a:lnSpc>
-                    <a:spcPct val="107000"/>
-                  </a:lnSpc>
-                  <a:spcAft>
-                    <a:spcPts val="800"/>
-                  </a:spcAft>
-                </a:pPr>
-                <a14:m>
-                  <m:oMath xmlns:m="http://schemas.openxmlformats.org/officeDocument/2006/math">
-                    <m:r>
-                      <a:rPr lang="en-US" sz="1600" b="1" i="1">
-                        <a:latin typeface="Cambria Math" panose="02040503050406030204" pitchFamily="18" charset="0"/>
-                        <a:ea typeface="Calibri" panose="020F0502020204030204" pitchFamily="34" charset="0"/>
-                        <a:cs typeface="Calibri" panose="020F0502020204030204" pitchFamily="34" charset="0"/>
-                      </a:rPr>
-                      <m:t>𝑺𝒑𝒆𝒄𝒊𝒇𝒊𝒄𝒊𝒕𝒚</m:t>
-                    </m:r>
-                    <m:r>
-                      <a:rPr lang="en-US" sz="1600" i="1">
-                        <a:latin typeface="Cambria Math" panose="02040503050406030204" pitchFamily="18" charset="0"/>
-                        <a:ea typeface="Calibri" panose="020F0502020204030204" pitchFamily="34" charset="0"/>
-                        <a:cs typeface="Calibri" panose="020F0502020204030204" pitchFamily="34" charset="0"/>
-                      </a:rPr>
-                      <m:t>=</m:t>
-                    </m:r>
-                    <m:f>
-                      <m:fPr>
-                        <m:ctrlPr>
-                          <a:rPr lang="en-US" sz="1600" i="1">
-                            <a:latin typeface="Cambria Math" panose="02040503050406030204" pitchFamily="18" charset="0"/>
-                            <a:ea typeface="Calibri" panose="020F0502020204030204" pitchFamily="34" charset="0"/>
-                            <a:cs typeface="Calibri" panose="020F0502020204030204" pitchFamily="34" charset="0"/>
-                          </a:rPr>
-                        </m:ctrlPr>
-                      </m:fPr>
-                      <m:num>
-                        <m:r>
-                          <a:rPr lang="en-US" sz="1600" i="1">
-                            <a:latin typeface="Cambria Math" panose="02040503050406030204" pitchFamily="18" charset="0"/>
-                            <a:ea typeface="Calibri" panose="020F0502020204030204" pitchFamily="34" charset="0"/>
-                            <a:cs typeface="Calibri" panose="020F0502020204030204" pitchFamily="34" charset="0"/>
-                          </a:rPr>
-                          <m:t>𝑇𝑁</m:t>
-                        </m:r>
-                      </m:num>
-                      <m:den>
-                        <m:r>
-                          <a:rPr lang="en-US" sz="1600" i="1">
-                            <a:latin typeface="Cambria Math" panose="02040503050406030204" pitchFamily="18" charset="0"/>
-                            <a:ea typeface="Calibri" panose="020F0502020204030204" pitchFamily="34" charset="0"/>
-                            <a:cs typeface="Calibri" panose="020F0502020204030204" pitchFamily="34" charset="0"/>
-                          </a:rPr>
-                          <m:t>𝑇𝑁</m:t>
-                        </m:r>
-                        <m:r>
-                          <a:rPr lang="en-US" sz="1600" i="1">
-                            <a:latin typeface="Cambria Math" panose="02040503050406030204" pitchFamily="18" charset="0"/>
-                            <a:ea typeface="Calibri" panose="020F0502020204030204" pitchFamily="34" charset="0"/>
-                            <a:cs typeface="Calibri" panose="020F0502020204030204" pitchFamily="34" charset="0"/>
-                          </a:rPr>
-                          <m:t>+</m:t>
-                        </m:r>
-                        <m:r>
-                          <a:rPr lang="en-US" sz="1600" i="1">
-                            <a:latin typeface="Cambria Math" panose="02040503050406030204" pitchFamily="18" charset="0"/>
-                            <a:ea typeface="Calibri" panose="020F0502020204030204" pitchFamily="34" charset="0"/>
-                            <a:cs typeface="Calibri" panose="020F0502020204030204" pitchFamily="34" charset="0"/>
-                          </a:rPr>
-                          <m:t>𝐹𝑃</m:t>
-                        </m:r>
-                      </m:den>
-                    </m:f>
-                    <m:r>
-                      <a:rPr lang="en-US" sz="1600" i="1">
-                        <a:latin typeface="Cambria Math" panose="02040503050406030204" pitchFamily="18" charset="0"/>
-                        <a:ea typeface="Calibri" panose="020F0502020204030204" pitchFamily="34" charset="0"/>
-                        <a:cs typeface="Calibri" panose="020F0502020204030204" pitchFamily="34" charset="0"/>
-                      </a:rPr>
-                      <m:t>=</m:t>
-                    </m:r>
-                    <m:r>
-                      <a:rPr lang="en-US" sz="1600" b="0" i="1" smtClean="0">
-                        <a:latin typeface="Cambria Math" panose="02040503050406030204" pitchFamily="18" charset="0"/>
-                        <a:ea typeface="Calibri" panose="020F0502020204030204" pitchFamily="34" charset="0"/>
-                        <a:cs typeface="Calibri" panose="020F0502020204030204" pitchFamily="34" charset="0"/>
-                      </a:rPr>
-                      <m:t>1</m:t>
-                    </m:r>
-                  </m:oMath>
-                </a14:m>
-                <a:r>
-                  <a:rPr lang="en-US" sz="1600" dirty="0" smtClean="0">
-                    <a:effectLst/>
-                    <a:latin typeface="Calibri" panose="020F0502020204030204" pitchFamily="34" charset="0"/>
-                    <a:ea typeface="Calibri" panose="020F0502020204030204" pitchFamily="34" charset="0"/>
-                    <a:cs typeface="Times New Roman" panose="02020603050405020304" pitchFamily="18" charset="0"/>
-                  </a:rPr>
-                  <a:t> </a:t>
-                </a:r>
-                <a14:m>
-                  <m:oMath xmlns:m="http://schemas.openxmlformats.org/officeDocument/2006/math">
-                    <m:r>
-                      <a:rPr lang="en-US" sz="1600" b="1" i="1">
-                        <a:latin typeface="Cambria Math" panose="02040503050406030204" pitchFamily="18" charset="0"/>
-                        <a:ea typeface="Calibri" panose="020F0502020204030204" pitchFamily="34" charset="0"/>
-                        <a:cs typeface="Calibri" panose="020F0502020204030204" pitchFamily="34" charset="0"/>
-                      </a:rPr>
-                      <m:t>→</m:t>
-                    </m:r>
-                    <m:r>
-                      <a:rPr lang="en-US" sz="1600" b="1" i="1">
-                        <a:latin typeface="Cambria Math" panose="02040503050406030204" pitchFamily="18" charset="0"/>
-                        <a:ea typeface="Calibri" panose="020F0502020204030204" pitchFamily="34" charset="0"/>
-                        <a:cs typeface="Calibri" panose="020F0502020204030204" pitchFamily="34" charset="0"/>
-                      </a:rPr>
-                      <m:t>𝑨𝒍𝒍</m:t>
-                    </m:r>
-                    <m:r>
-                      <a:rPr lang="en-US" sz="1600" b="1" i="1">
-                        <a:latin typeface="Cambria Math" panose="02040503050406030204" pitchFamily="18" charset="0"/>
-                        <a:ea typeface="Calibri" panose="020F0502020204030204" pitchFamily="34" charset="0"/>
-                        <a:cs typeface="Calibri" panose="020F0502020204030204" pitchFamily="34" charset="0"/>
-                      </a:rPr>
-                      <m:t> </m:t>
-                    </m:r>
-                    <m:r>
-                      <a:rPr lang="en-US" sz="1600" b="1" i="1">
-                        <a:latin typeface="Cambria Math" panose="02040503050406030204" pitchFamily="18" charset="0"/>
-                        <a:ea typeface="Calibri" panose="020F0502020204030204" pitchFamily="34" charset="0"/>
-                        <a:cs typeface="Calibri" panose="020F0502020204030204" pitchFamily="34" charset="0"/>
-                      </a:rPr>
-                      <m:t>𝒑𝒓𝒆𝒅𝒊𝒄𝒕𝒆𝒅</m:t>
-                    </m:r>
-                    <m:r>
-                      <a:rPr lang="en-US" sz="1600" b="1" i="1" smtClean="0">
-                        <a:latin typeface="Cambria Math" panose="02040503050406030204" pitchFamily="18" charset="0"/>
-                        <a:ea typeface="Calibri" panose="020F0502020204030204" pitchFamily="34" charset="0"/>
-                        <a:cs typeface="Calibri" panose="020F0502020204030204" pitchFamily="34" charset="0"/>
-                      </a:rPr>
-                      <m:t> </m:t>
-                    </m:r>
-                    <m:r>
-                      <a:rPr lang="en-US" sz="1600" b="1" i="1" smtClean="0">
-                        <a:latin typeface="Cambria Math" panose="02040503050406030204" pitchFamily="18" charset="0"/>
-                        <a:ea typeface="Calibri" panose="020F0502020204030204" pitchFamily="34" charset="0"/>
-                        <a:cs typeface="Calibri" panose="020F0502020204030204" pitchFamily="34" charset="0"/>
-                      </a:rPr>
-                      <m:t>𝒏𝒆𝒈𝒂𝒕𝒊𝒗𝒆</m:t>
-                    </m:r>
-                    <m:r>
-                      <a:rPr lang="en-US" sz="1600" b="1" i="1" smtClean="0">
-                        <a:latin typeface="Cambria Math" panose="02040503050406030204" pitchFamily="18" charset="0"/>
-                        <a:ea typeface="Calibri" panose="020F0502020204030204" pitchFamily="34" charset="0"/>
-                        <a:cs typeface="Calibri" panose="020F0502020204030204" pitchFamily="34" charset="0"/>
-                      </a:rPr>
-                      <m:t> </m:t>
-                    </m:r>
-                    <m:r>
-                      <a:rPr lang="en-US" sz="1600" b="1" i="1">
-                        <a:latin typeface="Cambria Math" panose="02040503050406030204" pitchFamily="18" charset="0"/>
-                        <a:ea typeface="Calibri" panose="020F0502020204030204" pitchFamily="34" charset="0"/>
-                        <a:cs typeface="Calibri" panose="020F0502020204030204" pitchFamily="34" charset="0"/>
-                      </a:rPr>
-                      <m:t>𝒂𝒓𝒆</m:t>
-                    </m:r>
-                    <m:r>
-                      <a:rPr lang="en-US" sz="1600" b="1" i="1">
-                        <a:latin typeface="Cambria Math" panose="02040503050406030204" pitchFamily="18" charset="0"/>
-                        <a:ea typeface="Calibri" panose="020F0502020204030204" pitchFamily="34" charset="0"/>
-                        <a:cs typeface="Calibri" panose="020F0502020204030204" pitchFamily="34" charset="0"/>
-                      </a:rPr>
-                      <m:t> </m:t>
-                    </m:r>
-                    <m:r>
-                      <a:rPr lang="en-US" sz="1600" b="1" i="1">
-                        <a:latin typeface="Cambria Math" panose="02040503050406030204" pitchFamily="18" charset="0"/>
-                        <a:ea typeface="Calibri" panose="020F0502020204030204" pitchFamily="34" charset="0"/>
-                        <a:cs typeface="Calibri" panose="020F0502020204030204" pitchFamily="34" charset="0"/>
-                      </a:rPr>
-                      <m:t>𝒕𝒓𝒖𝒍𝒚</m:t>
-                    </m:r>
-                    <m:r>
-                      <a:rPr lang="en-US" sz="1600" b="1" i="1">
-                        <a:latin typeface="Cambria Math" panose="02040503050406030204" pitchFamily="18" charset="0"/>
-                        <a:ea typeface="Calibri" panose="020F0502020204030204" pitchFamily="34" charset="0"/>
-                        <a:cs typeface="Calibri" panose="020F0502020204030204" pitchFamily="34" charset="0"/>
-                      </a:rPr>
-                      <m:t> </m:t>
-                    </m:r>
-                    <m:r>
-                      <a:rPr lang="en-US" sz="1600" b="1" i="1" smtClean="0">
-                        <a:latin typeface="Cambria Math" panose="02040503050406030204" pitchFamily="18" charset="0"/>
-                        <a:ea typeface="Calibri" panose="020F0502020204030204" pitchFamily="34" charset="0"/>
-                        <a:cs typeface="Calibri" panose="020F0502020204030204" pitchFamily="34" charset="0"/>
-                      </a:rPr>
-                      <m:t>𝒏𝒆𝒈𝒂</m:t>
-                    </m:r>
-                    <m:r>
-                      <a:rPr lang="en-US" sz="1600" b="1" i="1">
-                        <a:latin typeface="Cambria Math" panose="02040503050406030204" pitchFamily="18" charset="0"/>
-                        <a:ea typeface="Calibri" panose="020F0502020204030204" pitchFamily="34" charset="0"/>
-                        <a:cs typeface="Calibri" panose="020F0502020204030204" pitchFamily="34" charset="0"/>
-                      </a:rPr>
-                      <m:t>𝒕𝒊𝒗𝒆</m:t>
-                    </m:r>
-                  </m:oMath>
-                </a14:m>
-                <a:endParaRPr lang="en-US" sz="1600" dirty="0" smtClean="0">
-                  <a:effectLst/>
-                  <a:latin typeface="Calibri" panose="020F0502020204030204" pitchFamily="34" charset="0"/>
-                  <a:ea typeface="Calibri" panose="020F0502020204030204" pitchFamily="34" charset="0"/>
-                  <a:cs typeface="Times New Roman" panose="02020603050405020304" pitchFamily="18" charset="0"/>
-                </a:endParaRPr>
-              </a:p>
-              <a:p>
-                <a:pPr>
-                  <a:lnSpc>
-                    <a:spcPct val="107000"/>
-                  </a:lnSpc>
-                  <a:spcAft>
-                    <a:spcPts val="800"/>
-                  </a:spcAft>
-                </a:pPr>
-                <a14:m>
-                  <m:oMathPara xmlns:m="http://schemas.openxmlformats.org/officeDocument/2006/math">
-                    <m:oMathParaPr>
-                      <m:jc m:val="left"/>
-                    </m:oMathParaPr>
-                    <m:oMath xmlns:m="http://schemas.openxmlformats.org/officeDocument/2006/math">
-                      <m:r>
-                        <a:rPr lang="en-US" sz="1600" b="1" i="1">
-                          <a:effectLst/>
-                          <a:latin typeface="Cambria Math" panose="02040503050406030204" pitchFamily="18" charset="0"/>
-                          <a:ea typeface="Calibri" panose="020F0502020204030204" pitchFamily="34" charset="0"/>
-                          <a:cs typeface="Calibri" panose="020F0502020204030204" pitchFamily="34" charset="0"/>
-                        </a:rPr>
-                        <m:t>𝑨𝒄𝒄𝒖𝒓𝒂𝒄𝒚</m:t>
-                      </m:r>
-                      <m:r>
-                        <a:rPr lang="en-US" sz="1600" b="1" i="1">
-                          <a:effectLst/>
-                          <a:latin typeface="Cambria Math" panose="02040503050406030204" pitchFamily="18" charset="0"/>
-                          <a:ea typeface="Calibri" panose="020F0502020204030204" pitchFamily="34" charset="0"/>
-                          <a:cs typeface="Calibri" panose="020F0502020204030204" pitchFamily="34" charset="0"/>
-                        </a:rPr>
-                        <m:t>=</m:t>
-                      </m:r>
-                      <m:f>
-                        <m:fPr>
-                          <m:ctrlPr>
-                            <a:rPr lang="en-US" sz="1600" i="1">
-                              <a:effectLst/>
-                              <a:latin typeface="Cambria Math" panose="02040503050406030204" pitchFamily="18" charset="0"/>
-                              <a:ea typeface="Calibri" panose="020F0502020204030204" pitchFamily="34" charset="0"/>
-                              <a:cs typeface="Calibri" panose="020F0502020204030204" pitchFamily="34" charset="0"/>
-                            </a:rPr>
-                          </m:ctrlPr>
-                        </m:fPr>
-                        <m:num>
-                          <m:r>
-                            <a:rPr lang="en-US" sz="1600" i="1">
-                              <a:effectLst/>
-                              <a:latin typeface="Cambria Math" panose="02040503050406030204" pitchFamily="18" charset="0"/>
-                              <a:ea typeface="Calibri" panose="020F0502020204030204" pitchFamily="34" charset="0"/>
-                              <a:cs typeface="Calibri" panose="020F0502020204030204" pitchFamily="34" charset="0"/>
-                            </a:rPr>
-                            <m:t>𝑇𝑁</m:t>
-                          </m:r>
-                          <m:r>
-                            <a:rPr lang="en-US" sz="1600" i="1">
-                              <a:effectLst/>
-                              <a:latin typeface="Cambria Math" panose="02040503050406030204" pitchFamily="18" charset="0"/>
-                              <a:ea typeface="Calibri" panose="020F0502020204030204" pitchFamily="34" charset="0"/>
-                              <a:cs typeface="Calibri" panose="020F0502020204030204" pitchFamily="34" charset="0"/>
-                            </a:rPr>
-                            <m:t>+</m:t>
-                          </m:r>
-                          <m:r>
-                            <a:rPr lang="en-US" sz="1600" i="1">
-                              <a:effectLst/>
-                              <a:latin typeface="Cambria Math" panose="02040503050406030204" pitchFamily="18" charset="0"/>
-                              <a:ea typeface="Calibri" panose="020F0502020204030204" pitchFamily="34" charset="0"/>
-                              <a:cs typeface="Calibri" panose="020F0502020204030204" pitchFamily="34" charset="0"/>
-                            </a:rPr>
-                            <m:t>𝑇𝑃</m:t>
-                          </m:r>
-                        </m:num>
-                        <m:den>
-                          <m:r>
-                            <a:rPr lang="en-US" sz="1600" i="1">
-                              <a:effectLst/>
-                              <a:latin typeface="Cambria Math" panose="02040503050406030204" pitchFamily="18" charset="0"/>
-                              <a:ea typeface="Calibri" panose="020F0502020204030204" pitchFamily="34" charset="0"/>
-                              <a:cs typeface="Calibri" panose="020F0502020204030204" pitchFamily="34" charset="0"/>
-                            </a:rPr>
-                            <m:t>𝑛</m:t>
-                          </m:r>
-                        </m:den>
-                      </m:f>
-                      <m:r>
-                        <a:rPr lang="en-US" sz="1600" b="0" i="1" smtClean="0">
-                          <a:effectLst/>
-                          <a:latin typeface="Cambria Math" panose="02040503050406030204" pitchFamily="18" charset="0"/>
-                          <a:ea typeface="Calibri" panose="020F0502020204030204" pitchFamily="34" charset="0"/>
-                          <a:cs typeface="Calibri" panose="020F0502020204030204" pitchFamily="34" charset="0"/>
-                        </a:rPr>
-                        <m:t>=1 →</m:t>
-                      </m:r>
-                      <m:r>
-                        <a:rPr lang="en-US" sz="1600" b="1" i="1" smtClean="0">
-                          <a:effectLst/>
-                          <a:latin typeface="Cambria Math" panose="02040503050406030204" pitchFamily="18" charset="0"/>
-                          <a:ea typeface="Calibri" panose="020F0502020204030204" pitchFamily="34" charset="0"/>
-                          <a:cs typeface="Calibri" panose="020F0502020204030204" pitchFamily="34" charset="0"/>
-                        </a:rPr>
-                        <m:t>𝑨𝒍𝒍</m:t>
-                      </m:r>
-                      <m:r>
-                        <a:rPr lang="en-US" sz="1600" b="1" i="1" smtClean="0">
-                          <a:effectLst/>
-                          <a:latin typeface="Cambria Math" panose="02040503050406030204" pitchFamily="18" charset="0"/>
-                          <a:ea typeface="Calibri" panose="020F0502020204030204" pitchFamily="34" charset="0"/>
-                          <a:cs typeface="Calibri" panose="020F0502020204030204" pitchFamily="34" charset="0"/>
-                        </a:rPr>
-                        <m:t> </m:t>
-                      </m:r>
-                      <m:r>
-                        <a:rPr lang="en-US" sz="1600" b="1" i="1" smtClean="0">
-                          <a:effectLst/>
-                          <a:latin typeface="Cambria Math" panose="02040503050406030204" pitchFamily="18" charset="0"/>
-                          <a:ea typeface="Calibri" panose="020F0502020204030204" pitchFamily="34" charset="0"/>
-                          <a:cs typeface="Calibri" panose="020F0502020204030204" pitchFamily="34" charset="0"/>
-                        </a:rPr>
-                        <m:t>𝒑𝒓𝒆𝒅𝒊𝒄𝒕𝒊𝒐𝒏𝒔</m:t>
-                      </m:r>
-                      <m:r>
-                        <a:rPr lang="en-US" sz="1600" b="1" i="1" smtClean="0">
-                          <a:effectLst/>
-                          <a:latin typeface="Cambria Math" panose="02040503050406030204" pitchFamily="18" charset="0"/>
-                          <a:ea typeface="Calibri" panose="020F0502020204030204" pitchFamily="34" charset="0"/>
-                          <a:cs typeface="Calibri" panose="020F0502020204030204" pitchFamily="34" charset="0"/>
-                        </a:rPr>
-                        <m:t> </m:t>
-                      </m:r>
-                      <m:r>
-                        <a:rPr lang="en-US" sz="1600" b="1" i="1" smtClean="0">
-                          <a:effectLst/>
-                          <a:latin typeface="Cambria Math" panose="02040503050406030204" pitchFamily="18" charset="0"/>
-                          <a:ea typeface="Calibri" panose="020F0502020204030204" pitchFamily="34" charset="0"/>
-                          <a:cs typeface="Calibri" panose="020F0502020204030204" pitchFamily="34" charset="0"/>
-                        </a:rPr>
-                        <m:t>𝒂𝒓𝒆</m:t>
-                      </m:r>
-                      <m:r>
-                        <a:rPr lang="en-US" sz="1600" b="1" i="1" smtClean="0">
-                          <a:effectLst/>
-                          <a:latin typeface="Cambria Math" panose="02040503050406030204" pitchFamily="18" charset="0"/>
-                          <a:ea typeface="Calibri" panose="020F0502020204030204" pitchFamily="34" charset="0"/>
-                          <a:cs typeface="Calibri" panose="020F0502020204030204" pitchFamily="34" charset="0"/>
-                        </a:rPr>
-                        <m:t> </m:t>
-                      </m:r>
-                      <m:r>
-                        <a:rPr lang="en-US" sz="1600" b="1" i="1" smtClean="0">
-                          <a:effectLst/>
-                          <a:latin typeface="Cambria Math" panose="02040503050406030204" pitchFamily="18" charset="0"/>
-                          <a:ea typeface="Calibri" panose="020F0502020204030204" pitchFamily="34" charset="0"/>
-                          <a:cs typeface="Calibri" panose="020F0502020204030204" pitchFamily="34" charset="0"/>
-                        </a:rPr>
-                        <m:t>𝒄𝒐𝒓𝒓𝒆𝒄𝒕</m:t>
-                      </m:r>
-                    </m:oMath>
-                  </m:oMathPara>
-                </a14:m>
-                <a:endParaRPr lang="en-US" sz="1600" b="1" dirty="0" smtClean="0">
-                  <a:effectLst/>
-                  <a:latin typeface="Calibri" panose="020F0502020204030204" pitchFamily="34" charset="0"/>
-                  <a:ea typeface="Calibri" panose="020F0502020204030204" pitchFamily="34" charset="0"/>
-                  <a:cs typeface="Times New Roman" panose="02020603050405020304" pitchFamily="18" charset="0"/>
-                </a:endParaRPr>
-              </a:p>
-              <a:p>
-                <a:pPr>
-                  <a:lnSpc>
-                    <a:spcPct val="107000"/>
-                  </a:lnSpc>
-                  <a:spcAft>
-                    <a:spcPts val="800"/>
-                  </a:spcAft>
-                </a:pPr>
-                <a14:m>
-                  <m:oMathPara xmlns:m="http://schemas.openxmlformats.org/officeDocument/2006/math">
-                    <m:oMathParaPr>
-                      <m:jc m:val="left"/>
-                    </m:oMathParaPr>
-                    <m:oMath xmlns:m="http://schemas.openxmlformats.org/officeDocument/2006/math">
-                      <m:r>
-                        <a:rPr lang="en-US" b="1" i="1">
-                          <a:latin typeface="Cambria Math" panose="02040503050406030204" pitchFamily="18" charset="0"/>
-                        </a:rPr>
-                        <m:t>𝑭</m:t>
-                      </m:r>
-                      <m:r>
-                        <a:rPr lang="en-US" b="1" i="1">
-                          <a:latin typeface="Cambria Math" panose="02040503050406030204" pitchFamily="18" charset="0"/>
-                        </a:rPr>
-                        <m:t>𝟏</m:t>
-                      </m:r>
-                      <m:r>
-                        <a:rPr lang="en-US">
-                          <a:latin typeface="Cambria Math" panose="02040503050406030204" pitchFamily="18" charset="0"/>
-                        </a:rPr>
-                        <m:t>= </m:t>
-                      </m:r>
-                      <m:f>
-                        <m:fPr>
-                          <m:ctrlPr>
-                            <a:rPr lang="en-US" i="1">
-                              <a:latin typeface="Cambria Math" panose="02040503050406030204" pitchFamily="18" charset="0"/>
-                            </a:rPr>
-                          </m:ctrlPr>
-                        </m:fPr>
-                        <m:num>
-                          <m:r>
-                            <a:rPr lang="en-US">
-                              <a:latin typeface="Cambria Math" panose="02040503050406030204" pitchFamily="18" charset="0"/>
-                            </a:rPr>
-                            <m:t>2</m:t>
-                          </m:r>
-                          <m:r>
-                            <a:rPr lang="en-US" i="1">
-                              <a:latin typeface="Cambria Math" panose="02040503050406030204" pitchFamily="18" charset="0"/>
-                            </a:rPr>
-                            <m:t>𝑇𝑃</m:t>
-                          </m:r>
-                        </m:num>
-                        <m:den>
-                          <m:r>
-                            <a:rPr lang="en-US">
-                              <a:latin typeface="Cambria Math" panose="02040503050406030204" pitchFamily="18" charset="0"/>
-                            </a:rPr>
-                            <m:t>2</m:t>
-                          </m:r>
-                          <m:r>
-                            <a:rPr lang="en-US" i="1">
-                              <a:latin typeface="Cambria Math" panose="02040503050406030204" pitchFamily="18" charset="0"/>
-                            </a:rPr>
-                            <m:t>𝑇𝑃</m:t>
-                          </m:r>
-                          <m:r>
-                            <a:rPr lang="en-US">
-                              <a:latin typeface="Cambria Math" panose="02040503050406030204" pitchFamily="18" charset="0"/>
-                            </a:rPr>
-                            <m:t>+</m:t>
-                          </m:r>
-                          <m:r>
-                            <a:rPr lang="en-US" i="1">
-                              <a:latin typeface="Cambria Math" panose="02040503050406030204" pitchFamily="18" charset="0"/>
-                            </a:rPr>
-                            <m:t>𝐹𝑃</m:t>
-                          </m:r>
-                          <m:r>
-                            <a:rPr lang="en-US">
-                              <a:latin typeface="Cambria Math" panose="02040503050406030204" pitchFamily="18" charset="0"/>
-                            </a:rPr>
-                            <m:t>+</m:t>
-                          </m:r>
-                          <m:r>
-                            <a:rPr lang="en-US" i="1">
-                              <a:latin typeface="Cambria Math" panose="02040503050406030204" pitchFamily="18" charset="0"/>
-                            </a:rPr>
-                            <m:t>𝐹𝑁</m:t>
-                          </m:r>
-                        </m:den>
-                      </m:f>
-                      <m:r>
-                        <a:rPr lang="en-US">
-                          <a:latin typeface="Cambria Math" panose="02040503050406030204" pitchFamily="18" charset="0"/>
-                        </a:rPr>
-                        <m:t>=→</m:t>
-                      </m:r>
-                      <m:r>
-                        <a:rPr lang="en-US" b="1">
-                          <a:latin typeface="Cambria Math" panose="02040503050406030204" pitchFamily="18" charset="0"/>
-                        </a:rPr>
-                        <m:t>𝐓𝐡𝐞𝐫𝐞</m:t>
-                      </m:r>
-                      <m:r>
-                        <a:rPr lang="en-US" b="1">
-                          <a:latin typeface="Cambria Math" panose="02040503050406030204" pitchFamily="18" charset="0"/>
-                        </a:rPr>
-                        <m:t> </m:t>
-                      </m:r>
-                      <m:r>
-                        <a:rPr lang="en-US" b="1">
-                          <a:latin typeface="Cambria Math" panose="02040503050406030204" pitchFamily="18" charset="0"/>
-                        </a:rPr>
-                        <m:t>𝐰𝐞𝐫𝐞</m:t>
-                      </m:r>
-                      <m:r>
-                        <a:rPr lang="en-US" b="1">
-                          <a:latin typeface="Cambria Math" panose="02040503050406030204" pitchFamily="18" charset="0"/>
-                        </a:rPr>
-                        <m:t> </m:t>
-                      </m:r>
-                      <m:r>
-                        <a:rPr lang="en-US" b="1">
-                          <a:latin typeface="Cambria Math" panose="02040503050406030204" pitchFamily="18" charset="0"/>
-                        </a:rPr>
-                        <m:t>𝐧𝐨</m:t>
-                      </m:r>
-                      <m:r>
-                        <a:rPr lang="en-US" b="1">
-                          <a:latin typeface="Cambria Math" panose="02040503050406030204" pitchFamily="18" charset="0"/>
-                        </a:rPr>
-                        <m:t> </m:t>
-                      </m:r>
-                      <m:r>
-                        <a:rPr lang="en-US" b="1">
-                          <a:latin typeface="Cambria Math" panose="02040503050406030204" pitchFamily="18" charset="0"/>
-                        </a:rPr>
-                        <m:t>𝐟𝐚𝐥𝐬𝐞</m:t>
-                      </m:r>
-                      <m:r>
-                        <a:rPr lang="en-US" b="1">
-                          <a:latin typeface="Cambria Math" panose="02040503050406030204" pitchFamily="18" charset="0"/>
-                        </a:rPr>
-                        <m:t> </m:t>
-                      </m:r>
-                      <m:r>
-                        <a:rPr lang="en-US" b="1">
-                          <a:latin typeface="Cambria Math" panose="02040503050406030204" pitchFamily="18" charset="0"/>
-                        </a:rPr>
-                        <m:t>𝐩𝐨𝐬𝐢𝐭𝐢𝐯𝐞𝐬</m:t>
-                      </m:r>
-                      <m:r>
-                        <a:rPr lang="en-US" b="1">
-                          <a:latin typeface="Cambria Math" panose="02040503050406030204" pitchFamily="18" charset="0"/>
-                        </a:rPr>
-                        <m:t> </m:t>
-                      </m:r>
-                      <m:r>
-                        <a:rPr lang="en-US" b="1">
-                          <a:latin typeface="Cambria Math" panose="02040503050406030204" pitchFamily="18" charset="0"/>
-                        </a:rPr>
-                        <m:t>𝐨𝐫</m:t>
-                      </m:r>
-                      <m:r>
-                        <a:rPr lang="en-US" b="1">
-                          <a:latin typeface="Cambria Math" panose="02040503050406030204" pitchFamily="18" charset="0"/>
-                        </a:rPr>
-                        <m:t> </m:t>
-                      </m:r>
-                      <m:r>
-                        <a:rPr lang="en-US" b="1">
-                          <a:latin typeface="Cambria Math" panose="02040503050406030204" pitchFamily="18" charset="0"/>
-                        </a:rPr>
-                        <m:t>𝐟𝐚𝐥𝐬𝐞</m:t>
-                      </m:r>
-                      <m:r>
-                        <a:rPr lang="en-US" b="1">
-                          <a:latin typeface="Cambria Math" panose="02040503050406030204" pitchFamily="18" charset="0"/>
-                        </a:rPr>
-                        <m:t> </m:t>
-                      </m:r>
-                      <m:r>
-                        <a:rPr lang="en-US" b="1">
-                          <a:latin typeface="Cambria Math" panose="02040503050406030204" pitchFamily="18" charset="0"/>
-                        </a:rPr>
-                        <m:t>𝐧𝐞𝐠𝐚𝐭𝐢𝐯𝐞𝐬</m:t>
-                      </m:r>
-                    </m:oMath>
-                  </m:oMathPara>
-                </a14:m>
-                <a:endParaRPr lang="en-US" b="1" dirty="0"/>
-              </a:p>
-              <a:p>
-                <a:pPr>
-                  <a:lnSpc>
-                    <a:spcPct val="107000"/>
-                  </a:lnSpc>
-                  <a:spcAft>
-                    <a:spcPts val="800"/>
-                  </a:spcAft>
-                </a:pPr>
-                <a:r>
-                  <a:rPr lang="en-US" b="1" dirty="0" smtClean="0"/>
-                  <a:t> AUC = 1 -&gt; The model is classifying perfectly</a:t>
-                </a:r>
-              </a:p>
-              <a:p>
-                <a:pPr>
-                  <a:lnSpc>
-                    <a:spcPct val="107000"/>
-                  </a:lnSpc>
-                  <a:spcAft>
-                    <a:spcPts val="800"/>
-                  </a:spcAft>
-                </a:pPr>
-                <a:r>
-                  <a:rPr lang="en-US" dirty="0" smtClean="0"/>
-                  <a:t>Epoch Curves indicate no overfitting or </a:t>
-                </a:r>
-                <a:r>
-                  <a:rPr lang="en-US" dirty="0" err="1" smtClean="0"/>
-                  <a:t>underfitting</a:t>
-                </a:r>
-                <a:r>
-                  <a:rPr lang="en-US" dirty="0" smtClean="0"/>
-                  <a:t> has occurred, although the jagged nature means learning rate may be too high</a:t>
-                </a:r>
-                <a:endParaRPr lang="en-US" dirty="0"/>
-              </a:p>
-              <a:p>
-                <a:pPr>
-                  <a:lnSpc>
-                    <a:spcPct val="107000"/>
-                  </a:lnSpc>
-                  <a:spcAft>
-                    <a:spcPts val="800"/>
-                  </a:spcAft>
-                </a:pPr>
-                <a:endParaRPr lang="en-US" sz="1600" dirty="0">
-                  <a:effectLst/>
-                  <a:latin typeface="Calibri" panose="020F0502020204030204" pitchFamily="34" charset="0"/>
-                  <a:ea typeface="Calibri" panose="020F0502020204030204" pitchFamily="34" charset="0"/>
-                  <a:cs typeface="Times New Roman" panose="02020603050405020304" pitchFamily="18" charset="0"/>
-                </a:endParaRPr>
-              </a:p>
-            </p:txBody>
-          </p:sp>
-        </mc:Choice>
-        <mc:Fallback xmlns="">
-          <p:sp>
-            <p:nvSpPr>
-              <p:cNvPr id="11" name="Rectangle 10"/>
-              <p:cNvSpPr>
-                <a:spLocks noRot="1" noChangeAspect="1" noMove="1" noResize="1" noEditPoints="1" noAdjustHandles="1" noChangeArrowheads="1" noChangeShapeType="1" noTextEdit="1"/>
-              </p:cNvSpPr>
-              <p:nvPr/>
-            </p:nvSpPr>
-            <p:spPr>
-              <a:xfrm>
-                <a:off x="305937" y="3222820"/>
-                <a:ext cx="8130168" cy="3787191"/>
-              </a:xfrm>
-              <a:prstGeom prst="rect">
-                <a:avLst/>
-              </a:prstGeom>
-              <a:blipFill>
-                <a:blip r:embed="rId5"/>
-                <a:stretch>
-                  <a:fillRect l="-600"/>
-                </a:stretch>
-              </a:blipFill>
-            </p:spPr>
-            <p:txBody>
-              <a:bodyPr/>
-              <a:lstStyle/>
-              <a:p>
-                <a:r>
-                  <a:rPr lang="en-US">
-                    <a:noFill/>
-                  </a:rPr>
-                  <a:t> </a:t>
-                </a:r>
-              </a:p>
-            </p:txBody>
-          </p:sp>
-        </mc:Fallback>
-      </mc:AlternateContent>
     </p:spTree>
     <p:extLst>
       <p:ext uri="{BB962C8B-B14F-4D97-AF65-F5344CB8AC3E}">
-        <p14:creationId xmlns:p14="http://schemas.microsoft.com/office/powerpoint/2010/main" val="3955358761"/>
+        <p14:creationId xmlns:p14="http://schemas.microsoft.com/office/powerpoint/2010/main" val="2776017089"/>
       </p:ext>
     </p:extLst>
   </p:cSld>
@@ -5996,6 +5104,35 @@
           <a:chExt cx="0" cy="0"/>
         </a:xfrm>
       </p:grpSpPr>
+      <p:pic>
+        <p:nvPicPr>
+          <p:cNvPr id="15" name="Picture 14"/>
+          <p:cNvPicPr>
+            <a:picLocks noChangeAspect="1"/>
+          </p:cNvPicPr>
+          <p:nvPr/>
+        </p:nvPicPr>
+        <p:blipFill rotWithShape="1">
+          <a:blip r:embed="rId2">
+            <a:extLst>
+              <a:ext uri="{28A0092B-C50C-407E-A947-70E740481C1C}">
+                <a14:useLocalDpi xmlns:a14="http://schemas.microsoft.com/office/drawing/2010/main" val="0"/>
+              </a:ext>
+            </a:extLst>
+          </a:blip>
+          <a:srcRect t="12179" b="4944"/>
+          <a:stretch/>
+        </p:blipFill>
+        <p:spPr>
+          <a:xfrm>
+            <a:off x="6502538" y="2212223"/>
+            <a:ext cx="5487650" cy="3031958"/>
+          </a:xfrm>
+          <a:prstGeom prst="rect">
+            <a:avLst/>
+          </a:prstGeom>
+        </p:spPr>
+      </p:pic>
       <p:sp>
         <p:nvSpPr>
           <p:cNvPr id="2" name="Title 1"/>
@@ -6006,18 +5143,25 @@
             <p:ph type="title"/>
           </p:nvPr>
         </p:nvSpPr>
-        <p:spPr/>
+        <p:spPr>
+          <a:xfrm>
+            <a:off x="305937" y="353822"/>
+            <a:ext cx="10515600" cy="1325563"/>
+          </a:xfrm>
+        </p:spPr>
         <p:txBody>
-          <a:bodyPr>
-            <a:normAutofit/>
-          </a:bodyPr>
+          <a:bodyPr/>
           <a:lstStyle/>
           <a:p>
             <a:r>
-              <a:rPr lang="en-US" sz="3600" dirty="0" smtClean="0"/>
-              <a:t>SVM Classifier</a:t>
-            </a:r>
-            <a:endParaRPr lang="en-US" sz="3600" dirty="0"/>
+              <a:rPr lang="en-US" dirty="0" smtClean="0"/>
+              <a:t>ANN </a:t>
+            </a:r>
+            <a:r>
+              <a:rPr lang="en-US" dirty="0" smtClean="0"/>
+              <a:t>Training Curves</a:t>
+            </a:r>
+            <a:endParaRPr lang="en-US" dirty="0"/>
           </a:p>
         </p:txBody>
       </p:sp>
@@ -6033,8 +5177,8 @@
         </p:nvSpPr>
         <p:spPr>
           <a:xfrm>
-            <a:off x="838200" y="1525588"/>
-            <a:ext cx="11049000" cy="4351338"/>
+            <a:off x="459775" y="1303867"/>
+            <a:ext cx="11328601" cy="4351338"/>
           </a:xfrm>
         </p:spPr>
         <p:txBody>
@@ -6042,36 +5186,1466 @@
           <a:lstStyle/>
           <a:p>
             <a:r>
+              <a:rPr lang="en-US" i="1" dirty="0" smtClean="0"/>
+              <a:t>This model was assessed using the F1-score, Sensitivity, Specificity, Accuracy, and the </a:t>
+            </a:r>
+            <a:r>
+              <a:rPr lang="en-US" i="1" dirty="0" smtClean="0"/>
+              <a:t>ROC</a:t>
+            </a:r>
+            <a:r>
+              <a:rPr lang="en-US" dirty="0"/>
+              <a:t> </a:t>
+            </a:r>
+            <a:r>
               <a:rPr lang="en-US" dirty="0" smtClean="0"/>
-              <a:t>The SVM used applies a linear kernel</a:t>
-            </a:r>
-          </a:p>
-          <a:p>
-            <a:r>
-              <a:rPr lang="en-US" dirty="0" smtClean="0"/>
-              <a:t>Data was split into 70% training data and 30% testing data</a:t>
-            </a:r>
-            <a:endParaRPr lang="en-US" dirty="0"/>
+              <a:t> for test and validation data</a:t>
+            </a:r>
+            <a:endParaRPr lang="en-US" i="1" dirty="0" smtClean="0"/>
           </a:p>
         </p:txBody>
       </p:sp>
+      <p:sp>
+        <p:nvSpPr>
+          <p:cNvPr id="7" name="TextBox 6"/>
+          <p:cNvSpPr txBox="1"/>
+          <p:nvPr/>
+        </p:nvSpPr>
+        <p:spPr>
+          <a:xfrm>
+            <a:off x="1255352" y="2088467"/>
+            <a:ext cx="4300421" cy="369332"/>
+          </a:xfrm>
+          <a:prstGeom prst="rect">
+            <a:avLst/>
+          </a:prstGeom>
+          <a:noFill/>
+        </p:spPr>
+        <p:txBody>
+          <a:bodyPr wrap="square" rtlCol="0">
+            <a:spAutoFit/>
+          </a:bodyPr>
+          <a:lstStyle/>
+          <a:p>
+            <a:pPr algn="ctr"/>
+            <a:r>
+              <a:rPr lang="en-US" dirty="0" smtClean="0"/>
+              <a:t>Validation</a:t>
+            </a:r>
+            <a:endParaRPr lang="en-US" dirty="0"/>
+          </a:p>
+        </p:txBody>
+      </p:sp>
+      <p:sp>
+        <p:nvSpPr>
+          <p:cNvPr id="12" name="TextBox 11"/>
+          <p:cNvSpPr txBox="1"/>
+          <p:nvPr/>
+        </p:nvSpPr>
+        <p:spPr>
+          <a:xfrm>
+            <a:off x="7249895" y="1973877"/>
+            <a:ext cx="4300421" cy="369332"/>
+          </a:xfrm>
+          <a:prstGeom prst="rect">
+            <a:avLst/>
+          </a:prstGeom>
+          <a:noFill/>
+        </p:spPr>
+        <p:txBody>
+          <a:bodyPr wrap="square" rtlCol="0">
+            <a:spAutoFit/>
+          </a:bodyPr>
+          <a:lstStyle/>
+          <a:p>
+            <a:pPr algn="ctr"/>
+            <a:r>
+              <a:rPr lang="en-US" dirty="0" smtClean="0"/>
+              <a:t>Testing</a:t>
+            </a:r>
+            <a:endParaRPr lang="en-US" dirty="0"/>
+          </a:p>
+        </p:txBody>
+      </p:sp>
+      <mc:AlternateContent xmlns:mc="http://schemas.openxmlformats.org/markup-compatibility/2006">
+        <mc:Choice xmlns:a14="http://schemas.microsoft.com/office/drawing/2010/main" Requires="a14">
+          <p:sp>
+            <p:nvSpPr>
+              <p:cNvPr id="11" name="Rectangle 10"/>
+              <p:cNvSpPr/>
+              <p:nvPr/>
+            </p:nvSpPr>
+            <p:spPr>
+              <a:xfrm>
+                <a:off x="6254311" y="5147742"/>
+                <a:ext cx="8165653" cy="2009589"/>
+              </a:xfrm>
+              <a:prstGeom prst="rect">
+                <a:avLst/>
+              </a:prstGeom>
+            </p:spPr>
+            <p:txBody>
+              <a:bodyPr wrap="square">
+                <a:spAutoFit/>
+              </a:bodyPr>
+              <a:lstStyle/>
+              <a:p>
+                <a:pPr>
+                  <a:lnSpc>
+                    <a:spcPct val="107000"/>
+                  </a:lnSpc>
+                  <a:spcAft>
+                    <a:spcPts val="800"/>
+                  </a:spcAft>
+                </a:pPr>
+                <a14:m>
+                  <m:oMathPara xmlns:m="http://schemas.openxmlformats.org/officeDocument/2006/math">
+                    <m:oMathParaPr>
+                      <m:jc m:val="left"/>
+                    </m:oMathParaPr>
+                    <m:oMath xmlns:m="http://schemas.openxmlformats.org/officeDocument/2006/math">
+                      <m:r>
+                        <a:rPr lang="en-US" sz="1400" b="1" i="1" smtClean="0">
+                          <a:latin typeface="Cambria Math" panose="02040503050406030204" pitchFamily="18" charset="0"/>
+                          <a:ea typeface="Calibri" panose="020F0502020204030204" pitchFamily="34" charset="0"/>
+                          <a:cs typeface="Calibri" panose="020F0502020204030204" pitchFamily="34" charset="0"/>
+                        </a:rPr>
+                        <m:t>𝑺𝒆𝒏𝒔𝒊𝒕𝒊𝒗𝒊𝒕𝒚</m:t>
+                      </m:r>
+                      <m:r>
+                        <a:rPr lang="en-US" sz="1400">
+                          <a:latin typeface="Cambria Math" panose="02040503050406030204" pitchFamily="18" charset="0"/>
+                        </a:rPr>
+                        <m:t>≈</m:t>
+                      </m:r>
+                      <m:r>
+                        <a:rPr lang="en-US" sz="1400" b="1" i="1" smtClean="0">
+                          <a:latin typeface="Cambria Math" panose="02040503050406030204" pitchFamily="18" charset="0"/>
+                          <a:ea typeface="Calibri" panose="020F0502020204030204" pitchFamily="34" charset="0"/>
+                          <a:cs typeface="Calibri" panose="020F0502020204030204" pitchFamily="34" charset="0"/>
+                        </a:rPr>
+                        <m:t>𝟎</m:t>
+                      </m:r>
+                      <m:r>
+                        <a:rPr lang="en-US" sz="1400" b="1" i="1" smtClean="0">
+                          <a:latin typeface="Cambria Math" panose="02040503050406030204" pitchFamily="18" charset="0"/>
+                          <a:ea typeface="Calibri" panose="020F0502020204030204" pitchFamily="34" charset="0"/>
+                          <a:cs typeface="Calibri" panose="020F0502020204030204" pitchFamily="34" charset="0"/>
+                        </a:rPr>
+                        <m:t>.</m:t>
+                      </m:r>
+                      <m:r>
+                        <a:rPr lang="en-US" sz="1400" b="1" i="1" smtClean="0">
+                          <a:latin typeface="Cambria Math" panose="02040503050406030204" pitchFamily="18" charset="0"/>
+                          <a:ea typeface="Calibri" panose="020F0502020204030204" pitchFamily="34" charset="0"/>
+                          <a:cs typeface="Calibri" panose="020F0502020204030204" pitchFamily="34" charset="0"/>
+                        </a:rPr>
+                        <m:t>𝟗</m:t>
+                      </m:r>
+                      <m:r>
+                        <a:rPr lang="en-US" sz="1400" b="1" i="1" smtClean="0">
+                          <a:latin typeface="Cambria Math" panose="02040503050406030204" pitchFamily="18" charset="0"/>
+                          <a:ea typeface="Calibri" panose="020F0502020204030204" pitchFamily="34" charset="0"/>
+                          <a:cs typeface="Calibri" panose="020F0502020204030204" pitchFamily="34" charset="0"/>
+                        </a:rPr>
+                        <m:t> →</m:t>
+                      </m:r>
+                      <m:r>
+                        <a:rPr lang="en-US" sz="1400" b="1" i="1" smtClean="0">
+                          <a:latin typeface="Cambria Math" panose="02040503050406030204" pitchFamily="18" charset="0"/>
+                          <a:ea typeface="Calibri" panose="020F0502020204030204" pitchFamily="34" charset="0"/>
+                          <a:cs typeface="Calibri" panose="020F0502020204030204" pitchFamily="34" charset="0"/>
+                        </a:rPr>
+                        <m:t>𝑴𝒐𝒔𝒕</m:t>
+                      </m:r>
+                      <m:r>
+                        <a:rPr lang="en-US" sz="1400" b="1" i="1" smtClean="0">
+                          <a:latin typeface="Cambria Math" panose="02040503050406030204" pitchFamily="18" charset="0"/>
+                          <a:ea typeface="Calibri" panose="020F0502020204030204" pitchFamily="34" charset="0"/>
+                          <a:cs typeface="Calibri" panose="020F0502020204030204" pitchFamily="34" charset="0"/>
+                        </a:rPr>
+                        <m:t> </m:t>
+                      </m:r>
+                      <m:r>
+                        <a:rPr lang="en-US" sz="1400" b="1" i="1">
+                          <a:latin typeface="Cambria Math" panose="02040503050406030204" pitchFamily="18" charset="0"/>
+                          <a:ea typeface="Calibri" panose="020F0502020204030204" pitchFamily="34" charset="0"/>
+                          <a:cs typeface="Calibri" panose="020F0502020204030204" pitchFamily="34" charset="0"/>
+                        </a:rPr>
+                        <m:t>𝒑𝒓𝒆𝒅𝒊𝒄𝒕𝒆𝒅</m:t>
+                      </m:r>
+                      <m:r>
+                        <a:rPr lang="en-US" sz="1400" b="1" i="1">
+                          <a:latin typeface="Cambria Math" panose="02040503050406030204" pitchFamily="18" charset="0"/>
+                          <a:ea typeface="Calibri" panose="020F0502020204030204" pitchFamily="34" charset="0"/>
+                          <a:cs typeface="Calibri" panose="020F0502020204030204" pitchFamily="34" charset="0"/>
+                        </a:rPr>
+                        <m:t> </m:t>
+                      </m:r>
+                      <m:r>
+                        <a:rPr lang="en-US" sz="1400" b="1" i="1">
+                          <a:latin typeface="Cambria Math" panose="02040503050406030204" pitchFamily="18" charset="0"/>
+                          <a:ea typeface="Calibri" panose="020F0502020204030204" pitchFamily="34" charset="0"/>
+                          <a:cs typeface="Calibri" panose="020F0502020204030204" pitchFamily="34" charset="0"/>
+                        </a:rPr>
+                        <m:t>𝒑𝒐𝒔𝒊𝒕𝒊𝒗𝒆</m:t>
+                      </m:r>
+                      <m:r>
+                        <a:rPr lang="en-US" sz="1400" b="1" i="1">
+                          <a:latin typeface="Cambria Math" panose="02040503050406030204" pitchFamily="18" charset="0"/>
+                          <a:ea typeface="Calibri" panose="020F0502020204030204" pitchFamily="34" charset="0"/>
+                          <a:cs typeface="Calibri" panose="020F0502020204030204" pitchFamily="34" charset="0"/>
+                        </a:rPr>
+                        <m:t> </m:t>
+                      </m:r>
+                      <m:r>
+                        <a:rPr lang="en-US" sz="1400" b="1" i="1">
+                          <a:latin typeface="Cambria Math" panose="02040503050406030204" pitchFamily="18" charset="0"/>
+                          <a:ea typeface="Calibri" panose="020F0502020204030204" pitchFamily="34" charset="0"/>
+                          <a:cs typeface="Calibri" panose="020F0502020204030204" pitchFamily="34" charset="0"/>
+                        </a:rPr>
+                        <m:t>𝒂𝒓𝒆</m:t>
+                      </m:r>
+                      <m:r>
+                        <a:rPr lang="en-US" sz="1400" b="1" i="1">
+                          <a:latin typeface="Cambria Math" panose="02040503050406030204" pitchFamily="18" charset="0"/>
+                          <a:ea typeface="Calibri" panose="020F0502020204030204" pitchFamily="34" charset="0"/>
+                          <a:cs typeface="Calibri" panose="020F0502020204030204" pitchFamily="34" charset="0"/>
+                        </a:rPr>
+                        <m:t> </m:t>
+                      </m:r>
+                      <m:r>
+                        <a:rPr lang="en-US" sz="1400" b="1" i="1">
+                          <a:latin typeface="Cambria Math" panose="02040503050406030204" pitchFamily="18" charset="0"/>
+                          <a:ea typeface="Calibri" panose="020F0502020204030204" pitchFamily="34" charset="0"/>
+                          <a:cs typeface="Calibri" panose="020F0502020204030204" pitchFamily="34" charset="0"/>
+                        </a:rPr>
+                        <m:t>𝒕𝒓𝒖𝒍𝒚</m:t>
+                      </m:r>
+                      <m:r>
+                        <a:rPr lang="en-US" sz="1400" b="1" i="1">
+                          <a:latin typeface="Cambria Math" panose="02040503050406030204" pitchFamily="18" charset="0"/>
+                          <a:ea typeface="Calibri" panose="020F0502020204030204" pitchFamily="34" charset="0"/>
+                          <a:cs typeface="Calibri" panose="020F0502020204030204" pitchFamily="34" charset="0"/>
+                        </a:rPr>
+                        <m:t> </m:t>
+                      </m:r>
+                      <m:r>
+                        <a:rPr lang="en-US" sz="1400" b="1" i="1">
+                          <a:latin typeface="Cambria Math" panose="02040503050406030204" pitchFamily="18" charset="0"/>
+                          <a:ea typeface="Calibri" panose="020F0502020204030204" pitchFamily="34" charset="0"/>
+                          <a:cs typeface="Calibri" panose="020F0502020204030204" pitchFamily="34" charset="0"/>
+                        </a:rPr>
+                        <m:t>𝒑𝒐𝒔𝒊𝒕𝒊𝒗𝒆</m:t>
+                      </m:r>
+                    </m:oMath>
+                  </m:oMathPara>
+                </a14:m>
+                <a:endParaRPr lang="en-US" sz="1400" b="1" i="1" dirty="0">
+                  <a:latin typeface="Cambria Math" panose="02040503050406030204" pitchFamily="18" charset="0"/>
+                  <a:ea typeface="Calibri" panose="020F0502020204030204" pitchFamily="34" charset="0"/>
+                  <a:cs typeface="Calibri" panose="020F0502020204030204" pitchFamily="34" charset="0"/>
+                </a:endParaRPr>
+              </a:p>
+              <a:p>
+                <a:pPr>
+                  <a:lnSpc>
+                    <a:spcPct val="107000"/>
+                  </a:lnSpc>
+                  <a:spcAft>
+                    <a:spcPts val="800"/>
+                  </a:spcAft>
+                </a:pPr>
+                <a14:m>
+                  <m:oMath xmlns:m="http://schemas.openxmlformats.org/officeDocument/2006/math">
+                    <m:r>
+                      <a:rPr lang="en-US" sz="1400" b="1" i="1">
+                        <a:latin typeface="Cambria Math" panose="02040503050406030204" pitchFamily="18" charset="0"/>
+                        <a:ea typeface="Calibri" panose="020F0502020204030204" pitchFamily="34" charset="0"/>
+                        <a:cs typeface="Calibri" panose="020F0502020204030204" pitchFamily="34" charset="0"/>
+                      </a:rPr>
+                      <m:t>𝑺𝒑𝒆𝒄𝒊𝒇𝒊𝒄𝒊𝒕𝒚</m:t>
+                    </m:r>
+                    <m:r>
+                      <a:rPr lang="en-US" sz="1400" i="1">
+                        <a:latin typeface="Cambria Math" panose="02040503050406030204" pitchFamily="18" charset="0"/>
+                        <a:ea typeface="Calibri" panose="020F0502020204030204" pitchFamily="34" charset="0"/>
+                        <a:cs typeface="Calibri" panose="020F0502020204030204" pitchFamily="34" charset="0"/>
+                      </a:rPr>
+                      <m:t>=</m:t>
+                    </m:r>
+                    <m:r>
+                      <a:rPr lang="en-US" sz="1400" b="0" i="1" smtClean="0">
+                        <a:latin typeface="Cambria Math" panose="02040503050406030204" pitchFamily="18" charset="0"/>
+                        <a:ea typeface="Calibri" panose="020F0502020204030204" pitchFamily="34" charset="0"/>
+                        <a:cs typeface="Calibri" panose="020F0502020204030204" pitchFamily="34" charset="0"/>
+                      </a:rPr>
+                      <m:t>1</m:t>
+                    </m:r>
+                  </m:oMath>
+                </a14:m>
+                <a:r>
+                  <a:rPr lang="en-US" sz="1400" dirty="0" smtClean="0">
+                    <a:effectLst/>
+                    <a:latin typeface="Calibri" panose="020F0502020204030204" pitchFamily="34" charset="0"/>
+                    <a:ea typeface="Calibri" panose="020F0502020204030204" pitchFamily="34" charset="0"/>
+                    <a:cs typeface="Times New Roman" panose="02020603050405020304" pitchFamily="18" charset="0"/>
+                  </a:rPr>
+                  <a:t> </a:t>
+                </a:r>
+                <a14:m>
+                  <m:oMath xmlns:m="http://schemas.openxmlformats.org/officeDocument/2006/math">
+                    <m:r>
+                      <a:rPr lang="en-US" sz="1400" b="1" i="1">
+                        <a:latin typeface="Cambria Math" panose="02040503050406030204" pitchFamily="18" charset="0"/>
+                        <a:ea typeface="Calibri" panose="020F0502020204030204" pitchFamily="34" charset="0"/>
+                        <a:cs typeface="Calibri" panose="020F0502020204030204" pitchFamily="34" charset="0"/>
+                      </a:rPr>
+                      <m:t>→</m:t>
+                    </m:r>
+                    <m:r>
+                      <a:rPr lang="en-US" sz="1400" b="1" i="1">
+                        <a:latin typeface="Cambria Math" panose="02040503050406030204" pitchFamily="18" charset="0"/>
+                        <a:ea typeface="Calibri" panose="020F0502020204030204" pitchFamily="34" charset="0"/>
+                        <a:cs typeface="Calibri" panose="020F0502020204030204" pitchFamily="34" charset="0"/>
+                      </a:rPr>
+                      <m:t>𝑨𝒍𝒍</m:t>
+                    </m:r>
+                    <m:r>
+                      <a:rPr lang="en-US" sz="1400" b="1" i="1">
+                        <a:latin typeface="Cambria Math" panose="02040503050406030204" pitchFamily="18" charset="0"/>
+                        <a:ea typeface="Calibri" panose="020F0502020204030204" pitchFamily="34" charset="0"/>
+                        <a:cs typeface="Calibri" panose="020F0502020204030204" pitchFamily="34" charset="0"/>
+                      </a:rPr>
+                      <m:t> </m:t>
+                    </m:r>
+                    <m:r>
+                      <a:rPr lang="en-US" sz="1400" b="1" i="1">
+                        <a:latin typeface="Cambria Math" panose="02040503050406030204" pitchFamily="18" charset="0"/>
+                        <a:ea typeface="Calibri" panose="020F0502020204030204" pitchFamily="34" charset="0"/>
+                        <a:cs typeface="Calibri" panose="020F0502020204030204" pitchFamily="34" charset="0"/>
+                      </a:rPr>
+                      <m:t>𝒑𝒓𝒆𝒅𝒊𝒄𝒕𝒆𝒅</m:t>
+                    </m:r>
+                    <m:r>
+                      <a:rPr lang="en-US" sz="1400" b="1" i="1" smtClean="0">
+                        <a:latin typeface="Cambria Math" panose="02040503050406030204" pitchFamily="18" charset="0"/>
+                        <a:ea typeface="Calibri" panose="020F0502020204030204" pitchFamily="34" charset="0"/>
+                        <a:cs typeface="Calibri" panose="020F0502020204030204" pitchFamily="34" charset="0"/>
+                      </a:rPr>
+                      <m:t> </m:t>
+                    </m:r>
+                    <m:r>
+                      <a:rPr lang="en-US" sz="1400" b="1" i="1" smtClean="0">
+                        <a:latin typeface="Cambria Math" panose="02040503050406030204" pitchFamily="18" charset="0"/>
+                        <a:ea typeface="Calibri" panose="020F0502020204030204" pitchFamily="34" charset="0"/>
+                        <a:cs typeface="Calibri" panose="020F0502020204030204" pitchFamily="34" charset="0"/>
+                      </a:rPr>
+                      <m:t>𝒏𝒆𝒈𝒂𝒕𝒊𝒗𝒆</m:t>
+                    </m:r>
+                    <m:r>
+                      <a:rPr lang="en-US" sz="1400" b="1" i="1" smtClean="0">
+                        <a:latin typeface="Cambria Math" panose="02040503050406030204" pitchFamily="18" charset="0"/>
+                        <a:ea typeface="Calibri" panose="020F0502020204030204" pitchFamily="34" charset="0"/>
+                        <a:cs typeface="Calibri" panose="020F0502020204030204" pitchFamily="34" charset="0"/>
+                      </a:rPr>
+                      <m:t> </m:t>
+                    </m:r>
+                    <m:r>
+                      <a:rPr lang="en-US" sz="1400" b="1" i="1">
+                        <a:latin typeface="Cambria Math" panose="02040503050406030204" pitchFamily="18" charset="0"/>
+                        <a:ea typeface="Calibri" panose="020F0502020204030204" pitchFamily="34" charset="0"/>
+                        <a:cs typeface="Calibri" panose="020F0502020204030204" pitchFamily="34" charset="0"/>
+                      </a:rPr>
+                      <m:t>𝒂𝒓𝒆</m:t>
+                    </m:r>
+                    <m:r>
+                      <a:rPr lang="en-US" sz="1400" b="1" i="1">
+                        <a:latin typeface="Cambria Math" panose="02040503050406030204" pitchFamily="18" charset="0"/>
+                        <a:ea typeface="Calibri" panose="020F0502020204030204" pitchFamily="34" charset="0"/>
+                        <a:cs typeface="Calibri" panose="020F0502020204030204" pitchFamily="34" charset="0"/>
+                      </a:rPr>
+                      <m:t> </m:t>
+                    </m:r>
+                    <m:r>
+                      <a:rPr lang="en-US" sz="1400" b="1" i="1">
+                        <a:latin typeface="Cambria Math" panose="02040503050406030204" pitchFamily="18" charset="0"/>
+                        <a:ea typeface="Calibri" panose="020F0502020204030204" pitchFamily="34" charset="0"/>
+                        <a:cs typeface="Calibri" panose="020F0502020204030204" pitchFamily="34" charset="0"/>
+                      </a:rPr>
+                      <m:t>𝒕𝒓𝒖𝒍𝒚</m:t>
+                    </m:r>
+                    <m:r>
+                      <a:rPr lang="en-US" sz="1400" b="1" i="1">
+                        <a:latin typeface="Cambria Math" panose="02040503050406030204" pitchFamily="18" charset="0"/>
+                        <a:ea typeface="Calibri" panose="020F0502020204030204" pitchFamily="34" charset="0"/>
+                        <a:cs typeface="Calibri" panose="020F0502020204030204" pitchFamily="34" charset="0"/>
+                      </a:rPr>
+                      <m:t> </m:t>
+                    </m:r>
+                    <m:r>
+                      <a:rPr lang="en-US" sz="1400" b="1" i="1" smtClean="0">
+                        <a:latin typeface="Cambria Math" panose="02040503050406030204" pitchFamily="18" charset="0"/>
+                        <a:ea typeface="Calibri" panose="020F0502020204030204" pitchFamily="34" charset="0"/>
+                        <a:cs typeface="Calibri" panose="020F0502020204030204" pitchFamily="34" charset="0"/>
+                      </a:rPr>
+                      <m:t>𝒏𝒆𝒈𝒂</m:t>
+                    </m:r>
+                    <m:r>
+                      <a:rPr lang="en-US" sz="1400" b="1" i="1">
+                        <a:latin typeface="Cambria Math" panose="02040503050406030204" pitchFamily="18" charset="0"/>
+                        <a:ea typeface="Calibri" panose="020F0502020204030204" pitchFamily="34" charset="0"/>
+                        <a:cs typeface="Calibri" panose="020F0502020204030204" pitchFamily="34" charset="0"/>
+                      </a:rPr>
+                      <m:t>𝒕𝒊𝒗𝒆</m:t>
+                    </m:r>
+                  </m:oMath>
+                </a14:m>
+                <a:endParaRPr lang="en-US" sz="1400" dirty="0" smtClean="0">
+                  <a:effectLst/>
+                  <a:latin typeface="Calibri" panose="020F0502020204030204" pitchFamily="34" charset="0"/>
+                  <a:ea typeface="Calibri" panose="020F0502020204030204" pitchFamily="34" charset="0"/>
+                  <a:cs typeface="Times New Roman" panose="02020603050405020304" pitchFamily="18" charset="0"/>
+                </a:endParaRPr>
+              </a:p>
+              <a:p>
+                <a:pPr>
+                  <a:lnSpc>
+                    <a:spcPct val="107000"/>
+                  </a:lnSpc>
+                  <a:spcAft>
+                    <a:spcPts val="800"/>
+                  </a:spcAft>
+                </a:pPr>
+                <a14:m>
+                  <m:oMathPara xmlns:m="http://schemas.openxmlformats.org/officeDocument/2006/math">
+                    <m:oMathParaPr>
+                      <m:jc m:val="left"/>
+                    </m:oMathParaPr>
+                    <m:oMath xmlns:m="http://schemas.openxmlformats.org/officeDocument/2006/math">
+                      <m:r>
+                        <a:rPr lang="en-US" sz="1400" b="1" i="1">
+                          <a:effectLst/>
+                          <a:latin typeface="Cambria Math" panose="02040503050406030204" pitchFamily="18" charset="0"/>
+                          <a:ea typeface="Calibri" panose="020F0502020204030204" pitchFamily="34" charset="0"/>
+                          <a:cs typeface="Calibri" panose="020F0502020204030204" pitchFamily="34" charset="0"/>
+                        </a:rPr>
+                        <m:t>𝑨𝒄𝒄𝒖𝒓𝒂𝒄𝒚</m:t>
+                      </m:r>
+                      <m:r>
+                        <a:rPr lang="en-US" sz="1400">
+                          <a:latin typeface="Cambria Math" panose="02040503050406030204" pitchFamily="18" charset="0"/>
+                        </a:rPr>
+                        <m:t>≈</m:t>
+                      </m:r>
+                      <m:r>
+                        <a:rPr lang="en-US" sz="1400" b="0" i="1" smtClean="0">
+                          <a:latin typeface="Cambria Math" panose="02040503050406030204" pitchFamily="18" charset="0"/>
+                        </a:rPr>
+                        <m:t> .94</m:t>
+                      </m:r>
+                      <m:r>
+                        <a:rPr lang="en-US" sz="1400" b="0" i="1" smtClean="0">
+                          <a:effectLst/>
+                          <a:latin typeface="Cambria Math" panose="02040503050406030204" pitchFamily="18" charset="0"/>
+                          <a:ea typeface="Calibri" panose="020F0502020204030204" pitchFamily="34" charset="0"/>
+                          <a:cs typeface="Calibri" panose="020F0502020204030204" pitchFamily="34" charset="0"/>
+                        </a:rPr>
+                        <m:t>→</m:t>
+                      </m:r>
+                      <m:r>
+                        <a:rPr lang="en-US" sz="1400" b="1" i="1" smtClean="0">
+                          <a:effectLst/>
+                          <a:latin typeface="Cambria Math" panose="02040503050406030204" pitchFamily="18" charset="0"/>
+                          <a:ea typeface="Calibri" panose="020F0502020204030204" pitchFamily="34" charset="0"/>
+                          <a:cs typeface="Calibri" panose="020F0502020204030204" pitchFamily="34" charset="0"/>
+                        </a:rPr>
+                        <m:t>𝑴𝒐𝒔𝒕</m:t>
+                      </m:r>
+                      <m:r>
+                        <a:rPr lang="en-US" sz="1400" b="1" i="1" smtClean="0">
+                          <a:effectLst/>
+                          <a:latin typeface="Cambria Math" panose="02040503050406030204" pitchFamily="18" charset="0"/>
+                          <a:ea typeface="Calibri" panose="020F0502020204030204" pitchFamily="34" charset="0"/>
+                          <a:cs typeface="Calibri" panose="020F0502020204030204" pitchFamily="34" charset="0"/>
+                        </a:rPr>
+                        <m:t> </m:t>
+                      </m:r>
+                      <m:r>
+                        <a:rPr lang="en-US" sz="1400" b="1" i="1" smtClean="0">
+                          <a:effectLst/>
+                          <a:latin typeface="Cambria Math" panose="02040503050406030204" pitchFamily="18" charset="0"/>
+                          <a:ea typeface="Calibri" panose="020F0502020204030204" pitchFamily="34" charset="0"/>
+                          <a:cs typeface="Calibri" panose="020F0502020204030204" pitchFamily="34" charset="0"/>
+                        </a:rPr>
+                        <m:t>𝒑𝒓𝒆𝒅𝒊𝒄𝒕𝒊𝒐𝒏𝒔</m:t>
+                      </m:r>
+                      <m:r>
+                        <a:rPr lang="en-US" sz="1400" b="1" i="1" smtClean="0">
+                          <a:effectLst/>
+                          <a:latin typeface="Cambria Math" panose="02040503050406030204" pitchFamily="18" charset="0"/>
+                          <a:ea typeface="Calibri" panose="020F0502020204030204" pitchFamily="34" charset="0"/>
+                          <a:cs typeface="Calibri" panose="020F0502020204030204" pitchFamily="34" charset="0"/>
+                        </a:rPr>
+                        <m:t> </m:t>
+                      </m:r>
+                      <m:r>
+                        <a:rPr lang="en-US" sz="1400" b="1" i="1" smtClean="0">
+                          <a:effectLst/>
+                          <a:latin typeface="Cambria Math" panose="02040503050406030204" pitchFamily="18" charset="0"/>
+                          <a:ea typeface="Calibri" panose="020F0502020204030204" pitchFamily="34" charset="0"/>
+                          <a:cs typeface="Calibri" panose="020F0502020204030204" pitchFamily="34" charset="0"/>
+                        </a:rPr>
+                        <m:t>𝒂𝒓𝒆</m:t>
+                      </m:r>
+                      <m:r>
+                        <a:rPr lang="en-US" sz="1400" b="1" i="1" smtClean="0">
+                          <a:effectLst/>
+                          <a:latin typeface="Cambria Math" panose="02040503050406030204" pitchFamily="18" charset="0"/>
+                          <a:ea typeface="Calibri" panose="020F0502020204030204" pitchFamily="34" charset="0"/>
+                          <a:cs typeface="Calibri" panose="020F0502020204030204" pitchFamily="34" charset="0"/>
+                        </a:rPr>
+                        <m:t> </m:t>
+                      </m:r>
+                      <m:r>
+                        <a:rPr lang="en-US" sz="1400" b="1" i="1" smtClean="0">
+                          <a:effectLst/>
+                          <a:latin typeface="Cambria Math" panose="02040503050406030204" pitchFamily="18" charset="0"/>
+                          <a:ea typeface="Calibri" panose="020F0502020204030204" pitchFamily="34" charset="0"/>
+                          <a:cs typeface="Calibri" panose="020F0502020204030204" pitchFamily="34" charset="0"/>
+                        </a:rPr>
+                        <m:t>𝒄𝒐𝒓𝒓𝒆𝒄𝒕</m:t>
+                      </m:r>
+                    </m:oMath>
+                  </m:oMathPara>
+                </a14:m>
+                <a:endParaRPr lang="en-US" sz="1400" b="1" dirty="0" smtClean="0">
+                  <a:effectLst/>
+                  <a:latin typeface="Calibri" panose="020F0502020204030204" pitchFamily="34" charset="0"/>
+                  <a:ea typeface="Calibri" panose="020F0502020204030204" pitchFamily="34" charset="0"/>
+                  <a:cs typeface="Times New Roman" panose="02020603050405020304" pitchFamily="18" charset="0"/>
+                </a:endParaRPr>
+              </a:p>
+              <a:p>
+                <a:pPr>
+                  <a:lnSpc>
+                    <a:spcPct val="107000"/>
+                  </a:lnSpc>
+                  <a:spcAft>
+                    <a:spcPts val="800"/>
+                  </a:spcAft>
+                </a:pPr>
+                <a14:m>
+                  <m:oMathPara xmlns:m="http://schemas.openxmlformats.org/officeDocument/2006/math">
+                    <m:oMathParaPr>
+                      <m:jc m:val="left"/>
+                    </m:oMathParaPr>
+                    <m:oMath xmlns:m="http://schemas.openxmlformats.org/officeDocument/2006/math">
+                      <m:r>
+                        <a:rPr lang="en-US" sz="1400" b="1" i="1">
+                          <a:latin typeface="Cambria Math" panose="02040503050406030204" pitchFamily="18" charset="0"/>
+                        </a:rPr>
+                        <m:t>𝑭</m:t>
+                      </m:r>
+                      <m:r>
+                        <a:rPr lang="en-US" sz="1400" b="1" i="1">
+                          <a:latin typeface="Cambria Math" panose="02040503050406030204" pitchFamily="18" charset="0"/>
+                        </a:rPr>
+                        <m:t>𝟏</m:t>
+                      </m:r>
+                      <m:r>
+                        <a:rPr lang="en-US" sz="1400">
+                          <a:latin typeface="Cambria Math" panose="02040503050406030204" pitchFamily="18" charset="0"/>
+                        </a:rPr>
+                        <m:t>≈</m:t>
+                      </m:r>
+                      <m:r>
+                        <a:rPr lang="en-US" sz="1400" b="0" i="0" smtClean="0">
+                          <a:latin typeface="Cambria Math" panose="02040503050406030204" pitchFamily="18" charset="0"/>
+                        </a:rPr>
+                        <m:t>0.92</m:t>
+                      </m:r>
+                      <m:r>
+                        <a:rPr lang="en-US" sz="1400">
+                          <a:latin typeface="Cambria Math" panose="02040503050406030204" pitchFamily="18" charset="0"/>
+                        </a:rPr>
+                        <m:t> →</m:t>
+                      </m:r>
+                      <m:r>
+                        <a:rPr lang="en-US" sz="1400" b="1">
+                          <a:latin typeface="Cambria Math" panose="02040503050406030204" pitchFamily="18" charset="0"/>
+                        </a:rPr>
+                        <m:t>𝐓𝐡𝐞𝐫𝐞</m:t>
+                      </m:r>
+                      <m:r>
+                        <a:rPr lang="en-US" sz="1400" b="1">
+                          <a:latin typeface="Cambria Math" panose="02040503050406030204" pitchFamily="18" charset="0"/>
+                        </a:rPr>
+                        <m:t> </m:t>
+                      </m:r>
+                      <m:r>
+                        <a:rPr lang="en-US" sz="1400" b="1">
+                          <a:latin typeface="Cambria Math" panose="02040503050406030204" pitchFamily="18" charset="0"/>
+                        </a:rPr>
+                        <m:t>𝐰𝐞𝐫𝐞</m:t>
+                      </m:r>
+                      <m:r>
+                        <a:rPr lang="en-US" sz="1400" b="1">
+                          <a:latin typeface="Cambria Math" panose="02040503050406030204" pitchFamily="18" charset="0"/>
+                        </a:rPr>
+                        <m:t> </m:t>
+                      </m:r>
+                      <m:r>
+                        <a:rPr lang="en-US" sz="1400" b="1" i="0" smtClean="0">
+                          <a:latin typeface="Cambria Math" panose="02040503050406030204" pitchFamily="18" charset="0"/>
+                        </a:rPr>
+                        <m:t>𝐯𝐞𝐫𝐲</m:t>
+                      </m:r>
+                      <m:r>
+                        <a:rPr lang="en-US" sz="1400" b="1" i="0" smtClean="0">
+                          <a:latin typeface="Cambria Math" panose="02040503050406030204" pitchFamily="18" charset="0"/>
+                        </a:rPr>
+                        <m:t> </m:t>
+                      </m:r>
+                      <m:r>
+                        <a:rPr lang="en-US" sz="1400" b="1" i="0" smtClean="0">
+                          <a:latin typeface="Cambria Math" panose="02040503050406030204" pitchFamily="18" charset="0"/>
+                        </a:rPr>
+                        <m:t>𝐟𝐞𝐰</m:t>
+                      </m:r>
+                      <m:r>
+                        <a:rPr lang="en-US" sz="1400" b="1">
+                          <a:latin typeface="Cambria Math" panose="02040503050406030204" pitchFamily="18" charset="0"/>
+                        </a:rPr>
+                        <m:t> </m:t>
+                      </m:r>
+                      <m:r>
+                        <a:rPr lang="en-US" sz="1400" b="1">
+                          <a:latin typeface="Cambria Math" panose="02040503050406030204" pitchFamily="18" charset="0"/>
+                        </a:rPr>
+                        <m:t>𝐟𝐚𝐥𝐬𝐞</m:t>
+                      </m:r>
+                      <m:r>
+                        <a:rPr lang="en-US" sz="1400" b="1">
+                          <a:latin typeface="Cambria Math" panose="02040503050406030204" pitchFamily="18" charset="0"/>
+                        </a:rPr>
+                        <m:t> </m:t>
+                      </m:r>
+                      <m:r>
+                        <a:rPr lang="en-US" sz="1400" b="1">
+                          <a:latin typeface="Cambria Math" panose="02040503050406030204" pitchFamily="18" charset="0"/>
+                        </a:rPr>
+                        <m:t>𝐩𝐨𝐬𝐢𝐭𝐢𝐯𝐞𝐬</m:t>
+                      </m:r>
+                      <m:r>
+                        <a:rPr lang="en-US" sz="1400" b="1">
+                          <a:latin typeface="Cambria Math" panose="02040503050406030204" pitchFamily="18" charset="0"/>
+                        </a:rPr>
+                        <m:t> </m:t>
+                      </m:r>
+                      <m:r>
+                        <a:rPr lang="en-US" sz="1400" b="1">
+                          <a:latin typeface="Cambria Math" panose="02040503050406030204" pitchFamily="18" charset="0"/>
+                        </a:rPr>
+                        <m:t>𝐨𝐫</m:t>
+                      </m:r>
+                      <m:r>
+                        <a:rPr lang="en-US" sz="1400" b="1">
+                          <a:latin typeface="Cambria Math" panose="02040503050406030204" pitchFamily="18" charset="0"/>
+                        </a:rPr>
+                        <m:t> </m:t>
+                      </m:r>
+                      <m:r>
+                        <a:rPr lang="en-US" sz="1400" b="1">
+                          <a:latin typeface="Cambria Math" panose="02040503050406030204" pitchFamily="18" charset="0"/>
+                        </a:rPr>
+                        <m:t>𝐟𝐚𝐥𝐬𝐞</m:t>
+                      </m:r>
+                      <m:r>
+                        <a:rPr lang="en-US" sz="1400" b="1">
+                          <a:latin typeface="Cambria Math" panose="02040503050406030204" pitchFamily="18" charset="0"/>
+                        </a:rPr>
+                        <m:t> </m:t>
+                      </m:r>
+                      <m:r>
+                        <a:rPr lang="en-US" sz="1400" b="1">
+                          <a:latin typeface="Cambria Math" panose="02040503050406030204" pitchFamily="18" charset="0"/>
+                        </a:rPr>
+                        <m:t>𝐧𝐞𝐠𝐚𝐭𝐢𝐯𝐞𝐬</m:t>
+                      </m:r>
+                    </m:oMath>
+                  </m:oMathPara>
+                </a14:m>
+                <a:endParaRPr lang="en-US" sz="1400" b="1" dirty="0"/>
+              </a:p>
+              <a:p>
+                <a:pPr>
+                  <a:lnSpc>
+                    <a:spcPct val="107000"/>
+                  </a:lnSpc>
+                  <a:spcAft>
+                    <a:spcPts val="800"/>
+                  </a:spcAft>
+                </a:pPr>
+                <a:r>
+                  <a:rPr lang="en-US" sz="1400" b="1" dirty="0" smtClean="0"/>
+                  <a:t> AUC </a:t>
+                </a:r>
+                <a:r>
+                  <a:rPr lang="en-US" sz="1400" b="1" dirty="0" smtClean="0"/>
+                  <a:t>&gt; 0.96 -&gt; </a:t>
+                </a:r>
+                <a:r>
+                  <a:rPr lang="en-US" sz="1400" b="1" dirty="0" smtClean="0"/>
+                  <a:t>The model is </a:t>
+                </a:r>
+                <a:r>
+                  <a:rPr lang="en-US" sz="1400" b="1" dirty="0" smtClean="0"/>
+                  <a:t>classifying very well</a:t>
+                </a:r>
+                <a:endParaRPr lang="en-US" sz="1400" b="1" dirty="0" smtClean="0"/>
+              </a:p>
+              <a:p>
+                <a:pPr>
+                  <a:lnSpc>
+                    <a:spcPct val="107000"/>
+                  </a:lnSpc>
+                  <a:spcAft>
+                    <a:spcPts val="800"/>
+                  </a:spcAft>
+                </a:pPr>
+                <a:endParaRPr lang="en-US" sz="1600" dirty="0">
+                  <a:effectLst/>
+                  <a:latin typeface="Calibri" panose="020F0502020204030204" pitchFamily="34" charset="0"/>
+                  <a:ea typeface="Calibri" panose="020F0502020204030204" pitchFamily="34" charset="0"/>
+                  <a:cs typeface="Times New Roman" panose="02020603050405020304" pitchFamily="18" charset="0"/>
+                </a:endParaRPr>
+              </a:p>
+            </p:txBody>
+          </p:sp>
+        </mc:Choice>
+        <mc:Fallback>
+          <p:sp>
+            <p:nvSpPr>
+              <p:cNvPr id="11" name="Rectangle 10"/>
+              <p:cNvSpPr>
+                <a:spLocks noRot="1" noChangeAspect="1" noMove="1" noResize="1" noEditPoints="1" noAdjustHandles="1" noChangeArrowheads="1" noChangeShapeType="1" noTextEdit="1"/>
+              </p:cNvSpPr>
+              <p:nvPr/>
+            </p:nvSpPr>
+            <p:spPr>
+              <a:xfrm>
+                <a:off x="6254311" y="5147742"/>
+                <a:ext cx="8165653" cy="2009589"/>
+              </a:xfrm>
+              <a:prstGeom prst="rect">
+                <a:avLst/>
+              </a:prstGeom>
+              <a:blipFill>
+                <a:blip r:embed="rId3"/>
+                <a:stretch>
+                  <a:fillRect/>
+                </a:stretch>
+              </a:blipFill>
+            </p:spPr>
+            <p:txBody>
+              <a:bodyPr/>
+              <a:lstStyle/>
+              <a:p>
+                <a:r>
+                  <a:rPr lang="en-US">
+                    <a:noFill/>
+                  </a:rPr>
+                  <a:t> </a:t>
+                </a:r>
+              </a:p>
+            </p:txBody>
+          </p:sp>
+        </mc:Fallback>
+      </mc:AlternateContent>
+      <mc:AlternateContent xmlns:mc="http://schemas.openxmlformats.org/markup-compatibility/2006">
+        <mc:Choice xmlns:a14="http://schemas.microsoft.com/office/drawing/2010/main" Requires="a14">
+          <p:sp>
+            <p:nvSpPr>
+              <p:cNvPr id="16" name="Rectangle 15"/>
+              <p:cNvSpPr/>
+              <p:nvPr/>
+            </p:nvSpPr>
+            <p:spPr>
+              <a:xfrm>
+                <a:off x="132347" y="5279686"/>
+                <a:ext cx="5920152" cy="2009589"/>
+              </a:xfrm>
+              <a:prstGeom prst="rect">
+                <a:avLst/>
+              </a:prstGeom>
+            </p:spPr>
+            <p:txBody>
+              <a:bodyPr wrap="square">
+                <a:spAutoFit/>
+              </a:bodyPr>
+              <a:lstStyle/>
+              <a:p>
+                <a:pPr algn="ctr">
+                  <a:lnSpc>
+                    <a:spcPct val="107000"/>
+                  </a:lnSpc>
+                  <a:spcAft>
+                    <a:spcPts val="800"/>
+                  </a:spcAft>
+                </a:pPr>
+                <a14:m>
+                  <m:oMathPara xmlns:m="http://schemas.openxmlformats.org/officeDocument/2006/math">
+                    <m:oMathParaPr>
+                      <m:jc m:val="center"/>
+                    </m:oMathParaPr>
+                    <m:oMath xmlns:m="http://schemas.openxmlformats.org/officeDocument/2006/math">
+                      <m:r>
+                        <a:rPr lang="en-US" sz="1400" b="1" i="1" smtClean="0">
+                          <a:latin typeface="Cambria Math" panose="02040503050406030204" pitchFamily="18" charset="0"/>
+                          <a:ea typeface="Calibri" panose="020F0502020204030204" pitchFamily="34" charset="0"/>
+                          <a:cs typeface="Calibri" panose="020F0502020204030204" pitchFamily="34" charset="0"/>
+                        </a:rPr>
+                        <m:t>𝑺𝒆𝒏𝒔𝒊𝒕𝒊𝒗𝒊𝒕𝒚</m:t>
+                      </m:r>
+                      <m:r>
+                        <a:rPr lang="en-US" sz="1400" b="0" i="0" smtClean="0">
+                          <a:latin typeface="Cambria Math" panose="02040503050406030204" pitchFamily="18" charset="0"/>
+                          <a:ea typeface="Calibri" panose="020F0502020204030204" pitchFamily="34" charset="0"/>
+                          <a:cs typeface="Calibri" panose="020F0502020204030204" pitchFamily="34" charset="0"/>
+                        </a:rPr>
+                        <m:t>=</m:t>
+                      </m:r>
+                      <m:r>
+                        <a:rPr lang="en-US" sz="1400" b="1" i="1" smtClean="0">
+                          <a:latin typeface="Cambria Math" panose="02040503050406030204" pitchFamily="18" charset="0"/>
+                        </a:rPr>
+                        <m:t>𝟏</m:t>
+                      </m:r>
+                      <m:r>
+                        <a:rPr lang="en-US" sz="1400" b="1" i="1" smtClean="0">
+                          <a:latin typeface="Cambria Math" panose="02040503050406030204" pitchFamily="18" charset="0"/>
+                          <a:ea typeface="Calibri" panose="020F0502020204030204" pitchFamily="34" charset="0"/>
+                          <a:cs typeface="Calibri" panose="020F0502020204030204" pitchFamily="34" charset="0"/>
+                        </a:rPr>
+                        <m:t> →</m:t>
+                      </m:r>
+                      <m:r>
+                        <a:rPr lang="en-US" sz="1400" b="1" i="1" smtClean="0">
+                          <a:latin typeface="Cambria Math" panose="02040503050406030204" pitchFamily="18" charset="0"/>
+                          <a:ea typeface="Calibri" panose="020F0502020204030204" pitchFamily="34" charset="0"/>
+                          <a:cs typeface="Calibri" panose="020F0502020204030204" pitchFamily="34" charset="0"/>
+                        </a:rPr>
+                        <m:t>𝑨𝒍𝒍</m:t>
+                      </m:r>
+                      <m:r>
+                        <a:rPr lang="en-US" sz="1400" b="1" i="1" smtClean="0">
+                          <a:latin typeface="Cambria Math" panose="02040503050406030204" pitchFamily="18" charset="0"/>
+                          <a:ea typeface="Calibri" panose="020F0502020204030204" pitchFamily="34" charset="0"/>
+                          <a:cs typeface="Calibri" panose="020F0502020204030204" pitchFamily="34" charset="0"/>
+                        </a:rPr>
+                        <m:t> </m:t>
+                      </m:r>
+                      <m:r>
+                        <a:rPr lang="en-US" sz="1400" b="1" i="1">
+                          <a:latin typeface="Cambria Math" panose="02040503050406030204" pitchFamily="18" charset="0"/>
+                          <a:ea typeface="Calibri" panose="020F0502020204030204" pitchFamily="34" charset="0"/>
+                          <a:cs typeface="Calibri" panose="020F0502020204030204" pitchFamily="34" charset="0"/>
+                        </a:rPr>
+                        <m:t>𝒑𝒓𝒆𝒅𝒊𝒄𝒕𝒆𝒅</m:t>
+                      </m:r>
+                      <m:r>
+                        <a:rPr lang="en-US" sz="1400" b="1" i="1">
+                          <a:latin typeface="Cambria Math" panose="02040503050406030204" pitchFamily="18" charset="0"/>
+                          <a:ea typeface="Calibri" panose="020F0502020204030204" pitchFamily="34" charset="0"/>
+                          <a:cs typeface="Calibri" panose="020F0502020204030204" pitchFamily="34" charset="0"/>
+                        </a:rPr>
+                        <m:t> </m:t>
+                      </m:r>
+                      <m:r>
+                        <a:rPr lang="en-US" sz="1400" b="1" i="1">
+                          <a:latin typeface="Cambria Math" panose="02040503050406030204" pitchFamily="18" charset="0"/>
+                          <a:ea typeface="Calibri" panose="020F0502020204030204" pitchFamily="34" charset="0"/>
+                          <a:cs typeface="Calibri" panose="020F0502020204030204" pitchFamily="34" charset="0"/>
+                        </a:rPr>
+                        <m:t>𝒑𝒐𝒔𝒊𝒕𝒊𝒗𝒆</m:t>
+                      </m:r>
+                      <m:r>
+                        <a:rPr lang="en-US" sz="1400" b="1" i="1">
+                          <a:latin typeface="Cambria Math" panose="02040503050406030204" pitchFamily="18" charset="0"/>
+                          <a:ea typeface="Calibri" panose="020F0502020204030204" pitchFamily="34" charset="0"/>
+                          <a:cs typeface="Calibri" panose="020F0502020204030204" pitchFamily="34" charset="0"/>
+                        </a:rPr>
+                        <m:t> </m:t>
+                      </m:r>
+                      <m:r>
+                        <a:rPr lang="en-US" sz="1400" b="1" i="1">
+                          <a:latin typeface="Cambria Math" panose="02040503050406030204" pitchFamily="18" charset="0"/>
+                          <a:ea typeface="Calibri" panose="020F0502020204030204" pitchFamily="34" charset="0"/>
+                          <a:cs typeface="Calibri" panose="020F0502020204030204" pitchFamily="34" charset="0"/>
+                        </a:rPr>
+                        <m:t>𝒂𝒓𝒆</m:t>
+                      </m:r>
+                      <m:r>
+                        <a:rPr lang="en-US" sz="1400" b="1" i="1">
+                          <a:latin typeface="Cambria Math" panose="02040503050406030204" pitchFamily="18" charset="0"/>
+                          <a:ea typeface="Calibri" panose="020F0502020204030204" pitchFamily="34" charset="0"/>
+                          <a:cs typeface="Calibri" panose="020F0502020204030204" pitchFamily="34" charset="0"/>
+                        </a:rPr>
+                        <m:t> </m:t>
+                      </m:r>
+                      <m:r>
+                        <a:rPr lang="en-US" sz="1400" b="1" i="1">
+                          <a:latin typeface="Cambria Math" panose="02040503050406030204" pitchFamily="18" charset="0"/>
+                          <a:ea typeface="Calibri" panose="020F0502020204030204" pitchFamily="34" charset="0"/>
+                          <a:cs typeface="Calibri" panose="020F0502020204030204" pitchFamily="34" charset="0"/>
+                        </a:rPr>
+                        <m:t>𝒕𝒓𝒖𝒍𝒚</m:t>
+                      </m:r>
+                      <m:r>
+                        <a:rPr lang="en-US" sz="1400" b="1" i="1">
+                          <a:latin typeface="Cambria Math" panose="02040503050406030204" pitchFamily="18" charset="0"/>
+                          <a:ea typeface="Calibri" panose="020F0502020204030204" pitchFamily="34" charset="0"/>
+                          <a:cs typeface="Calibri" panose="020F0502020204030204" pitchFamily="34" charset="0"/>
+                        </a:rPr>
+                        <m:t> </m:t>
+                      </m:r>
+                      <m:r>
+                        <a:rPr lang="en-US" sz="1400" b="1" i="1">
+                          <a:latin typeface="Cambria Math" panose="02040503050406030204" pitchFamily="18" charset="0"/>
+                          <a:ea typeface="Calibri" panose="020F0502020204030204" pitchFamily="34" charset="0"/>
+                          <a:cs typeface="Calibri" panose="020F0502020204030204" pitchFamily="34" charset="0"/>
+                        </a:rPr>
+                        <m:t>𝒑𝒐𝒔𝒊𝒕𝒊𝒗𝒆</m:t>
+                      </m:r>
+                    </m:oMath>
+                  </m:oMathPara>
+                </a14:m>
+                <a:endParaRPr lang="en-US" sz="1400" b="1" i="1" dirty="0">
+                  <a:latin typeface="Cambria Math" panose="02040503050406030204" pitchFamily="18" charset="0"/>
+                  <a:ea typeface="Calibri" panose="020F0502020204030204" pitchFamily="34" charset="0"/>
+                  <a:cs typeface="Calibri" panose="020F0502020204030204" pitchFamily="34" charset="0"/>
+                </a:endParaRPr>
+              </a:p>
+              <a:p>
+                <a:pPr algn="ctr">
+                  <a:lnSpc>
+                    <a:spcPct val="107000"/>
+                  </a:lnSpc>
+                  <a:spcAft>
+                    <a:spcPts val="800"/>
+                  </a:spcAft>
+                </a:pPr>
+                <a14:m>
+                  <m:oMath xmlns:m="http://schemas.openxmlformats.org/officeDocument/2006/math">
+                    <m:r>
+                      <a:rPr lang="en-US" sz="1400" b="1" i="1">
+                        <a:latin typeface="Cambria Math" panose="02040503050406030204" pitchFamily="18" charset="0"/>
+                        <a:ea typeface="Calibri" panose="020F0502020204030204" pitchFamily="34" charset="0"/>
+                        <a:cs typeface="Calibri" panose="020F0502020204030204" pitchFamily="34" charset="0"/>
+                      </a:rPr>
+                      <m:t>𝑺𝒑𝒆𝒄𝒊𝒇𝒊𝒄𝒊𝒕𝒚</m:t>
+                    </m:r>
+                    <m:r>
+                      <a:rPr lang="en-US" sz="1400" i="1">
+                        <a:latin typeface="Cambria Math" panose="02040503050406030204" pitchFamily="18" charset="0"/>
+                        <a:ea typeface="Calibri" panose="020F0502020204030204" pitchFamily="34" charset="0"/>
+                        <a:cs typeface="Calibri" panose="020F0502020204030204" pitchFamily="34" charset="0"/>
+                      </a:rPr>
+                      <m:t>=</m:t>
+                    </m:r>
+                    <m:r>
+                      <a:rPr lang="en-US" sz="1400" b="0" i="1" smtClean="0">
+                        <a:latin typeface="Cambria Math" panose="02040503050406030204" pitchFamily="18" charset="0"/>
+                        <a:ea typeface="Calibri" panose="020F0502020204030204" pitchFamily="34" charset="0"/>
+                        <a:cs typeface="Calibri" panose="020F0502020204030204" pitchFamily="34" charset="0"/>
+                      </a:rPr>
+                      <m:t>1</m:t>
+                    </m:r>
+                  </m:oMath>
+                </a14:m>
+                <a:r>
+                  <a:rPr lang="en-US" sz="1400" dirty="0" smtClean="0">
+                    <a:effectLst/>
+                    <a:latin typeface="Calibri" panose="020F0502020204030204" pitchFamily="34" charset="0"/>
+                    <a:ea typeface="Calibri" panose="020F0502020204030204" pitchFamily="34" charset="0"/>
+                    <a:cs typeface="Times New Roman" panose="02020603050405020304" pitchFamily="18" charset="0"/>
+                  </a:rPr>
+                  <a:t> </a:t>
+                </a:r>
+                <a14:m>
+                  <m:oMath xmlns:m="http://schemas.openxmlformats.org/officeDocument/2006/math">
+                    <m:r>
+                      <a:rPr lang="en-US" sz="1400" b="1" i="1">
+                        <a:latin typeface="Cambria Math" panose="02040503050406030204" pitchFamily="18" charset="0"/>
+                        <a:ea typeface="Calibri" panose="020F0502020204030204" pitchFamily="34" charset="0"/>
+                        <a:cs typeface="Calibri" panose="020F0502020204030204" pitchFamily="34" charset="0"/>
+                      </a:rPr>
+                      <m:t>→</m:t>
+                    </m:r>
+                    <m:r>
+                      <a:rPr lang="en-US" sz="1400" b="1" i="1">
+                        <a:latin typeface="Cambria Math" panose="02040503050406030204" pitchFamily="18" charset="0"/>
+                        <a:ea typeface="Calibri" panose="020F0502020204030204" pitchFamily="34" charset="0"/>
+                        <a:cs typeface="Calibri" panose="020F0502020204030204" pitchFamily="34" charset="0"/>
+                      </a:rPr>
+                      <m:t>𝑨𝒍𝒍</m:t>
+                    </m:r>
+                    <m:r>
+                      <a:rPr lang="en-US" sz="1400" b="1" i="1">
+                        <a:latin typeface="Cambria Math" panose="02040503050406030204" pitchFamily="18" charset="0"/>
+                        <a:ea typeface="Calibri" panose="020F0502020204030204" pitchFamily="34" charset="0"/>
+                        <a:cs typeface="Calibri" panose="020F0502020204030204" pitchFamily="34" charset="0"/>
+                      </a:rPr>
+                      <m:t> </m:t>
+                    </m:r>
+                    <m:r>
+                      <a:rPr lang="en-US" sz="1400" b="1" i="1">
+                        <a:latin typeface="Cambria Math" panose="02040503050406030204" pitchFamily="18" charset="0"/>
+                        <a:ea typeface="Calibri" panose="020F0502020204030204" pitchFamily="34" charset="0"/>
+                        <a:cs typeface="Calibri" panose="020F0502020204030204" pitchFamily="34" charset="0"/>
+                      </a:rPr>
+                      <m:t>𝒑𝒓𝒆𝒅𝒊𝒄𝒕𝒆𝒅</m:t>
+                    </m:r>
+                    <m:r>
+                      <a:rPr lang="en-US" sz="1400" b="1" i="1" smtClean="0">
+                        <a:latin typeface="Cambria Math" panose="02040503050406030204" pitchFamily="18" charset="0"/>
+                        <a:ea typeface="Calibri" panose="020F0502020204030204" pitchFamily="34" charset="0"/>
+                        <a:cs typeface="Calibri" panose="020F0502020204030204" pitchFamily="34" charset="0"/>
+                      </a:rPr>
+                      <m:t> </m:t>
+                    </m:r>
+                    <m:r>
+                      <a:rPr lang="en-US" sz="1400" b="1" i="1" smtClean="0">
+                        <a:latin typeface="Cambria Math" panose="02040503050406030204" pitchFamily="18" charset="0"/>
+                        <a:ea typeface="Calibri" panose="020F0502020204030204" pitchFamily="34" charset="0"/>
+                        <a:cs typeface="Calibri" panose="020F0502020204030204" pitchFamily="34" charset="0"/>
+                      </a:rPr>
+                      <m:t>𝒏𝒆𝒈𝒂𝒕𝒊𝒗𝒆</m:t>
+                    </m:r>
+                    <m:r>
+                      <a:rPr lang="en-US" sz="1400" b="1" i="1" smtClean="0">
+                        <a:latin typeface="Cambria Math" panose="02040503050406030204" pitchFamily="18" charset="0"/>
+                        <a:ea typeface="Calibri" panose="020F0502020204030204" pitchFamily="34" charset="0"/>
+                        <a:cs typeface="Calibri" panose="020F0502020204030204" pitchFamily="34" charset="0"/>
+                      </a:rPr>
+                      <m:t> </m:t>
+                    </m:r>
+                    <m:r>
+                      <a:rPr lang="en-US" sz="1400" b="1" i="1">
+                        <a:latin typeface="Cambria Math" panose="02040503050406030204" pitchFamily="18" charset="0"/>
+                        <a:ea typeface="Calibri" panose="020F0502020204030204" pitchFamily="34" charset="0"/>
+                        <a:cs typeface="Calibri" panose="020F0502020204030204" pitchFamily="34" charset="0"/>
+                      </a:rPr>
+                      <m:t>𝒂𝒓𝒆</m:t>
+                    </m:r>
+                    <m:r>
+                      <a:rPr lang="en-US" sz="1400" b="1" i="1">
+                        <a:latin typeface="Cambria Math" panose="02040503050406030204" pitchFamily="18" charset="0"/>
+                        <a:ea typeface="Calibri" panose="020F0502020204030204" pitchFamily="34" charset="0"/>
+                        <a:cs typeface="Calibri" panose="020F0502020204030204" pitchFamily="34" charset="0"/>
+                      </a:rPr>
+                      <m:t> </m:t>
+                    </m:r>
+                    <m:r>
+                      <a:rPr lang="en-US" sz="1400" b="1" i="1">
+                        <a:latin typeface="Cambria Math" panose="02040503050406030204" pitchFamily="18" charset="0"/>
+                        <a:ea typeface="Calibri" panose="020F0502020204030204" pitchFamily="34" charset="0"/>
+                        <a:cs typeface="Calibri" panose="020F0502020204030204" pitchFamily="34" charset="0"/>
+                      </a:rPr>
+                      <m:t>𝒕𝒓𝒖𝒍𝒚</m:t>
+                    </m:r>
+                    <m:r>
+                      <a:rPr lang="en-US" sz="1400" b="1" i="1">
+                        <a:latin typeface="Cambria Math" panose="02040503050406030204" pitchFamily="18" charset="0"/>
+                        <a:ea typeface="Calibri" panose="020F0502020204030204" pitchFamily="34" charset="0"/>
+                        <a:cs typeface="Calibri" panose="020F0502020204030204" pitchFamily="34" charset="0"/>
+                      </a:rPr>
+                      <m:t> </m:t>
+                    </m:r>
+                    <m:r>
+                      <a:rPr lang="en-US" sz="1400" b="1" i="1" smtClean="0">
+                        <a:latin typeface="Cambria Math" panose="02040503050406030204" pitchFamily="18" charset="0"/>
+                        <a:ea typeface="Calibri" panose="020F0502020204030204" pitchFamily="34" charset="0"/>
+                        <a:cs typeface="Calibri" panose="020F0502020204030204" pitchFamily="34" charset="0"/>
+                      </a:rPr>
+                      <m:t>𝒏𝒆𝒈𝒂</m:t>
+                    </m:r>
+                    <m:r>
+                      <a:rPr lang="en-US" sz="1400" b="1" i="1">
+                        <a:latin typeface="Cambria Math" panose="02040503050406030204" pitchFamily="18" charset="0"/>
+                        <a:ea typeface="Calibri" panose="020F0502020204030204" pitchFamily="34" charset="0"/>
+                        <a:cs typeface="Calibri" panose="020F0502020204030204" pitchFamily="34" charset="0"/>
+                      </a:rPr>
+                      <m:t>𝒕𝒊𝒗𝒆</m:t>
+                    </m:r>
+                  </m:oMath>
+                </a14:m>
+                <a:endParaRPr lang="en-US" sz="1400" dirty="0" smtClean="0">
+                  <a:effectLst/>
+                  <a:latin typeface="Calibri" panose="020F0502020204030204" pitchFamily="34" charset="0"/>
+                  <a:ea typeface="Calibri" panose="020F0502020204030204" pitchFamily="34" charset="0"/>
+                  <a:cs typeface="Times New Roman" panose="02020603050405020304" pitchFamily="18" charset="0"/>
+                </a:endParaRPr>
+              </a:p>
+              <a:p>
+                <a:pPr algn="ctr">
+                  <a:lnSpc>
+                    <a:spcPct val="107000"/>
+                  </a:lnSpc>
+                  <a:spcAft>
+                    <a:spcPts val="800"/>
+                  </a:spcAft>
+                </a:pPr>
+                <a14:m>
+                  <m:oMathPara xmlns:m="http://schemas.openxmlformats.org/officeDocument/2006/math">
+                    <m:oMathParaPr>
+                      <m:jc m:val="center"/>
+                    </m:oMathParaPr>
+                    <m:oMath xmlns:m="http://schemas.openxmlformats.org/officeDocument/2006/math">
+                      <m:r>
+                        <a:rPr lang="en-US" sz="1400" b="1" i="1">
+                          <a:effectLst/>
+                          <a:latin typeface="Cambria Math" panose="02040503050406030204" pitchFamily="18" charset="0"/>
+                          <a:ea typeface="Calibri" panose="020F0502020204030204" pitchFamily="34" charset="0"/>
+                          <a:cs typeface="Calibri" panose="020F0502020204030204" pitchFamily="34" charset="0"/>
+                        </a:rPr>
+                        <m:t>𝑨𝒄𝒄𝒖𝒓𝒂𝒄</m:t>
+                      </m:r>
+                      <m:r>
+                        <a:rPr lang="en-US" sz="1400" b="0" i="1" smtClean="0">
+                          <a:effectLst/>
+                          <a:latin typeface="Cambria Math" panose="02040503050406030204" pitchFamily="18" charset="0"/>
+                          <a:ea typeface="Calibri" panose="020F0502020204030204" pitchFamily="34" charset="0"/>
+                          <a:cs typeface="Calibri" panose="020F0502020204030204" pitchFamily="34" charset="0"/>
+                        </a:rPr>
+                        <m:t>𝑦</m:t>
+                      </m:r>
+                      <m:r>
+                        <a:rPr lang="en-US" sz="1400" b="0" i="1" smtClean="0">
+                          <a:effectLst/>
+                          <a:latin typeface="Cambria Math" panose="02040503050406030204" pitchFamily="18" charset="0"/>
+                          <a:ea typeface="Calibri" panose="020F0502020204030204" pitchFamily="34" charset="0"/>
+                          <a:cs typeface="Calibri" panose="020F0502020204030204" pitchFamily="34" charset="0"/>
+                        </a:rPr>
+                        <m:t>=1→</m:t>
+                      </m:r>
+                      <m:r>
+                        <a:rPr lang="en-US" sz="1400" b="1" i="1" smtClean="0">
+                          <a:effectLst/>
+                          <a:latin typeface="Cambria Math" panose="02040503050406030204" pitchFamily="18" charset="0"/>
+                          <a:ea typeface="Calibri" panose="020F0502020204030204" pitchFamily="34" charset="0"/>
+                          <a:cs typeface="Calibri" panose="020F0502020204030204" pitchFamily="34" charset="0"/>
+                        </a:rPr>
+                        <m:t>𝑨𝒍𝒍</m:t>
+                      </m:r>
+                      <m:r>
+                        <a:rPr lang="en-US" sz="1400" b="1" i="1" smtClean="0">
+                          <a:effectLst/>
+                          <a:latin typeface="Cambria Math" panose="02040503050406030204" pitchFamily="18" charset="0"/>
+                          <a:ea typeface="Calibri" panose="020F0502020204030204" pitchFamily="34" charset="0"/>
+                          <a:cs typeface="Calibri" panose="020F0502020204030204" pitchFamily="34" charset="0"/>
+                        </a:rPr>
+                        <m:t> </m:t>
+                      </m:r>
+                      <m:r>
+                        <a:rPr lang="en-US" sz="1400" b="1" i="1" smtClean="0">
+                          <a:effectLst/>
+                          <a:latin typeface="Cambria Math" panose="02040503050406030204" pitchFamily="18" charset="0"/>
+                          <a:ea typeface="Calibri" panose="020F0502020204030204" pitchFamily="34" charset="0"/>
+                          <a:cs typeface="Calibri" panose="020F0502020204030204" pitchFamily="34" charset="0"/>
+                        </a:rPr>
+                        <m:t>𝒑𝒓𝒆𝒅𝒊𝒄𝒕𝒊𝒐𝒏𝒔</m:t>
+                      </m:r>
+                      <m:r>
+                        <a:rPr lang="en-US" sz="1400" b="1" i="1" smtClean="0">
+                          <a:effectLst/>
+                          <a:latin typeface="Cambria Math" panose="02040503050406030204" pitchFamily="18" charset="0"/>
+                          <a:ea typeface="Calibri" panose="020F0502020204030204" pitchFamily="34" charset="0"/>
+                          <a:cs typeface="Calibri" panose="020F0502020204030204" pitchFamily="34" charset="0"/>
+                        </a:rPr>
+                        <m:t> </m:t>
+                      </m:r>
+                      <m:r>
+                        <a:rPr lang="en-US" sz="1400" b="1" i="1" smtClean="0">
+                          <a:effectLst/>
+                          <a:latin typeface="Cambria Math" panose="02040503050406030204" pitchFamily="18" charset="0"/>
+                          <a:ea typeface="Calibri" panose="020F0502020204030204" pitchFamily="34" charset="0"/>
+                          <a:cs typeface="Calibri" panose="020F0502020204030204" pitchFamily="34" charset="0"/>
+                        </a:rPr>
+                        <m:t>𝒂𝒓𝒆</m:t>
+                      </m:r>
+                      <m:r>
+                        <a:rPr lang="en-US" sz="1400" b="1" i="1" smtClean="0">
+                          <a:effectLst/>
+                          <a:latin typeface="Cambria Math" panose="02040503050406030204" pitchFamily="18" charset="0"/>
+                          <a:ea typeface="Calibri" panose="020F0502020204030204" pitchFamily="34" charset="0"/>
+                          <a:cs typeface="Calibri" panose="020F0502020204030204" pitchFamily="34" charset="0"/>
+                        </a:rPr>
+                        <m:t> </m:t>
+                      </m:r>
+                      <m:r>
+                        <a:rPr lang="en-US" sz="1400" b="1" i="1" smtClean="0">
+                          <a:effectLst/>
+                          <a:latin typeface="Cambria Math" panose="02040503050406030204" pitchFamily="18" charset="0"/>
+                          <a:ea typeface="Calibri" panose="020F0502020204030204" pitchFamily="34" charset="0"/>
+                          <a:cs typeface="Calibri" panose="020F0502020204030204" pitchFamily="34" charset="0"/>
+                        </a:rPr>
+                        <m:t>𝒄𝒐𝒓𝒓𝒆𝒄𝒕</m:t>
+                      </m:r>
+                    </m:oMath>
+                  </m:oMathPara>
+                </a14:m>
+                <a:endParaRPr lang="en-US" sz="1400" b="1" dirty="0" smtClean="0">
+                  <a:effectLst/>
+                  <a:latin typeface="Calibri" panose="020F0502020204030204" pitchFamily="34" charset="0"/>
+                  <a:ea typeface="Calibri" panose="020F0502020204030204" pitchFamily="34" charset="0"/>
+                  <a:cs typeface="Times New Roman" panose="02020603050405020304" pitchFamily="18" charset="0"/>
+                </a:endParaRPr>
+              </a:p>
+              <a:p>
+                <a:pPr algn="ctr">
+                  <a:lnSpc>
+                    <a:spcPct val="107000"/>
+                  </a:lnSpc>
+                  <a:spcAft>
+                    <a:spcPts val="800"/>
+                  </a:spcAft>
+                </a:pPr>
+                <a14:m>
+                  <m:oMathPara xmlns:m="http://schemas.openxmlformats.org/officeDocument/2006/math">
+                    <m:oMathParaPr>
+                      <m:jc m:val="center"/>
+                    </m:oMathParaPr>
+                    <m:oMath xmlns:m="http://schemas.openxmlformats.org/officeDocument/2006/math">
+                      <m:r>
+                        <a:rPr lang="en-US" sz="1400" b="1" i="1">
+                          <a:latin typeface="Cambria Math" panose="02040503050406030204" pitchFamily="18" charset="0"/>
+                        </a:rPr>
+                        <m:t>𝑭</m:t>
+                      </m:r>
+                      <m:r>
+                        <a:rPr lang="en-US" sz="1400" b="1" i="1">
+                          <a:latin typeface="Cambria Math" panose="02040503050406030204" pitchFamily="18" charset="0"/>
+                        </a:rPr>
+                        <m:t>𝟏</m:t>
+                      </m:r>
+                      <m:r>
+                        <a:rPr lang="en-US" sz="1400" b="0" i="0" smtClean="0">
+                          <a:latin typeface="Cambria Math" panose="02040503050406030204" pitchFamily="18" charset="0"/>
+                        </a:rPr>
+                        <m:t>=</m:t>
+                      </m:r>
+                      <m:r>
+                        <a:rPr lang="en-US" sz="1400" b="0" i="0" smtClean="0">
+                          <a:latin typeface="Cambria Math" panose="02040503050406030204" pitchFamily="18" charset="0"/>
+                        </a:rPr>
+                        <m:t>1</m:t>
+                      </m:r>
+                      <m:r>
+                        <a:rPr lang="en-US" sz="1400">
+                          <a:latin typeface="Cambria Math" panose="02040503050406030204" pitchFamily="18" charset="0"/>
+                        </a:rPr>
+                        <m:t>→</m:t>
+                      </m:r>
+                      <m:r>
+                        <a:rPr lang="en-US" sz="1400" b="1">
+                          <a:latin typeface="Cambria Math" panose="02040503050406030204" pitchFamily="18" charset="0"/>
+                        </a:rPr>
+                        <m:t>𝐓𝐡𝐞𝐫𝐞</m:t>
+                      </m:r>
+                      <m:r>
+                        <a:rPr lang="en-US" sz="1400" b="1">
+                          <a:latin typeface="Cambria Math" panose="02040503050406030204" pitchFamily="18" charset="0"/>
+                        </a:rPr>
+                        <m:t> </m:t>
+                      </m:r>
+                      <m:r>
+                        <a:rPr lang="en-US" sz="1400" b="1">
+                          <a:latin typeface="Cambria Math" panose="02040503050406030204" pitchFamily="18" charset="0"/>
+                        </a:rPr>
+                        <m:t>𝐰𝐞𝐫𝐞</m:t>
+                      </m:r>
+                      <m:r>
+                        <a:rPr lang="en-US" sz="1400" b="1">
+                          <a:latin typeface="Cambria Math" panose="02040503050406030204" pitchFamily="18" charset="0"/>
+                        </a:rPr>
+                        <m:t> </m:t>
+                      </m:r>
+                      <m:r>
+                        <a:rPr lang="en-US" sz="1400" b="1" i="1" smtClean="0">
+                          <a:latin typeface="Cambria Math" panose="02040503050406030204" pitchFamily="18" charset="0"/>
+                        </a:rPr>
+                        <m:t>𝒏𝒐</m:t>
+                      </m:r>
+                      <m:r>
+                        <a:rPr lang="en-US" sz="1400" b="1" i="1" smtClean="0">
+                          <a:latin typeface="Cambria Math" panose="02040503050406030204" pitchFamily="18" charset="0"/>
+                        </a:rPr>
+                        <m:t> </m:t>
+                      </m:r>
+                      <m:r>
+                        <a:rPr lang="en-US" sz="1400" b="1">
+                          <a:latin typeface="Cambria Math" panose="02040503050406030204" pitchFamily="18" charset="0"/>
+                        </a:rPr>
+                        <m:t>𝐟𝐚𝐥𝐬𝐞</m:t>
+                      </m:r>
+                      <m:r>
+                        <a:rPr lang="en-US" sz="1400" b="1">
+                          <a:latin typeface="Cambria Math" panose="02040503050406030204" pitchFamily="18" charset="0"/>
+                        </a:rPr>
+                        <m:t> </m:t>
+                      </m:r>
+                      <m:r>
+                        <a:rPr lang="en-US" sz="1400" b="1">
+                          <a:latin typeface="Cambria Math" panose="02040503050406030204" pitchFamily="18" charset="0"/>
+                        </a:rPr>
+                        <m:t>𝐩𝐨𝐬𝐢𝐭𝐢𝐯𝐞𝐬</m:t>
+                      </m:r>
+                      <m:r>
+                        <a:rPr lang="en-US" sz="1400" b="1">
+                          <a:latin typeface="Cambria Math" panose="02040503050406030204" pitchFamily="18" charset="0"/>
+                        </a:rPr>
+                        <m:t> </m:t>
+                      </m:r>
+                      <m:r>
+                        <a:rPr lang="en-US" sz="1400" b="1">
+                          <a:latin typeface="Cambria Math" panose="02040503050406030204" pitchFamily="18" charset="0"/>
+                        </a:rPr>
+                        <m:t>𝐨𝐫</m:t>
+                      </m:r>
+                      <m:r>
+                        <a:rPr lang="en-US" sz="1400" b="1">
+                          <a:latin typeface="Cambria Math" panose="02040503050406030204" pitchFamily="18" charset="0"/>
+                        </a:rPr>
+                        <m:t> </m:t>
+                      </m:r>
+                      <m:r>
+                        <a:rPr lang="en-US" sz="1400" b="1">
+                          <a:latin typeface="Cambria Math" panose="02040503050406030204" pitchFamily="18" charset="0"/>
+                        </a:rPr>
+                        <m:t>𝐟𝐚𝐥𝐬𝐞</m:t>
+                      </m:r>
+                      <m:r>
+                        <a:rPr lang="en-US" sz="1400" b="1">
+                          <a:latin typeface="Cambria Math" panose="02040503050406030204" pitchFamily="18" charset="0"/>
+                        </a:rPr>
+                        <m:t> </m:t>
+                      </m:r>
+                      <m:r>
+                        <a:rPr lang="en-US" sz="1400" b="1">
+                          <a:latin typeface="Cambria Math" panose="02040503050406030204" pitchFamily="18" charset="0"/>
+                        </a:rPr>
+                        <m:t>𝐧𝐞𝐠𝐚𝐭𝐢𝐯𝐞𝐬</m:t>
+                      </m:r>
+                    </m:oMath>
+                  </m:oMathPara>
+                </a14:m>
+                <a:endParaRPr lang="en-US" sz="1400" b="1" dirty="0"/>
+              </a:p>
+              <a:p>
+                <a:pPr algn="ctr">
+                  <a:lnSpc>
+                    <a:spcPct val="107000"/>
+                  </a:lnSpc>
+                  <a:spcAft>
+                    <a:spcPts val="800"/>
+                  </a:spcAft>
+                </a:pPr>
+                <a:r>
+                  <a:rPr lang="en-US" sz="1400" b="1" dirty="0" smtClean="0"/>
+                  <a:t> AUC </a:t>
+                </a:r>
+                <a:r>
+                  <a:rPr lang="en-US" sz="1400" b="1" dirty="0" smtClean="0"/>
+                  <a:t>&gt; 1-&gt; </a:t>
+                </a:r>
+                <a:r>
+                  <a:rPr lang="en-US" sz="1400" b="1" dirty="0" smtClean="0"/>
+                  <a:t>The model is </a:t>
+                </a:r>
+                <a:r>
+                  <a:rPr lang="en-US" sz="1400" b="1" dirty="0" smtClean="0"/>
+                  <a:t>classifying perfectly</a:t>
+                </a:r>
+                <a:endParaRPr lang="en-US" sz="1400" b="1" dirty="0" smtClean="0"/>
+              </a:p>
+              <a:p>
+                <a:pPr algn="ctr">
+                  <a:lnSpc>
+                    <a:spcPct val="107000"/>
+                  </a:lnSpc>
+                  <a:spcAft>
+                    <a:spcPts val="800"/>
+                  </a:spcAft>
+                </a:pPr>
+                <a:endParaRPr lang="en-US" sz="1600" dirty="0">
+                  <a:effectLst/>
+                  <a:latin typeface="Calibri" panose="020F0502020204030204" pitchFamily="34" charset="0"/>
+                  <a:ea typeface="Calibri" panose="020F0502020204030204" pitchFamily="34" charset="0"/>
+                  <a:cs typeface="Times New Roman" panose="02020603050405020304" pitchFamily="18" charset="0"/>
+                </a:endParaRPr>
+              </a:p>
+            </p:txBody>
+          </p:sp>
+        </mc:Choice>
+        <mc:Fallback>
+          <p:sp>
+            <p:nvSpPr>
+              <p:cNvPr id="16" name="Rectangle 15"/>
+              <p:cNvSpPr>
+                <a:spLocks noRot="1" noChangeAspect="1" noMove="1" noResize="1" noEditPoints="1" noAdjustHandles="1" noChangeArrowheads="1" noChangeShapeType="1" noTextEdit="1"/>
+              </p:cNvSpPr>
+              <p:nvPr/>
+            </p:nvSpPr>
+            <p:spPr>
+              <a:xfrm>
+                <a:off x="132347" y="5279686"/>
+                <a:ext cx="5920152" cy="2009589"/>
+              </a:xfrm>
+              <a:prstGeom prst="rect">
+                <a:avLst/>
+              </a:prstGeom>
+              <a:blipFill>
+                <a:blip r:embed="rId4"/>
+                <a:stretch>
+                  <a:fillRect/>
+                </a:stretch>
+              </a:blipFill>
+            </p:spPr>
+            <p:txBody>
+              <a:bodyPr/>
+              <a:lstStyle/>
+              <a:p>
+                <a:r>
+                  <a:rPr lang="en-US">
+                    <a:noFill/>
+                  </a:rPr>
+                  <a:t> </a:t>
+                </a:r>
+              </a:p>
+            </p:txBody>
+          </p:sp>
+        </mc:Fallback>
+      </mc:AlternateContent>
       <p:pic>
         <p:nvPicPr>
-          <p:cNvPr id="4" name="Picture 3"/>
+          <p:cNvPr id="17" name="Picture 16"/>
           <p:cNvPicPr>
             <a:picLocks noChangeAspect="1"/>
           </p:cNvPicPr>
           <p:nvPr/>
         </p:nvPicPr>
-        <p:blipFill rotWithShape="1">
-          <a:blip r:embed="rId2"/>
-          <a:srcRect l="1355" t="60843" r="212" b="10617"/>
-          <a:stretch/>
+        <p:blipFill>
+          <a:blip r:embed="rId5"/>
+          <a:stretch>
+            <a:fillRect/>
+          </a:stretch>
         </p:blipFill>
         <p:spPr>
           <a:xfrm>
-            <a:off x="287165" y="3180520"/>
-            <a:ext cx="11617669" cy="3240157"/>
+            <a:off x="736376" y="2288072"/>
+            <a:ext cx="4993107" cy="3072063"/>
           </a:xfrm>
           <a:prstGeom prst="rect">
             <a:avLst/>
@@ -6081,7 +6655,7 @@
     </p:spTree>
     <p:extLst>
       <p:ext uri="{BB962C8B-B14F-4D97-AF65-F5344CB8AC3E}">
-        <p14:creationId xmlns:p14="http://schemas.microsoft.com/office/powerpoint/2010/main" val="3493314751"/>
+        <p14:creationId xmlns:p14="http://schemas.microsoft.com/office/powerpoint/2010/main" val="3955358761"/>
       </p:ext>
     </p:extLst>
   </p:cSld>
@@ -6120,14 +6694,16 @@
         </p:nvSpPr>
         <p:spPr/>
         <p:txBody>
-          <a:bodyPr/>
+          <a:bodyPr>
+            <a:normAutofit/>
+          </a:bodyPr>
           <a:lstStyle/>
           <a:p>
             <a:r>
-              <a:rPr lang="en-US" dirty="0" smtClean="0"/>
-              <a:t>SVM Performance</a:t>
-            </a:r>
-            <a:endParaRPr lang="en-US" dirty="0"/>
+              <a:rPr lang="en-US" sz="3600" dirty="0" smtClean="0"/>
+              <a:t>SVM Classifier</a:t>
+            </a:r>
+            <a:endParaRPr lang="en-US" sz="3600" dirty="0"/>
           </a:p>
         </p:txBody>
       </p:sp>
@@ -6141,930 +6717,101 @@
             <p:ph idx="1"/>
           </p:nvPr>
         </p:nvSpPr>
-        <p:spPr/>
+        <p:spPr>
+          <a:xfrm>
+            <a:off x="838200" y="1525588"/>
+            <a:ext cx="4936958" cy="4351338"/>
+          </a:xfrm>
+        </p:spPr>
         <p:txBody>
           <a:bodyPr/>
           <a:lstStyle/>
           <a:p>
             <a:r>
-              <a:rPr lang="en-US" i="1" dirty="0" smtClean="0"/>
-              <a:t>This model was assessed using the F1-score, Sensitivity, Specificity, and Accuracy</a:t>
-            </a:r>
-            <a:endParaRPr lang="en-US" i="1" dirty="0"/>
-          </a:p>
-          <a:p>
-            <a:r>
-              <a:rPr lang="en-US" i="1" dirty="0" smtClean="0"/>
-              <a:t>Training data was 70% and Validation data was 30%</a:t>
-            </a:r>
-            <a:endParaRPr lang="en-US" dirty="0"/>
-          </a:p>
-          <a:p>
-            <a:pPr lvl="1"/>
+              <a:rPr lang="en-US" dirty="0" smtClean="0"/>
+              <a:t>The SVM used applies a linear </a:t>
+            </a:r>
+            <a:r>
+              <a:rPr lang="en-US" dirty="0" smtClean="0"/>
+              <a:t>kernel and C=1</a:t>
+            </a:r>
+            <a:endParaRPr lang="en-US" dirty="0" smtClean="0"/>
+          </a:p>
+          <a:p>
+            <a:r>
+              <a:rPr lang="en-US" dirty="0" smtClean="0"/>
+              <a:t>Data was split into </a:t>
+            </a:r>
+            <a:r>
+              <a:rPr lang="en-US" dirty="0" smtClean="0"/>
+              <a:t>60</a:t>
+            </a:r>
+            <a:r>
+              <a:rPr lang="en-US" dirty="0" smtClean="0"/>
+              <a:t>% training </a:t>
+            </a:r>
+            <a:r>
+              <a:rPr lang="en-US" dirty="0" smtClean="0"/>
+              <a:t>data, 20% testing, </a:t>
+            </a:r>
+            <a:r>
+              <a:rPr lang="en-US" dirty="0" smtClean="0"/>
+              <a:t>and </a:t>
+            </a:r>
+            <a:r>
+              <a:rPr lang="en-US" dirty="0" smtClean="0"/>
+              <a:t>20</a:t>
+            </a:r>
+            <a:r>
+              <a:rPr lang="en-US" dirty="0" smtClean="0"/>
+              <a:t>% </a:t>
+            </a:r>
+            <a:r>
+              <a:rPr lang="en-US" dirty="0" smtClean="0"/>
+              <a:t>validation </a:t>
+            </a:r>
+            <a:r>
+              <a:rPr lang="en-US" dirty="0" smtClean="0"/>
+              <a:t>data</a:t>
+            </a:r>
             <a:endParaRPr lang="en-US" dirty="0"/>
           </a:p>
         </p:txBody>
       </p:sp>
       <p:pic>
         <p:nvPicPr>
-          <p:cNvPr id="6" name="Picture 5"/>
+          <p:cNvPr id="5" name="Picture 4"/>
           <p:cNvPicPr>
             <a:picLocks noChangeAspect="1"/>
           </p:cNvPicPr>
           <p:nvPr/>
         </p:nvPicPr>
         <p:blipFill>
-          <a:blip r:embed="rId2"/>
+          <a:blip r:embed="rId2" cstate="print">
+            <a:extLst>
+              <a:ext uri="{28A0092B-C50C-407E-A947-70E740481C1C}">
+                <a14:useLocalDpi xmlns:a14="http://schemas.microsoft.com/office/drawing/2010/main" val="0"/>
+              </a:ext>
+            </a:extLst>
+          </a:blip>
           <a:stretch>
             <a:fillRect/>
           </a:stretch>
         </p:blipFill>
         <p:spPr>
           <a:xfrm>
-            <a:off x="0" y="3084394"/>
-            <a:ext cx="4872251" cy="3773606"/>
+            <a:off x="5816808" y="138681"/>
+            <a:ext cx="6286960" cy="6418530"/>
           </a:xfrm>
           <a:prstGeom prst="rect">
             <a:avLst/>
           </a:prstGeom>
         </p:spPr>
       </p:pic>
-      <mc:AlternateContent xmlns:mc="http://schemas.openxmlformats.org/markup-compatibility/2006" xmlns:a14="http://schemas.microsoft.com/office/drawing/2010/main">
-        <mc:Choice Requires="a14">
-          <p:sp>
-            <p:nvSpPr>
-              <p:cNvPr id="7" name="Rectangle 6"/>
-              <p:cNvSpPr/>
-              <p:nvPr/>
-            </p:nvSpPr>
-            <p:spPr>
-              <a:xfrm>
-                <a:off x="5013278" y="3348887"/>
-                <a:ext cx="7178722" cy="3388235"/>
-              </a:xfrm>
-              <a:prstGeom prst="rect">
-                <a:avLst/>
-              </a:prstGeom>
-            </p:spPr>
-            <p:txBody>
-              <a:bodyPr wrap="square">
-                <a:spAutoFit/>
-              </a:bodyPr>
-              <a:lstStyle/>
-              <a:p>
-                <a:pPr>
-                  <a:lnSpc>
-                    <a:spcPct val="107000"/>
-                  </a:lnSpc>
-                  <a:spcAft>
-                    <a:spcPts val="800"/>
-                  </a:spcAft>
-                </a:pPr>
-                <a14:m>
-                  <m:oMathPara xmlns:m="http://schemas.openxmlformats.org/officeDocument/2006/math">
-                    <m:oMathParaPr>
-                      <m:jc m:val="left"/>
-                    </m:oMathParaPr>
-                    <m:oMath xmlns:m="http://schemas.openxmlformats.org/officeDocument/2006/math">
-                      <m:r>
-                        <a:rPr lang="en-US" sz="1600" b="1" i="1" smtClean="0">
-                          <a:latin typeface="Cambria Math" panose="02040503050406030204" pitchFamily="18" charset="0"/>
-                          <a:ea typeface="Calibri" panose="020F0502020204030204" pitchFamily="34" charset="0"/>
-                          <a:cs typeface="Calibri" panose="020F0502020204030204" pitchFamily="34" charset="0"/>
-                        </a:rPr>
-                        <m:t>𝑺𝒆𝒏𝒔𝒊𝒕𝒊𝒗𝒊𝒕𝒚</m:t>
-                      </m:r>
-                      <m:r>
-                        <a:rPr lang="en-US" sz="1600" b="1" i="1" smtClean="0">
-                          <a:latin typeface="Cambria Math" panose="02040503050406030204" pitchFamily="18" charset="0"/>
-                          <a:ea typeface="Calibri" panose="020F0502020204030204" pitchFamily="34" charset="0"/>
-                          <a:cs typeface="Calibri" panose="020F0502020204030204" pitchFamily="34" charset="0"/>
-                        </a:rPr>
-                        <m:t>=</m:t>
-                      </m:r>
-                      <m:f>
-                        <m:fPr>
-                          <m:ctrlPr>
-                            <a:rPr lang="en-US" sz="1600" b="1" i="1">
-                              <a:latin typeface="Cambria Math" panose="02040503050406030204" pitchFamily="18" charset="0"/>
-                              <a:ea typeface="Calibri" panose="020F0502020204030204" pitchFamily="34" charset="0"/>
-                              <a:cs typeface="Calibri" panose="020F0502020204030204" pitchFamily="34" charset="0"/>
-                            </a:rPr>
-                          </m:ctrlPr>
-                        </m:fPr>
-                        <m:num>
-                          <m:r>
-                            <a:rPr lang="en-US" sz="1600" b="1" i="1">
-                              <a:latin typeface="Cambria Math" panose="02040503050406030204" pitchFamily="18" charset="0"/>
-                              <a:ea typeface="Calibri" panose="020F0502020204030204" pitchFamily="34" charset="0"/>
-                              <a:cs typeface="Calibri" panose="020F0502020204030204" pitchFamily="34" charset="0"/>
-                            </a:rPr>
-                            <m:t>𝑇𝑃</m:t>
-                          </m:r>
-                        </m:num>
-                        <m:den>
-                          <m:r>
-                            <a:rPr lang="en-US" sz="1600" b="1" i="1">
-                              <a:latin typeface="Cambria Math" panose="02040503050406030204" pitchFamily="18" charset="0"/>
-                              <a:ea typeface="Calibri" panose="020F0502020204030204" pitchFamily="34" charset="0"/>
-                              <a:cs typeface="Calibri" panose="020F0502020204030204" pitchFamily="34" charset="0"/>
-                            </a:rPr>
-                            <m:t>𝑇𝑃</m:t>
-                          </m:r>
-                          <m:r>
-                            <a:rPr lang="en-US" sz="1600" b="1" i="1">
-                              <a:latin typeface="Cambria Math" panose="02040503050406030204" pitchFamily="18" charset="0"/>
-                              <a:ea typeface="Calibri" panose="020F0502020204030204" pitchFamily="34" charset="0"/>
-                              <a:cs typeface="Calibri" panose="020F0502020204030204" pitchFamily="34" charset="0"/>
-                            </a:rPr>
-                            <m:t>+</m:t>
-                          </m:r>
-                          <m:r>
-                            <a:rPr lang="en-US" sz="1600" b="1" i="1">
-                              <a:latin typeface="Cambria Math" panose="02040503050406030204" pitchFamily="18" charset="0"/>
-                              <a:ea typeface="Calibri" panose="020F0502020204030204" pitchFamily="34" charset="0"/>
-                              <a:cs typeface="Calibri" panose="020F0502020204030204" pitchFamily="34" charset="0"/>
-                            </a:rPr>
-                            <m:t>𝐹𝑁</m:t>
-                          </m:r>
-                        </m:den>
-                      </m:f>
-                      <m:r>
-                        <a:rPr lang="en-US" sz="1600" b="1" i="1" smtClean="0">
-                          <a:latin typeface="Cambria Math" panose="02040503050406030204" pitchFamily="18" charset="0"/>
-                          <a:ea typeface="Calibri" panose="020F0502020204030204" pitchFamily="34" charset="0"/>
-                          <a:cs typeface="Calibri" panose="020F0502020204030204" pitchFamily="34" charset="0"/>
-                        </a:rPr>
-                        <m:t>=</m:t>
-                      </m:r>
-                      <m:r>
-                        <a:rPr lang="en-US" sz="1600" b="1" i="1" smtClean="0">
-                          <a:latin typeface="Cambria Math" panose="02040503050406030204" pitchFamily="18" charset="0"/>
-                          <a:ea typeface="Calibri" panose="020F0502020204030204" pitchFamily="34" charset="0"/>
-                          <a:cs typeface="Calibri" panose="020F0502020204030204" pitchFamily="34" charset="0"/>
-                        </a:rPr>
-                        <m:t>𝟏</m:t>
-                      </m:r>
-                      <m:r>
-                        <a:rPr lang="en-US" sz="1600" b="1" i="1" smtClean="0">
-                          <a:latin typeface="Cambria Math" panose="02040503050406030204" pitchFamily="18" charset="0"/>
-                          <a:ea typeface="Calibri" panose="020F0502020204030204" pitchFamily="34" charset="0"/>
-                          <a:cs typeface="Calibri" panose="020F0502020204030204" pitchFamily="34" charset="0"/>
-                        </a:rPr>
-                        <m:t> →</m:t>
-                      </m:r>
-                      <m:r>
-                        <a:rPr lang="en-US" sz="1600" b="1" i="1">
-                          <a:latin typeface="Cambria Math" panose="02040503050406030204" pitchFamily="18" charset="0"/>
-                          <a:ea typeface="Calibri" panose="020F0502020204030204" pitchFamily="34" charset="0"/>
-                          <a:cs typeface="Calibri" panose="020F0502020204030204" pitchFamily="34" charset="0"/>
-                        </a:rPr>
-                        <m:t>𝑨𝒍𝒍</m:t>
-                      </m:r>
-                      <m:r>
-                        <a:rPr lang="en-US" sz="1600" b="1" i="1">
-                          <a:latin typeface="Cambria Math" panose="02040503050406030204" pitchFamily="18" charset="0"/>
-                          <a:ea typeface="Calibri" panose="020F0502020204030204" pitchFamily="34" charset="0"/>
-                          <a:cs typeface="Calibri" panose="020F0502020204030204" pitchFamily="34" charset="0"/>
-                        </a:rPr>
-                        <m:t> </m:t>
-                      </m:r>
-                      <m:r>
-                        <a:rPr lang="en-US" sz="1600" b="1" i="1">
-                          <a:latin typeface="Cambria Math" panose="02040503050406030204" pitchFamily="18" charset="0"/>
-                          <a:ea typeface="Calibri" panose="020F0502020204030204" pitchFamily="34" charset="0"/>
-                          <a:cs typeface="Calibri" panose="020F0502020204030204" pitchFamily="34" charset="0"/>
-                        </a:rPr>
-                        <m:t>𝒑𝒓𝒆𝒅𝒊𝒄𝒕𝒆𝒅</m:t>
-                      </m:r>
-                      <m:r>
-                        <a:rPr lang="en-US" sz="1600" b="1" i="1">
-                          <a:latin typeface="Cambria Math" panose="02040503050406030204" pitchFamily="18" charset="0"/>
-                          <a:ea typeface="Calibri" panose="020F0502020204030204" pitchFamily="34" charset="0"/>
-                          <a:cs typeface="Calibri" panose="020F0502020204030204" pitchFamily="34" charset="0"/>
-                        </a:rPr>
-                        <m:t> </m:t>
-                      </m:r>
-                      <m:r>
-                        <a:rPr lang="en-US" sz="1600" b="1" i="1">
-                          <a:latin typeface="Cambria Math" panose="02040503050406030204" pitchFamily="18" charset="0"/>
-                          <a:ea typeface="Calibri" panose="020F0502020204030204" pitchFamily="34" charset="0"/>
-                          <a:cs typeface="Calibri" panose="020F0502020204030204" pitchFamily="34" charset="0"/>
-                        </a:rPr>
-                        <m:t>𝒑𝒐𝒔𝒊𝒕𝒊𝒗𝒆</m:t>
-                      </m:r>
-                      <m:r>
-                        <a:rPr lang="en-US" sz="1600" b="1" i="1">
-                          <a:latin typeface="Cambria Math" panose="02040503050406030204" pitchFamily="18" charset="0"/>
-                          <a:ea typeface="Calibri" panose="020F0502020204030204" pitchFamily="34" charset="0"/>
-                          <a:cs typeface="Calibri" panose="020F0502020204030204" pitchFamily="34" charset="0"/>
-                        </a:rPr>
-                        <m:t> </m:t>
-                      </m:r>
-                      <m:r>
-                        <a:rPr lang="en-US" sz="1600" b="1" i="1">
-                          <a:latin typeface="Cambria Math" panose="02040503050406030204" pitchFamily="18" charset="0"/>
-                          <a:ea typeface="Calibri" panose="020F0502020204030204" pitchFamily="34" charset="0"/>
-                          <a:cs typeface="Calibri" panose="020F0502020204030204" pitchFamily="34" charset="0"/>
-                        </a:rPr>
-                        <m:t>𝒂𝒓𝒆</m:t>
-                      </m:r>
-                      <m:r>
-                        <a:rPr lang="en-US" sz="1600" b="1" i="1">
-                          <a:latin typeface="Cambria Math" panose="02040503050406030204" pitchFamily="18" charset="0"/>
-                          <a:ea typeface="Calibri" panose="020F0502020204030204" pitchFamily="34" charset="0"/>
-                          <a:cs typeface="Calibri" panose="020F0502020204030204" pitchFamily="34" charset="0"/>
-                        </a:rPr>
-                        <m:t> </m:t>
-                      </m:r>
-                      <m:r>
-                        <a:rPr lang="en-US" sz="1600" b="1" i="1">
-                          <a:latin typeface="Cambria Math" panose="02040503050406030204" pitchFamily="18" charset="0"/>
-                          <a:ea typeface="Calibri" panose="020F0502020204030204" pitchFamily="34" charset="0"/>
-                          <a:cs typeface="Calibri" panose="020F0502020204030204" pitchFamily="34" charset="0"/>
-                        </a:rPr>
-                        <m:t>𝒕𝒓𝒖𝒍𝒚</m:t>
-                      </m:r>
-                      <m:r>
-                        <a:rPr lang="en-US" sz="1600" b="1" i="1">
-                          <a:latin typeface="Cambria Math" panose="02040503050406030204" pitchFamily="18" charset="0"/>
-                          <a:ea typeface="Calibri" panose="020F0502020204030204" pitchFamily="34" charset="0"/>
-                          <a:cs typeface="Calibri" panose="020F0502020204030204" pitchFamily="34" charset="0"/>
-                        </a:rPr>
-                        <m:t> </m:t>
-                      </m:r>
-                      <m:r>
-                        <a:rPr lang="en-US" sz="1600" b="1" i="1">
-                          <a:latin typeface="Cambria Math" panose="02040503050406030204" pitchFamily="18" charset="0"/>
-                          <a:ea typeface="Calibri" panose="020F0502020204030204" pitchFamily="34" charset="0"/>
-                          <a:cs typeface="Calibri" panose="020F0502020204030204" pitchFamily="34" charset="0"/>
-                        </a:rPr>
-                        <m:t>𝒑𝒐𝒔𝒊𝒕𝒊𝒗𝒆</m:t>
-                      </m:r>
-                    </m:oMath>
-                  </m:oMathPara>
-                </a14:m>
-                <a:endParaRPr lang="en-US" b="1" i="1" dirty="0">
-                  <a:latin typeface="Cambria Math" panose="02040503050406030204" pitchFamily="18" charset="0"/>
-                  <a:ea typeface="Calibri" panose="020F0502020204030204" pitchFamily="34" charset="0"/>
-                  <a:cs typeface="Calibri" panose="020F0502020204030204" pitchFamily="34" charset="0"/>
-                </a:endParaRPr>
-              </a:p>
-              <a:p>
-                <a:pPr>
-                  <a:lnSpc>
-                    <a:spcPct val="107000"/>
-                  </a:lnSpc>
-                  <a:spcAft>
-                    <a:spcPts val="800"/>
-                  </a:spcAft>
-                </a:pPr>
-                <a14:m>
-                  <m:oMath xmlns:m="http://schemas.openxmlformats.org/officeDocument/2006/math">
-                    <m:r>
-                      <a:rPr lang="en-US" sz="1600" b="1" i="1">
-                        <a:latin typeface="Cambria Math" panose="02040503050406030204" pitchFamily="18" charset="0"/>
-                        <a:ea typeface="Calibri" panose="020F0502020204030204" pitchFamily="34" charset="0"/>
-                        <a:cs typeface="Calibri" panose="020F0502020204030204" pitchFamily="34" charset="0"/>
-                      </a:rPr>
-                      <m:t>𝑺𝒑𝒆𝒄𝒊𝒇𝒊𝒄𝒊𝒕𝒚</m:t>
-                    </m:r>
-                    <m:r>
-                      <a:rPr lang="en-US" sz="1600" i="1">
-                        <a:latin typeface="Cambria Math" panose="02040503050406030204" pitchFamily="18" charset="0"/>
-                        <a:ea typeface="Calibri" panose="020F0502020204030204" pitchFamily="34" charset="0"/>
-                        <a:cs typeface="Calibri" panose="020F0502020204030204" pitchFamily="34" charset="0"/>
-                      </a:rPr>
-                      <m:t>=</m:t>
-                    </m:r>
-                    <m:f>
-                      <m:fPr>
-                        <m:ctrlPr>
-                          <a:rPr lang="en-US" sz="1600" i="1">
-                            <a:latin typeface="Cambria Math" panose="02040503050406030204" pitchFamily="18" charset="0"/>
-                            <a:ea typeface="Calibri" panose="020F0502020204030204" pitchFamily="34" charset="0"/>
-                            <a:cs typeface="Calibri" panose="020F0502020204030204" pitchFamily="34" charset="0"/>
-                          </a:rPr>
-                        </m:ctrlPr>
-                      </m:fPr>
-                      <m:num>
-                        <m:r>
-                          <a:rPr lang="en-US" sz="1600" i="1">
-                            <a:latin typeface="Cambria Math" panose="02040503050406030204" pitchFamily="18" charset="0"/>
-                            <a:ea typeface="Calibri" panose="020F0502020204030204" pitchFamily="34" charset="0"/>
-                            <a:cs typeface="Calibri" panose="020F0502020204030204" pitchFamily="34" charset="0"/>
-                          </a:rPr>
-                          <m:t>𝑇𝑁</m:t>
-                        </m:r>
-                      </m:num>
-                      <m:den>
-                        <m:r>
-                          <a:rPr lang="en-US" sz="1600" i="1">
-                            <a:latin typeface="Cambria Math" panose="02040503050406030204" pitchFamily="18" charset="0"/>
-                            <a:ea typeface="Calibri" panose="020F0502020204030204" pitchFamily="34" charset="0"/>
-                            <a:cs typeface="Calibri" panose="020F0502020204030204" pitchFamily="34" charset="0"/>
-                          </a:rPr>
-                          <m:t>𝑇𝑁</m:t>
-                        </m:r>
-                        <m:r>
-                          <a:rPr lang="en-US" sz="1600" i="1">
-                            <a:latin typeface="Cambria Math" panose="02040503050406030204" pitchFamily="18" charset="0"/>
-                            <a:ea typeface="Calibri" panose="020F0502020204030204" pitchFamily="34" charset="0"/>
-                            <a:cs typeface="Calibri" panose="020F0502020204030204" pitchFamily="34" charset="0"/>
-                          </a:rPr>
-                          <m:t>+</m:t>
-                        </m:r>
-                        <m:r>
-                          <a:rPr lang="en-US" sz="1600" i="1">
-                            <a:latin typeface="Cambria Math" panose="02040503050406030204" pitchFamily="18" charset="0"/>
-                            <a:ea typeface="Calibri" panose="020F0502020204030204" pitchFamily="34" charset="0"/>
-                            <a:cs typeface="Calibri" panose="020F0502020204030204" pitchFamily="34" charset="0"/>
-                          </a:rPr>
-                          <m:t>𝐹𝑃</m:t>
-                        </m:r>
-                      </m:den>
-                    </m:f>
-                    <m:r>
-                      <a:rPr lang="en-US" sz="1600" i="1">
-                        <a:latin typeface="Cambria Math" panose="02040503050406030204" pitchFamily="18" charset="0"/>
-                        <a:ea typeface="Calibri" panose="020F0502020204030204" pitchFamily="34" charset="0"/>
-                        <a:cs typeface="Calibri" panose="020F0502020204030204" pitchFamily="34" charset="0"/>
-                      </a:rPr>
-                      <m:t>=</m:t>
-                    </m:r>
-                    <m:r>
-                      <a:rPr lang="en-US" sz="1600" b="0" i="1" smtClean="0">
-                        <a:latin typeface="Cambria Math" panose="02040503050406030204" pitchFamily="18" charset="0"/>
-                        <a:ea typeface="Calibri" panose="020F0502020204030204" pitchFamily="34" charset="0"/>
-                        <a:cs typeface="Calibri" panose="020F0502020204030204" pitchFamily="34" charset="0"/>
-                      </a:rPr>
-                      <m:t>1</m:t>
-                    </m:r>
-                  </m:oMath>
-                </a14:m>
-                <a:r>
-                  <a:rPr lang="en-US" sz="1600" dirty="0" smtClean="0">
-                    <a:effectLst/>
-                    <a:latin typeface="Calibri" panose="020F0502020204030204" pitchFamily="34" charset="0"/>
-                    <a:ea typeface="Calibri" panose="020F0502020204030204" pitchFamily="34" charset="0"/>
-                    <a:cs typeface="Times New Roman" panose="02020603050405020304" pitchFamily="18" charset="0"/>
-                  </a:rPr>
-                  <a:t> </a:t>
-                </a:r>
-                <a14:m>
-                  <m:oMath xmlns:m="http://schemas.openxmlformats.org/officeDocument/2006/math">
-                    <m:r>
-                      <a:rPr lang="en-US" sz="1600" b="1" i="1">
-                        <a:latin typeface="Cambria Math" panose="02040503050406030204" pitchFamily="18" charset="0"/>
-                        <a:ea typeface="Calibri" panose="020F0502020204030204" pitchFamily="34" charset="0"/>
-                        <a:cs typeface="Calibri" panose="020F0502020204030204" pitchFamily="34" charset="0"/>
-                      </a:rPr>
-                      <m:t>→</m:t>
-                    </m:r>
-                    <m:r>
-                      <a:rPr lang="en-US" sz="1600" b="1" i="1">
-                        <a:latin typeface="Cambria Math" panose="02040503050406030204" pitchFamily="18" charset="0"/>
-                        <a:ea typeface="Calibri" panose="020F0502020204030204" pitchFamily="34" charset="0"/>
-                        <a:cs typeface="Calibri" panose="020F0502020204030204" pitchFamily="34" charset="0"/>
-                      </a:rPr>
-                      <m:t>𝑨𝒍𝒍</m:t>
-                    </m:r>
-                    <m:r>
-                      <a:rPr lang="en-US" sz="1600" b="1" i="1">
-                        <a:latin typeface="Cambria Math" panose="02040503050406030204" pitchFamily="18" charset="0"/>
-                        <a:ea typeface="Calibri" panose="020F0502020204030204" pitchFamily="34" charset="0"/>
-                        <a:cs typeface="Calibri" panose="020F0502020204030204" pitchFamily="34" charset="0"/>
-                      </a:rPr>
-                      <m:t> </m:t>
-                    </m:r>
-                    <m:r>
-                      <a:rPr lang="en-US" sz="1600" b="1" i="1">
-                        <a:latin typeface="Cambria Math" panose="02040503050406030204" pitchFamily="18" charset="0"/>
-                        <a:ea typeface="Calibri" panose="020F0502020204030204" pitchFamily="34" charset="0"/>
-                        <a:cs typeface="Calibri" panose="020F0502020204030204" pitchFamily="34" charset="0"/>
-                      </a:rPr>
-                      <m:t>𝒑𝒓𝒆𝒅𝒊𝒄𝒕𝒆𝒅</m:t>
-                    </m:r>
-                    <m:r>
-                      <a:rPr lang="en-US" sz="1600" b="1" i="1" smtClean="0">
-                        <a:latin typeface="Cambria Math" panose="02040503050406030204" pitchFamily="18" charset="0"/>
-                        <a:ea typeface="Calibri" panose="020F0502020204030204" pitchFamily="34" charset="0"/>
-                        <a:cs typeface="Calibri" panose="020F0502020204030204" pitchFamily="34" charset="0"/>
-                      </a:rPr>
-                      <m:t> </m:t>
-                    </m:r>
-                    <m:r>
-                      <a:rPr lang="en-US" sz="1600" b="1" i="1" smtClean="0">
-                        <a:latin typeface="Cambria Math" panose="02040503050406030204" pitchFamily="18" charset="0"/>
-                        <a:ea typeface="Calibri" panose="020F0502020204030204" pitchFamily="34" charset="0"/>
-                        <a:cs typeface="Calibri" panose="020F0502020204030204" pitchFamily="34" charset="0"/>
-                      </a:rPr>
-                      <m:t>𝒏𝒆𝒈𝒂𝒕𝒊𝒗𝒆</m:t>
-                    </m:r>
-                    <m:r>
-                      <a:rPr lang="en-US" sz="1600" b="1" i="1" smtClean="0">
-                        <a:latin typeface="Cambria Math" panose="02040503050406030204" pitchFamily="18" charset="0"/>
-                        <a:ea typeface="Calibri" panose="020F0502020204030204" pitchFamily="34" charset="0"/>
-                        <a:cs typeface="Calibri" panose="020F0502020204030204" pitchFamily="34" charset="0"/>
-                      </a:rPr>
-                      <m:t> </m:t>
-                    </m:r>
-                    <m:r>
-                      <a:rPr lang="en-US" sz="1600" b="1" i="1">
-                        <a:latin typeface="Cambria Math" panose="02040503050406030204" pitchFamily="18" charset="0"/>
-                        <a:ea typeface="Calibri" panose="020F0502020204030204" pitchFamily="34" charset="0"/>
-                        <a:cs typeface="Calibri" panose="020F0502020204030204" pitchFamily="34" charset="0"/>
-                      </a:rPr>
-                      <m:t>𝒂𝒓𝒆</m:t>
-                    </m:r>
-                    <m:r>
-                      <a:rPr lang="en-US" sz="1600" b="1" i="1">
-                        <a:latin typeface="Cambria Math" panose="02040503050406030204" pitchFamily="18" charset="0"/>
-                        <a:ea typeface="Calibri" panose="020F0502020204030204" pitchFamily="34" charset="0"/>
-                        <a:cs typeface="Calibri" panose="020F0502020204030204" pitchFamily="34" charset="0"/>
-                      </a:rPr>
-                      <m:t> </m:t>
-                    </m:r>
-                    <m:r>
-                      <a:rPr lang="en-US" sz="1600" b="1" i="1">
-                        <a:latin typeface="Cambria Math" panose="02040503050406030204" pitchFamily="18" charset="0"/>
-                        <a:ea typeface="Calibri" panose="020F0502020204030204" pitchFamily="34" charset="0"/>
-                        <a:cs typeface="Calibri" panose="020F0502020204030204" pitchFamily="34" charset="0"/>
-                      </a:rPr>
-                      <m:t>𝒕𝒓𝒖𝒍𝒚</m:t>
-                    </m:r>
-                    <m:r>
-                      <a:rPr lang="en-US" sz="1600" b="1" i="1">
-                        <a:latin typeface="Cambria Math" panose="02040503050406030204" pitchFamily="18" charset="0"/>
-                        <a:ea typeface="Calibri" panose="020F0502020204030204" pitchFamily="34" charset="0"/>
-                        <a:cs typeface="Calibri" panose="020F0502020204030204" pitchFamily="34" charset="0"/>
-                      </a:rPr>
-                      <m:t> </m:t>
-                    </m:r>
-                    <m:r>
-                      <a:rPr lang="en-US" sz="1600" b="1" i="1" smtClean="0">
-                        <a:latin typeface="Cambria Math" panose="02040503050406030204" pitchFamily="18" charset="0"/>
-                        <a:ea typeface="Calibri" panose="020F0502020204030204" pitchFamily="34" charset="0"/>
-                        <a:cs typeface="Calibri" panose="020F0502020204030204" pitchFamily="34" charset="0"/>
-                      </a:rPr>
-                      <m:t>𝒏𝒆𝒈𝒂</m:t>
-                    </m:r>
-                    <m:r>
-                      <a:rPr lang="en-US" sz="1600" b="1" i="1">
-                        <a:latin typeface="Cambria Math" panose="02040503050406030204" pitchFamily="18" charset="0"/>
-                        <a:ea typeface="Calibri" panose="020F0502020204030204" pitchFamily="34" charset="0"/>
-                        <a:cs typeface="Calibri" panose="020F0502020204030204" pitchFamily="34" charset="0"/>
-                      </a:rPr>
-                      <m:t>𝒕𝒊𝒗𝒆</m:t>
-                    </m:r>
-                  </m:oMath>
-                </a14:m>
-                <a:endParaRPr lang="en-US" sz="1600" dirty="0" smtClean="0">
-                  <a:effectLst/>
-                  <a:latin typeface="Calibri" panose="020F0502020204030204" pitchFamily="34" charset="0"/>
-                  <a:ea typeface="Calibri" panose="020F0502020204030204" pitchFamily="34" charset="0"/>
-                  <a:cs typeface="Times New Roman" panose="02020603050405020304" pitchFamily="18" charset="0"/>
-                </a:endParaRPr>
-              </a:p>
-              <a:p>
-                <a:pPr>
-                  <a:lnSpc>
-                    <a:spcPct val="107000"/>
-                  </a:lnSpc>
-                  <a:spcAft>
-                    <a:spcPts val="800"/>
-                  </a:spcAft>
-                </a:pPr>
-                <a14:m>
-                  <m:oMathPara xmlns:m="http://schemas.openxmlformats.org/officeDocument/2006/math">
-                    <m:oMathParaPr>
-                      <m:jc m:val="left"/>
-                    </m:oMathParaPr>
-                    <m:oMath xmlns:m="http://schemas.openxmlformats.org/officeDocument/2006/math">
-                      <m:r>
-                        <a:rPr lang="en-US" sz="1600" b="1" i="1">
-                          <a:effectLst/>
-                          <a:latin typeface="Cambria Math" panose="02040503050406030204" pitchFamily="18" charset="0"/>
-                          <a:ea typeface="Calibri" panose="020F0502020204030204" pitchFamily="34" charset="0"/>
-                          <a:cs typeface="Calibri" panose="020F0502020204030204" pitchFamily="34" charset="0"/>
-                        </a:rPr>
-                        <m:t>𝑨𝒄𝒄𝒖𝒓𝒂𝒄𝒚</m:t>
-                      </m:r>
-                      <m:r>
-                        <a:rPr lang="en-US" sz="1600" b="1" i="1">
-                          <a:effectLst/>
-                          <a:latin typeface="Cambria Math" panose="02040503050406030204" pitchFamily="18" charset="0"/>
-                          <a:ea typeface="Calibri" panose="020F0502020204030204" pitchFamily="34" charset="0"/>
-                          <a:cs typeface="Calibri" panose="020F0502020204030204" pitchFamily="34" charset="0"/>
-                        </a:rPr>
-                        <m:t>=</m:t>
-                      </m:r>
-                      <m:f>
-                        <m:fPr>
-                          <m:ctrlPr>
-                            <a:rPr lang="en-US" sz="1600" i="1">
-                              <a:effectLst/>
-                              <a:latin typeface="Cambria Math" panose="02040503050406030204" pitchFamily="18" charset="0"/>
-                              <a:ea typeface="Calibri" panose="020F0502020204030204" pitchFamily="34" charset="0"/>
-                              <a:cs typeface="Calibri" panose="020F0502020204030204" pitchFamily="34" charset="0"/>
-                            </a:rPr>
-                          </m:ctrlPr>
-                        </m:fPr>
-                        <m:num>
-                          <m:r>
-                            <a:rPr lang="en-US" sz="1600" i="1">
-                              <a:effectLst/>
-                              <a:latin typeface="Cambria Math" panose="02040503050406030204" pitchFamily="18" charset="0"/>
-                              <a:ea typeface="Calibri" panose="020F0502020204030204" pitchFamily="34" charset="0"/>
-                              <a:cs typeface="Calibri" panose="020F0502020204030204" pitchFamily="34" charset="0"/>
-                            </a:rPr>
-                            <m:t>𝑇𝑁</m:t>
-                          </m:r>
-                          <m:r>
-                            <a:rPr lang="en-US" sz="1600" i="1">
-                              <a:effectLst/>
-                              <a:latin typeface="Cambria Math" panose="02040503050406030204" pitchFamily="18" charset="0"/>
-                              <a:ea typeface="Calibri" panose="020F0502020204030204" pitchFamily="34" charset="0"/>
-                              <a:cs typeface="Calibri" panose="020F0502020204030204" pitchFamily="34" charset="0"/>
-                            </a:rPr>
-                            <m:t>+</m:t>
-                          </m:r>
-                          <m:r>
-                            <a:rPr lang="en-US" sz="1600" i="1">
-                              <a:effectLst/>
-                              <a:latin typeface="Cambria Math" panose="02040503050406030204" pitchFamily="18" charset="0"/>
-                              <a:ea typeface="Calibri" panose="020F0502020204030204" pitchFamily="34" charset="0"/>
-                              <a:cs typeface="Calibri" panose="020F0502020204030204" pitchFamily="34" charset="0"/>
-                            </a:rPr>
-                            <m:t>𝑇𝑃</m:t>
-                          </m:r>
-                        </m:num>
-                        <m:den>
-                          <m:r>
-                            <a:rPr lang="en-US" sz="1600" i="1">
-                              <a:effectLst/>
-                              <a:latin typeface="Cambria Math" panose="02040503050406030204" pitchFamily="18" charset="0"/>
-                              <a:ea typeface="Calibri" panose="020F0502020204030204" pitchFamily="34" charset="0"/>
-                              <a:cs typeface="Calibri" panose="020F0502020204030204" pitchFamily="34" charset="0"/>
-                            </a:rPr>
-                            <m:t>𝑛</m:t>
-                          </m:r>
-                        </m:den>
-                      </m:f>
-                      <m:r>
-                        <a:rPr lang="en-US" sz="1600" b="0" i="1" smtClean="0">
-                          <a:effectLst/>
-                          <a:latin typeface="Cambria Math" panose="02040503050406030204" pitchFamily="18" charset="0"/>
-                          <a:ea typeface="Calibri" panose="020F0502020204030204" pitchFamily="34" charset="0"/>
-                          <a:cs typeface="Calibri" panose="020F0502020204030204" pitchFamily="34" charset="0"/>
-                        </a:rPr>
-                        <m:t>=1 →</m:t>
-                      </m:r>
-                      <m:r>
-                        <a:rPr lang="en-US" sz="1600" b="1" i="1" smtClean="0">
-                          <a:effectLst/>
-                          <a:latin typeface="Cambria Math" panose="02040503050406030204" pitchFamily="18" charset="0"/>
-                          <a:ea typeface="Calibri" panose="020F0502020204030204" pitchFamily="34" charset="0"/>
-                          <a:cs typeface="Calibri" panose="020F0502020204030204" pitchFamily="34" charset="0"/>
-                        </a:rPr>
-                        <m:t>𝑨𝒍𝒍</m:t>
-                      </m:r>
-                      <m:r>
-                        <a:rPr lang="en-US" sz="1600" b="1" i="1" smtClean="0">
-                          <a:effectLst/>
-                          <a:latin typeface="Cambria Math" panose="02040503050406030204" pitchFamily="18" charset="0"/>
-                          <a:ea typeface="Calibri" panose="020F0502020204030204" pitchFamily="34" charset="0"/>
-                          <a:cs typeface="Calibri" panose="020F0502020204030204" pitchFamily="34" charset="0"/>
-                        </a:rPr>
-                        <m:t> </m:t>
-                      </m:r>
-                      <m:r>
-                        <a:rPr lang="en-US" sz="1600" b="1" i="1" smtClean="0">
-                          <a:effectLst/>
-                          <a:latin typeface="Cambria Math" panose="02040503050406030204" pitchFamily="18" charset="0"/>
-                          <a:ea typeface="Calibri" panose="020F0502020204030204" pitchFamily="34" charset="0"/>
-                          <a:cs typeface="Calibri" panose="020F0502020204030204" pitchFamily="34" charset="0"/>
-                        </a:rPr>
-                        <m:t>𝒑𝒓𝒆𝒅𝒊𝒄𝒕𝒊𝒐𝒏𝒔</m:t>
-                      </m:r>
-                      <m:r>
-                        <a:rPr lang="en-US" sz="1600" b="1" i="1" smtClean="0">
-                          <a:effectLst/>
-                          <a:latin typeface="Cambria Math" panose="02040503050406030204" pitchFamily="18" charset="0"/>
-                          <a:ea typeface="Calibri" panose="020F0502020204030204" pitchFamily="34" charset="0"/>
-                          <a:cs typeface="Calibri" panose="020F0502020204030204" pitchFamily="34" charset="0"/>
-                        </a:rPr>
-                        <m:t> </m:t>
-                      </m:r>
-                      <m:r>
-                        <a:rPr lang="en-US" sz="1600" b="1" i="1" smtClean="0">
-                          <a:effectLst/>
-                          <a:latin typeface="Cambria Math" panose="02040503050406030204" pitchFamily="18" charset="0"/>
-                          <a:ea typeface="Calibri" panose="020F0502020204030204" pitchFamily="34" charset="0"/>
-                          <a:cs typeface="Calibri" panose="020F0502020204030204" pitchFamily="34" charset="0"/>
-                        </a:rPr>
-                        <m:t>𝒂𝒓𝒆</m:t>
-                      </m:r>
-                      <m:r>
-                        <a:rPr lang="en-US" sz="1600" b="1" i="1" smtClean="0">
-                          <a:effectLst/>
-                          <a:latin typeface="Cambria Math" panose="02040503050406030204" pitchFamily="18" charset="0"/>
-                          <a:ea typeface="Calibri" panose="020F0502020204030204" pitchFamily="34" charset="0"/>
-                          <a:cs typeface="Calibri" panose="020F0502020204030204" pitchFamily="34" charset="0"/>
-                        </a:rPr>
-                        <m:t> </m:t>
-                      </m:r>
-                      <m:r>
-                        <a:rPr lang="en-US" sz="1600" b="1" i="1" smtClean="0">
-                          <a:effectLst/>
-                          <a:latin typeface="Cambria Math" panose="02040503050406030204" pitchFamily="18" charset="0"/>
-                          <a:ea typeface="Calibri" panose="020F0502020204030204" pitchFamily="34" charset="0"/>
-                          <a:cs typeface="Calibri" panose="020F0502020204030204" pitchFamily="34" charset="0"/>
-                        </a:rPr>
-                        <m:t>𝒄𝒐𝒓𝒓𝒆𝒄𝒕</m:t>
-                      </m:r>
-                    </m:oMath>
-                  </m:oMathPara>
-                </a14:m>
-                <a:endParaRPr lang="en-US" sz="1600" b="1" dirty="0" smtClean="0">
-                  <a:effectLst/>
-                  <a:latin typeface="Calibri" panose="020F0502020204030204" pitchFamily="34" charset="0"/>
-                  <a:ea typeface="Calibri" panose="020F0502020204030204" pitchFamily="34" charset="0"/>
-                  <a:cs typeface="Times New Roman" panose="02020603050405020304" pitchFamily="18" charset="0"/>
-                </a:endParaRPr>
-              </a:p>
-              <a:p>
-                <a:pPr>
-                  <a:lnSpc>
-                    <a:spcPct val="107000"/>
-                  </a:lnSpc>
-                  <a:spcAft>
-                    <a:spcPts val="800"/>
-                  </a:spcAft>
-                </a:pPr>
-                <a14:m>
-                  <m:oMathPara xmlns:m="http://schemas.openxmlformats.org/officeDocument/2006/math">
-                    <m:oMathParaPr>
-                      <m:jc m:val="left"/>
-                    </m:oMathParaPr>
-                    <m:oMath xmlns:m="http://schemas.openxmlformats.org/officeDocument/2006/math">
-                      <m:r>
-                        <a:rPr lang="en-US" b="1" i="1">
-                          <a:latin typeface="Cambria Math" panose="02040503050406030204" pitchFamily="18" charset="0"/>
-                        </a:rPr>
-                        <m:t>𝑭</m:t>
-                      </m:r>
-                      <m:r>
-                        <a:rPr lang="en-US" b="1" i="1">
-                          <a:latin typeface="Cambria Math" panose="02040503050406030204" pitchFamily="18" charset="0"/>
-                        </a:rPr>
-                        <m:t>𝟏</m:t>
-                      </m:r>
-                      <m:r>
-                        <a:rPr lang="en-US">
-                          <a:latin typeface="Cambria Math" panose="02040503050406030204" pitchFamily="18" charset="0"/>
-                        </a:rPr>
-                        <m:t>= </m:t>
-                      </m:r>
-                      <m:f>
-                        <m:fPr>
-                          <m:ctrlPr>
-                            <a:rPr lang="en-US" i="1">
-                              <a:latin typeface="Cambria Math" panose="02040503050406030204" pitchFamily="18" charset="0"/>
-                            </a:rPr>
-                          </m:ctrlPr>
-                        </m:fPr>
-                        <m:num>
-                          <m:r>
-                            <a:rPr lang="en-US">
-                              <a:latin typeface="Cambria Math" panose="02040503050406030204" pitchFamily="18" charset="0"/>
-                            </a:rPr>
-                            <m:t>2</m:t>
-                          </m:r>
-                          <m:r>
-                            <a:rPr lang="en-US" i="1">
-                              <a:latin typeface="Cambria Math" panose="02040503050406030204" pitchFamily="18" charset="0"/>
-                            </a:rPr>
-                            <m:t>𝑇𝑃</m:t>
-                          </m:r>
-                        </m:num>
-                        <m:den>
-                          <m:r>
-                            <a:rPr lang="en-US">
-                              <a:latin typeface="Cambria Math" panose="02040503050406030204" pitchFamily="18" charset="0"/>
-                            </a:rPr>
-                            <m:t>2</m:t>
-                          </m:r>
-                          <m:r>
-                            <a:rPr lang="en-US" i="1">
-                              <a:latin typeface="Cambria Math" panose="02040503050406030204" pitchFamily="18" charset="0"/>
-                            </a:rPr>
-                            <m:t>𝑇𝑃</m:t>
-                          </m:r>
-                          <m:r>
-                            <a:rPr lang="en-US">
-                              <a:latin typeface="Cambria Math" panose="02040503050406030204" pitchFamily="18" charset="0"/>
-                            </a:rPr>
-                            <m:t>+</m:t>
-                          </m:r>
-                          <m:r>
-                            <a:rPr lang="en-US" i="1">
-                              <a:latin typeface="Cambria Math" panose="02040503050406030204" pitchFamily="18" charset="0"/>
-                            </a:rPr>
-                            <m:t>𝐹𝑃</m:t>
-                          </m:r>
-                          <m:r>
-                            <a:rPr lang="en-US">
-                              <a:latin typeface="Cambria Math" panose="02040503050406030204" pitchFamily="18" charset="0"/>
-                            </a:rPr>
-                            <m:t>+</m:t>
-                          </m:r>
-                          <m:r>
-                            <a:rPr lang="en-US" i="1">
-                              <a:latin typeface="Cambria Math" panose="02040503050406030204" pitchFamily="18" charset="0"/>
-                            </a:rPr>
-                            <m:t>𝐹𝑁</m:t>
-                          </m:r>
-                        </m:den>
-                      </m:f>
-                      <m:r>
-                        <a:rPr lang="en-US">
-                          <a:latin typeface="Cambria Math" panose="02040503050406030204" pitchFamily="18" charset="0"/>
-                        </a:rPr>
-                        <m:t>=→</m:t>
-                      </m:r>
-                      <m:r>
-                        <a:rPr lang="en-US" b="1">
-                          <a:latin typeface="Cambria Math" panose="02040503050406030204" pitchFamily="18" charset="0"/>
-                        </a:rPr>
-                        <m:t>𝐓𝐡𝐞𝐫𝐞</m:t>
-                      </m:r>
-                      <m:r>
-                        <a:rPr lang="en-US" b="1">
-                          <a:latin typeface="Cambria Math" panose="02040503050406030204" pitchFamily="18" charset="0"/>
-                        </a:rPr>
-                        <m:t> </m:t>
-                      </m:r>
-                      <m:r>
-                        <a:rPr lang="en-US" b="1">
-                          <a:latin typeface="Cambria Math" panose="02040503050406030204" pitchFamily="18" charset="0"/>
-                        </a:rPr>
-                        <m:t>𝐰𝐞𝐫𝐞</m:t>
-                      </m:r>
-                      <m:r>
-                        <a:rPr lang="en-US" b="1">
-                          <a:latin typeface="Cambria Math" panose="02040503050406030204" pitchFamily="18" charset="0"/>
-                        </a:rPr>
-                        <m:t> </m:t>
-                      </m:r>
-                      <m:r>
-                        <a:rPr lang="en-US" b="1">
-                          <a:latin typeface="Cambria Math" panose="02040503050406030204" pitchFamily="18" charset="0"/>
-                        </a:rPr>
-                        <m:t>𝐧𝐨</m:t>
-                      </m:r>
-                      <m:r>
-                        <a:rPr lang="en-US" b="1">
-                          <a:latin typeface="Cambria Math" panose="02040503050406030204" pitchFamily="18" charset="0"/>
-                        </a:rPr>
-                        <m:t> </m:t>
-                      </m:r>
-                      <m:r>
-                        <a:rPr lang="en-US" b="1">
-                          <a:latin typeface="Cambria Math" panose="02040503050406030204" pitchFamily="18" charset="0"/>
-                        </a:rPr>
-                        <m:t>𝐟𝐚𝐥𝐬𝐞</m:t>
-                      </m:r>
-                      <m:r>
-                        <a:rPr lang="en-US" b="1">
-                          <a:latin typeface="Cambria Math" panose="02040503050406030204" pitchFamily="18" charset="0"/>
-                        </a:rPr>
-                        <m:t> </m:t>
-                      </m:r>
-                      <m:r>
-                        <a:rPr lang="en-US" b="1">
-                          <a:latin typeface="Cambria Math" panose="02040503050406030204" pitchFamily="18" charset="0"/>
-                        </a:rPr>
-                        <m:t>𝐩𝐨𝐬𝐢𝐭𝐢𝐯𝐞𝐬</m:t>
-                      </m:r>
-                      <m:r>
-                        <a:rPr lang="en-US" b="1">
-                          <a:latin typeface="Cambria Math" panose="02040503050406030204" pitchFamily="18" charset="0"/>
-                        </a:rPr>
-                        <m:t> </m:t>
-                      </m:r>
-                      <m:r>
-                        <a:rPr lang="en-US" b="1">
-                          <a:latin typeface="Cambria Math" panose="02040503050406030204" pitchFamily="18" charset="0"/>
-                        </a:rPr>
-                        <m:t>𝐨𝐫</m:t>
-                      </m:r>
-                      <m:r>
-                        <a:rPr lang="en-US" b="1">
-                          <a:latin typeface="Cambria Math" panose="02040503050406030204" pitchFamily="18" charset="0"/>
-                        </a:rPr>
-                        <m:t> </m:t>
-                      </m:r>
-                      <m:r>
-                        <a:rPr lang="en-US" b="1">
-                          <a:latin typeface="Cambria Math" panose="02040503050406030204" pitchFamily="18" charset="0"/>
-                        </a:rPr>
-                        <m:t>𝐟𝐚𝐥𝐬𝐞</m:t>
-                      </m:r>
-                      <m:r>
-                        <a:rPr lang="en-US" b="1">
-                          <a:latin typeface="Cambria Math" panose="02040503050406030204" pitchFamily="18" charset="0"/>
-                        </a:rPr>
-                        <m:t> </m:t>
-                      </m:r>
-                      <m:r>
-                        <a:rPr lang="en-US" b="1">
-                          <a:latin typeface="Cambria Math" panose="02040503050406030204" pitchFamily="18" charset="0"/>
-                        </a:rPr>
-                        <m:t>𝐧𝐞𝐠𝐚𝐭𝐢𝐯𝐞𝐬</m:t>
-                      </m:r>
-                    </m:oMath>
-                  </m:oMathPara>
-                </a14:m>
-                <a:endParaRPr lang="en-US" b="1" dirty="0"/>
-              </a:p>
-              <a:p>
-                <a:pPr>
-                  <a:lnSpc>
-                    <a:spcPct val="107000"/>
-                  </a:lnSpc>
-                  <a:spcAft>
-                    <a:spcPts val="800"/>
-                  </a:spcAft>
-                </a:pPr>
-                <a:r>
-                  <a:rPr lang="en-US" b="1" dirty="0" smtClean="0"/>
-                  <a:t> AUC = 1 -&gt; The model is classifying perfectly</a:t>
-                </a:r>
-                <a:endParaRPr lang="en-US" dirty="0"/>
-              </a:p>
-              <a:p>
-                <a:pPr>
-                  <a:lnSpc>
-                    <a:spcPct val="107000"/>
-                  </a:lnSpc>
-                  <a:spcAft>
-                    <a:spcPts val="800"/>
-                  </a:spcAft>
-                </a:pPr>
-                <a:endParaRPr lang="en-US" sz="1600" dirty="0">
-                  <a:effectLst/>
-                  <a:latin typeface="Calibri" panose="020F0502020204030204" pitchFamily="34" charset="0"/>
-                  <a:ea typeface="Calibri" panose="020F0502020204030204" pitchFamily="34" charset="0"/>
-                  <a:cs typeface="Times New Roman" panose="02020603050405020304" pitchFamily="18" charset="0"/>
-                </a:endParaRPr>
-              </a:p>
-            </p:txBody>
-          </p:sp>
-        </mc:Choice>
-        <mc:Fallback xmlns="">
-          <p:sp>
-            <p:nvSpPr>
-              <p:cNvPr id="7" name="Rectangle 6"/>
-              <p:cNvSpPr>
-                <a:spLocks noRot="1" noChangeAspect="1" noMove="1" noResize="1" noEditPoints="1" noAdjustHandles="1" noChangeArrowheads="1" noChangeShapeType="1" noTextEdit="1"/>
-              </p:cNvSpPr>
-              <p:nvPr/>
-            </p:nvSpPr>
-            <p:spPr>
-              <a:xfrm>
-                <a:off x="5013278" y="3348887"/>
-                <a:ext cx="7178722" cy="3388235"/>
-              </a:xfrm>
-              <a:prstGeom prst="rect">
-                <a:avLst/>
-              </a:prstGeom>
-              <a:blipFill>
-                <a:blip r:embed="rId3"/>
-                <a:stretch>
-                  <a:fillRect/>
-                </a:stretch>
-              </a:blipFill>
-            </p:spPr>
-            <p:txBody>
-              <a:bodyPr/>
-              <a:lstStyle/>
-              <a:p>
-                <a:r>
-                  <a:rPr lang="en-US">
-                    <a:noFill/>
-                  </a:rPr>
-                  <a:t> </a:t>
-                </a:r>
-              </a:p>
-            </p:txBody>
-          </p:sp>
-        </mc:Fallback>
-      </mc:AlternateContent>
     </p:spTree>
     <p:extLst>
       <p:ext uri="{BB962C8B-B14F-4D97-AF65-F5344CB8AC3E}">
-        <p14:creationId xmlns:p14="http://schemas.microsoft.com/office/powerpoint/2010/main" val="133941773"/>
+        <p14:creationId xmlns:p14="http://schemas.microsoft.com/office/powerpoint/2010/main" val="3493314751"/>
       </p:ext>
     </p:extLst>
   </p:cSld>
@@ -7108,7 +6855,7 @@
           <a:p>
             <a:r>
               <a:rPr lang="en-US" dirty="0" smtClean="0"/>
-              <a:t>Conclusions	</a:t>
+              <a:t>SVM Performance</a:t>
             </a:r>
             <a:endParaRPr lang="en-US" dirty="0"/>
           </a:p>
@@ -7124,20 +6871,839 @@
             <p:ph idx="1"/>
           </p:nvPr>
         </p:nvSpPr>
-        <p:spPr/>
+        <p:spPr>
+          <a:xfrm>
+            <a:off x="838200" y="1488740"/>
+            <a:ext cx="11353800" cy="4351338"/>
+          </a:xfrm>
+        </p:spPr>
         <p:txBody>
           <a:bodyPr/>
           <a:lstStyle/>
           <a:p>
             <a:r>
+              <a:rPr lang="en-US" i="1" dirty="0" err="1" smtClean="0"/>
+              <a:t>Assesssed</a:t>
+            </a:r>
+            <a:r>
+              <a:rPr lang="en-US" i="1" dirty="0" smtClean="0"/>
+              <a:t> using </a:t>
+            </a:r>
+            <a:r>
+              <a:rPr lang="en-US" i="1" dirty="0" smtClean="0"/>
+              <a:t>the F1-score, Sensitivity, Specificity, and Accuracy</a:t>
+            </a:r>
+            <a:endParaRPr lang="en-US" i="1" dirty="0"/>
+          </a:p>
+          <a:p>
+            <a:r>
+              <a:rPr lang="en-US" i="1" dirty="0" smtClean="0"/>
+              <a:t>Training data was </a:t>
+            </a:r>
+            <a:r>
+              <a:rPr lang="en-US" i="1" dirty="0" smtClean="0"/>
+              <a:t>60%, Testing was 20%, </a:t>
+            </a:r>
+            <a:r>
+              <a:rPr lang="en-US" i="1" dirty="0" smtClean="0"/>
+              <a:t>and Validation data was </a:t>
+            </a:r>
+            <a:r>
+              <a:rPr lang="en-US" i="1" dirty="0" smtClean="0"/>
+              <a:t>20</a:t>
+            </a:r>
+            <a:r>
+              <a:rPr lang="en-US" i="1" dirty="0" smtClean="0"/>
+              <a:t>%</a:t>
+            </a:r>
+            <a:endParaRPr lang="en-US" dirty="0"/>
+          </a:p>
+          <a:p>
+            <a:pPr lvl="1"/>
+            <a:endParaRPr lang="en-US" dirty="0"/>
+          </a:p>
+        </p:txBody>
+      </p:sp>
+      <mc:AlternateContent xmlns:mc="http://schemas.openxmlformats.org/markup-compatibility/2006">
+        <mc:Choice xmlns:a14="http://schemas.microsoft.com/office/drawing/2010/main" Requires="a14">
+          <p:sp>
+            <p:nvSpPr>
+              <p:cNvPr id="8" name="Rectangle 7"/>
+              <p:cNvSpPr/>
+              <p:nvPr/>
+            </p:nvSpPr>
+            <p:spPr>
+              <a:xfrm>
+                <a:off x="132347" y="5279686"/>
+                <a:ext cx="11747358" cy="2009589"/>
+              </a:xfrm>
+              <a:prstGeom prst="rect">
+                <a:avLst/>
+              </a:prstGeom>
+            </p:spPr>
+            <p:txBody>
+              <a:bodyPr wrap="square">
+                <a:spAutoFit/>
+              </a:bodyPr>
+              <a:lstStyle/>
+              <a:p>
+                <a:pPr algn="ctr">
+                  <a:lnSpc>
+                    <a:spcPct val="107000"/>
+                  </a:lnSpc>
+                  <a:spcAft>
+                    <a:spcPts val="800"/>
+                  </a:spcAft>
+                </a:pPr>
+                <a14:m>
+                  <m:oMathPara xmlns:m="http://schemas.openxmlformats.org/officeDocument/2006/math">
+                    <m:oMathParaPr>
+                      <m:jc m:val="center"/>
+                    </m:oMathParaPr>
+                    <m:oMath xmlns:m="http://schemas.openxmlformats.org/officeDocument/2006/math">
+                      <m:r>
+                        <a:rPr lang="en-US" sz="1400" b="1" i="1" smtClean="0">
+                          <a:latin typeface="Cambria Math" panose="02040503050406030204" pitchFamily="18" charset="0"/>
+                          <a:ea typeface="Calibri" panose="020F0502020204030204" pitchFamily="34" charset="0"/>
+                          <a:cs typeface="Calibri" panose="020F0502020204030204" pitchFamily="34" charset="0"/>
+                        </a:rPr>
+                        <m:t>𝑺𝒆𝒏𝒔𝒊𝒕𝒊𝒗𝒊𝒕𝒚</m:t>
+                      </m:r>
+                      <m:r>
+                        <a:rPr lang="en-US" sz="1400" b="0" i="0" smtClean="0">
+                          <a:latin typeface="Cambria Math" panose="02040503050406030204" pitchFamily="18" charset="0"/>
+                          <a:ea typeface="Calibri" panose="020F0502020204030204" pitchFamily="34" charset="0"/>
+                          <a:cs typeface="Calibri" panose="020F0502020204030204" pitchFamily="34" charset="0"/>
+                        </a:rPr>
+                        <m:t>=</m:t>
+                      </m:r>
+                      <m:r>
+                        <a:rPr lang="en-US" sz="1400" b="1" i="1" smtClean="0">
+                          <a:latin typeface="Cambria Math" panose="02040503050406030204" pitchFamily="18" charset="0"/>
+                        </a:rPr>
+                        <m:t>𝟏</m:t>
+                      </m:r>
+                      <m:r>
+                        <a:rPr lang="en-US" sz="1400" b="1" i="1" smtClean="0">
+                          <a:latin typeface="Cambria Math" panose="02040503050406030204" pitchFamily="18" charset="0"/>
+                          <a:ea typeface="Calibri" panose="020F0502020204030204" pitchFamily="34" charset="0"/>
+                          <a:cs typeface="Calibri" panose="020F0502020204030204" pitchFamily="34" charset="0"/>
+                        </a:rPr>
+                        <m:t> →</m:t>
+                      </m:r>
+                      <m:r>
+                        <a:rPr lang="en-US" sz="1400" b="1" i="1" smtClean="0">
+                          <a:latin typeface="Cambria Math" panose="02040503050406030204" pitchFamily="18" charset="0"/>
+                          <a:ea typeface="Calibri" panose="020F0502020204030204" pitchFamily="34" charset="0"/>
+                          <a:cs typeface="Calibri" panose="020F0502020204030204" pitchFamily="34" charset="0"/>
+                        </a:rPr>
+                        <m:t>𝑨𝒍𝒍</m:t>
+                      </m:r>
+                      <m:r>
+                        <a:rPr lang="en-US" sz="1400" b="1" i="1" smtClean="0">
+                          <a:latin typeface="Cambria Math" panose="02040503050406030204" pitchFamily="18" charset="0"/>
+                          <a:ea typeface="Calibri" panose="020F0502020204030204" pitchFamily="34" charset="0"/>
+                          <a:cs typeface="Calibri" panose="020F0502020204030204" pitchFamily="34" charset="0"/>
+                        </a:rPr>
+                        <m:t> </m:t>
+                      </m:r>
+                      <m:r>
+                        <a:rPr lang="en-US" sz="1400" b="1" i="1">
+                          <a:latin typeface="Cambria Math" panose="02040503050406030204" pitchFamily="18" charset="0"/>
+                          <a:ea typeface="Calibri" panose="020F0502020204030204" pitchFamily="34" charset="0"/>
+                          <a:cs typeface="Calibri" panose="020F0502020204030204" pitchFamily="34" charset="0"/>
+                        </a:rPr>
+                        <m:t>𝒑𝒓𝒆𝒅𝒊𝒄𝒕𝒆𝒅</m:t>
+                      </m:r>
+                      <m:r>
+                        <a:rPr lang="en-US" sz="1400" b="1" i="1">
+                          <a:latin typeface="Cambria Math" panose="02040503050406030204" pitchFamily="18" charset="0"/>
+                          <a:ea typeface="Calibri" panose="020F0502020204030204" pitchFamily="34" charset="0"/>
+                          <a:cs typeface="Calibri" panose="020F0502020204030204" pitchFamily="34" charset="0"/>
+                        </a:rPr>
+                        <m:t> </m:t>
+                      </m:r>
+                      <m:r>
+                        <a:rPr lang="en-US" sz="1400" b="1" i="1">
+                          <a:latin typeface="Cambria Math" panose="02040503050406030204" pitchFamily="18" charset="0"/>
+                          <a:ea typeface="Calibri" panose="020F0502020204030204" pitchFamily="34" charset="0"/>
+                          <a:cs typeface="Calibri" panose="020F0502020204030204" pitchFamily="34" charset="0"/>
+                        </a:rPr>
+                        <m:t>𝒑𝒐𝒔𝒊𝒕𝒊𝒗𝒆</m:t>
+                      </m:r>
+                      <m:r>
+                        <a:rPr lang="en-US" sz="1400" b="1" i="1">
+                          <a:latin typeface="Cambria Math" panose="02040503050406030204" pitchFamily="18" charset="0"/>
+                          <a:ea typeface="Calibri" panose="020F0502020204030204" pitchFamily="34" charset="0"/>
+                          <a:cs typeface="Calibri" panose="020F0502020204030204" pitchFamily="34" charset="0"/>
+                        </a:rPr>
+                        <m:t> </m:t>
+                      </m:r>
+                      <m:r>
+                        <a:rPr lang="en-US" sz="1400" b="1" i="1">
+                          <a:latin typeface="Cambria Math" panose="02040503050406030204" pitchFamily="18" charset="0"/>
+                          <a:ea typeface="Calibri" panose="020F0502020204030204" pitchFamily="34" charset="0"/>
+                          <a:cs typeface="Calibri" panose="020F0502020204030204" pitchFamily="34" charset="0"/>
+                        </a:rPr>
+                        <m:t>𝒂𝒓𝒆</m:t>
+                      </m:r>
+                      <m:r>
+                        <a:rPr lang="en-US" sz="1400" b="1" i="1">
+                          <a:latin typeface="Cambria Math" panose="02040503050406030204" pitchFamily="18" charset="0"/>
+                          <a:ea typeface="Calibri" panose="020F0502020204030204" pitchFamily="34" charset="0"/>
+                          <a:cs typeface="Calibri" panose="020F0502020204030204" pitchFamily="34" charset="0"/>
+                        </a:rPr>
+                        <m:t> </m:t>
+                      </m:r>
+                      <m:r>
+                        <a:rPr lang="en-US" sz="1400" b="1" i="1">
+                          <a:latin typeface="Cambria Math" panose="02040503050406030204" pitchFamily="18" charset="0"/>
+                          <a:ea typeface="Calibri" panose="020F0502020204030204" pitchFamily="34" charset="0"/>
+                          <a:cs typeface="Calibri" panose="020F0502020204030204" pitchFamily="34" charset="0"/>
+                        </a:rPr>
+                        <m:t>𝒕𝒓𝒖𝒍𝒚</m:t>
+                      </m:r>
+                      <m:r>
+                        <a:rPr lang="en-US" sz="1400" b="1" i="1">
+                          <a:latin typeface="Cambria Math" panose="02040503050406030204" pitchFamily="18" charset="0"/>
+                          <a:ea typeface="Calibri" panose="020F0502020204030204" pitchFamily="34" charset="0"/>
+                          <a:cs typeface="Calibri" panose="020F0502020204030204" pitchFamily="34" charset="0"/>
+                        </a:rPr>
+                        <m:t> </m:t>
+                      </m:r>
+                      <m:r>
+                        <a:rPr lang="en-US" sz="1400" b="1" i="1">
+                          <a:latin typeface="Cambria Math" panose="02040503050406030204" pitchFamily="18" charset="0"/>
+                          <a:ea typeface="Calibri" panose="020F0502020204030204" pitchFamily="34" charset="0"/>
+                          <a:cs typeface="Calibri" panose="020F0502020204030204" pitchFamily="34" charset="0"/>
+                        </a:rPr>
+                        <m:t>𝒑𝒐𝒔𝒊𝒕𝒊𝒗𝒆</m:t>
+                      </m:r>
+                    </m:oMath>
+                  </m:oMathPara>
+                </a14:m>
+                <a:endParaRPr lang="en-US" sz="1400" b="1" i="1" dirty="0">
+                  <a:latin typeface="Cambria Math" panose="02040503050406030204" pitchFamily="18" charset="0"/>
+                  <a:ea typeface="Calibri" panose="020F0502020204030204" pitchFamily="34" charset="0"/>
+                  <a:cs typeface="Calibri" panose="020F0502020204030204" pitchFamily="34" charset="0"/>
+                </a:endParaRPr>
+              </a:p>
+              <a:p>
+                <a:pPr algn="ctr">
+                  <a:lnSpc>
+                    <a:spcPct val="107000"/>
+                  </a:lnSpc>
+                  <a:spcAft>
+                    <a:spcPts val="800"/>
+                  </a:spcAft>
+                </a:pPr>
+                <a14:m>
+                  <m:oMath xmlns:m="http://schemas.openxmlformats.org/officeDocument/2006/math">
+                    <m:r>
+                      <a:rPr lang="en-US" sz="1400" b="1" i="1">
+                        <a:latin typeface="Cambria Math" panose="02040503050406030204" pitchFamily="18" charset="0"/>
+                        <a:ea typeface="Calibri" panose="020F0502020204030204" pitchFamily="34" charset="0"/>
+                        <a:cs typeface="Calibri" panose="020F0502020204030204" pitchFamily="34" charset="0"/>
+                      </a:rPr>
+                      <m:t>𝑺𝒑𝒆𝒄𝒊𝒇𝒊𝒄𝒊𝒕𝒚</m:t>
+                    </m:r>
+                    <m:r>
+                      <a:rPr lang="en-US" sz="1400" i="1">
+                        <a:latin typeface="Cambria Math" panose="02040503050406030204" pitchFamily="18" charset="0"/>
+                        <a:ea typeface="Calibri" panose="020F0502020204030204" pitchFamily="34" charset="0"/>
+                        <a:cs typeface="Calibri" panose="020F0502020204030204" pitchFamily="34" charset="0"/>
+                      </a:rPr>
+                      <m:t>=</m:t>
+                    </m:r>
+                    <m:r>
+                      <a:rPr lang="en-US" sz="1400" b="0" i="1" smtClean="0">
+                        <a:latin typeface="Cambria Math" panose="02040503050406030204" pitchFamily="18" charset="0"/>
+                        <a:ea typeface="Calibri" panose="020F0502020204030204" pitchFamily="34" charset="0"/>
+                        <a:cs typeface="Calibri" panose="020F0502020204030204" pitchFamily="34" charset="0"/>
+                      </a:rPr>
+                      <m:t>1</m:t>
+                    </m:r>
+                  </m:oMath>
+                </a14:m>
+                <a:r>
+                  <a:rPr lang="en-US" sz="1400" dirty="0" smtClean="0">
+                    <a:effectLst/>
+                    <a:latin typeface="Calibri" panose="020F0502020204030204" pitchFamily="34" charset="0"/>
+                    <a:ea typeface="Calibri" panose="020F0502020204030204" pitchFamily="34" charset="0"/>
+                    <a:cs typeface="Times New Roman" panose="02020603050405020304" pitchFamily="18" charset="0"/>
+                  </a:rPr>
+                  <a:t> </a:t>
+                </a:r>
+                <a14:m>
+                  <m:oMath xmlns:m="http://schemas.openxmlformats.org/officeDocument/2006/math">
+                    <m:r>
+                      <a:rPr lang="en-US" sz="1400" b="1" i="1">
+                        <a:latin typeface="Cambria Math" panose="02040503050406030204" pitchFamily="18" charset="0"/>
+                        <a:ea typeface="Calibri" panose="020F0502020204030204" pitchFamily="34" charset="0"/>
+                        <a:cs typeface="Calibri" panose="020F0502020204030204" pitchFamily="34" charset="0"/>
+                      </a:rPr>
+                      <m:t>→</m:t>
+                    </m:r>
+                    <m:r>
+                      <a:rPr lang="en-US" sz="1400" b="1" i="1">
+                        <a:latin typeface="Cambria Math" panose="02040503050406030204" pitchFamily="18" charset="0"/>
+                        <a:ea typeface="Calibri" panose="020F0502020204030204" pitchFamily="34" charset="0"/>
+                        <a:cs typeface="Calibri" panose="020F0502020204030204" pitchFamily="34" charset="0"/>
+                      </a:rPr>
+                      <m:t>𝑨𝒍𝒍</m:t>
+                    </m:r>
+                    <m:r>
+                      <a:rPr lang="en-US" sz="1400" b="1" i="1">
+                        <a:latin typeface="Cambria Math" panose="02040503050406030204" pitchFamily="18" charset="0"/>
+                        <a:ea typeface="Calibri" panose="020F0502020204030204" pitchFamily="34" charset="0"/>
+                        <a:cs typeface="Calibri" panose="020F0502020204030204" pitchFamily="34" charset="0"/>
+                      </a:rPr>
+                      <m:t> </m:t>
+                    </m:r>
+                    <m:r>
+                      <a:rPr lang="en-US" sz="1400" b="1" i="1">
+                        <a:latin typeface="Cambria Math" panose="02040503050406030204" pitchFamily="18" charset="0"/>
+                        <a:ea typeface="Calibri" panose="020F0502020204030204" pitchFamily="34" charset="0"/>
+                        <a:cs typeface="Calibri" panose="020F0502020204030204" pitchFamily="34" charset="0"/>
+                      </a:rPr>
+                      <m:t>𝒑𝒓𝒆𝒅𝒊𝒄𝒕𝒆𝒅</m:t>
+                    </m:r>
+                    <m:r>
+                      <a:rPr lang="en-US" sz="1400" b="1" i="1" smtClean="0">
+                        <a:latin typeface="Cambria Math" panose="02040503050406030204" pitchFamily="18" charset="0"/>
+                        <a:ea typeface="Calibri" panose="020F0502020204030204" pitchFamily="34" charset="0"/>
+                        <a:cs typeface="Calibri" panose="020F0502020204030204" pitchFamily="34" charset="0"/>
+                      </a:rPr>
+                      <m:t> </m:t>
+                    </m:r>
+                    <m:r>
+                      <a:rPr lang="en-US" sz="1400" b="1" i="1" smtClean="0">
+                        <a:latin typeface="Cambria Math" panose="02040503050406030204" pitchFamily="18" charset="0"/>
+                        <a:ea typeface="Calibri" panose="020F0502020204030204" pitchFamily="34" charset="0"/>
+                        <a:cs typeface="Calibri" panose="020F0502020204030204" pitchFamily="34" charset="0"/>
+                      </a:rPr>
+                      <m:t>𝒏𝒆𝒈𝒂𝒕𝒊𝒗𝒆</m:t>
+                    </m:r>
+                    <m:r>
+                      <a:rPr lang="en-US" sz="1400" b="1" i="1" smtClean="0">
+                        <a:latin typeface="Cambria Math" panose="02040503050406030204" pitchFamily="18" charset="0"/>
+                        <a:ea typeface="Calibri" panose="020F0502020204030204" pitchFamily="34" charset="0"/>
+                        <a:cs typeface="Calibri" panose="020F0502020204030204" pitchFamily="34" charset="0"/>
+                      </a:rPr>
+                      <m:t> </m:t>
+                    </m:r>
+                    <m:r>
+                      <a:rPr lang="en-US" sz="1400" b="1" i="1">
+                        <a:latin typeface="Cambria Math" panose="02040503050406030204" pitchFamily="18" charset="0"/>
+                        <a:ea typeface="Calibri" panose="020F0502020204030204" pitchFamily="34" charset="0"/>
+                        <a:cs typeface="Calibri" panose="020F0502020204030204" pitchFamily="34" charset="0"/>
+                      </a:rPr>
+                      <m:t>𝒂𝒓𝒆</m:t>
+                    </m:r>
+                    <m:r>
+                      <a:rPr lang="en-US" sz="1400" b="1" i="1">
+                        <a:latin typeface="Cambria Math" panose="02040503050406030204" pitchFamily="18" charset="0"/>
+                        <a:ea typeface="Calibri" panose="020F0502020204030204" pitchFamily="34" charset="0"/>
+                        <a:cs typeface="Calibri" panose="020F0502020204030204" pitchFamily="34" charset="0"/>
+                      </a:rPr>
+                      <m:t> </m:t>
+                    </m:r>
+                    <m:r>
+                      <a:rPr lang="en-US" sz="1400" b="1" i="1">
+                        <a:latin typeface="Cambria Math" panose="02040503050406030204" pitchFamily="18" charset="0"/>
+                        <a:ea typeface="Calibri" panose="020F0502020204030204" pitchFamily="34" charset="0"/>
+                        <a:cs typeface="Calibri" panose="020F0502020204030204" pitchFamily="34" charset="0"/>
+                      </a:rPr>
+                      <m:t>𝒕𝒓𝒖𝒍𝒚</m:t>
+                    </m:r>
+                    <m:r>
+                      <a:rPr lang="en-US" sz="1400" b="1" i="1">
+                        <a:latin typeface="Cambria Math" panose="02040503050406030204" pitchFamily="18" charset="0"/>
+                        <a:ea typeface="Calibri" panose="020F0502020204030204" pitchFamily="34" charset="0"/>
+                        <a:cs typeface="Calibri" panose="020F0502020204030204" pitchFamily="34" charset="0"/>
+                      </a:rPr>
+                      <m:t> </m:t>
+                    </m:r>
+                    <m:r>
+                      <a:rPr lang="en-US" sz="1400" b="1" i="1" smtClean="0">
+                        <a:latin typeface="Cambria Math" panose="02040503050406030204" pitchFamily="18" charset="0"/>
+                        <a:ea typeface="Calibri" panose="020F0502020204030204" pitchFamily="34" charset="0"/>
+                        <a:cs typeface="Calibri" panose="020F0502020204030204" pitchFamily="34" charset="0"/>
+                      </a:rPr>
+                      <m:t>𝒏𝒆𝒈𝒂</m:t>
+                    </m:r>
+                    <m:r>
+                      <a:rPr lang="en-US" sz="1400" b="1" i="1">
+                        <a:latin typeface="Cambria Math" panose="02040503050406030204" pitchFamily="18" charset="0"/>
+                        <a:ea typeface="Calibri" panose="020F0502020204030204" pitchFamily="34" charset="0"/>
+                        <a:cs typeface="Calibri" panose="020F0502020204030204" pitchFamily="34" charset="0"/>
+                      </a:rPr>
+                      <m:t>𝒕𝒊𝒗𝒆</m:t>
+                    </m:r>
+                  </m:oMath>
+                </a14:m>
+                <a:endParaRPr lang="en-US" sz="1400" dirty="0" smtClean="0">
+                  <a:effectLst/>
+                  <a:latin typeface="Calibri" panose="020F0502020204030204" pitchFamily="34" charset="0"/>
+                  <a:ea typeface="Calibri" panose="020F0502020204030204" pitchFamily="34" charset="0"/>
+                  <a:cs typeface="Times New Roman" panose="02020603050405020304" pitchFamily="18" charset="0"/>
+                </a:endParaRPr>
+              </a:p>
+              <a:p>
+                <a:pPr algn="ctr">
+                  <a:lnSpc>
+                    <a:spcPct val="107000"/>
+                  </a:lnSpc>
+                  <a:spcAft>
+                    <a:spcPts val="800"/>
+                  </a:spcAft>
+                </a:pPr>
+                <a14:m>
+                  <m:oMathPara xmlns:m="http://schemas.openxmlformats.org/officeDocument/2006/math">
+                    <m:oMathParaPr>
+                      <m:jc m:val="center"/>
+                    </m:oMathParaPr>
+                    <m:oMath xmlns:m="http://schemas.openxmlformats.org/officeDocument/2006/math">
+                      <m:r>
+                        <a:rPr lang="en-US" sz="1400" b="1" i="1">
+                          <a:effectLst/>
+                          <a:latin typeface="Cambria Math" panose="02040503050406030204" pitchFamily="18" charset="0"/>
+                          <a:ea typeface="Calibri" panose="020F0502020204030204" pitchFamily="34" charset="0"/>
+                          <a:cs typeface="Calibri" panose="020F0502020204030204" pitchFamily="34" charset="0"/>
+                        </a:rPr>
+                        <m:t>𝑨𝒄𝒄𝒖𝒓𝒂𝒄</m:t>
+                      </m:r>
+                      <m:r>
+                        <a:rPr lang="en-US" sz="1400" b="0" i="1" smtClean="0">
+                          <a:effectLst/>
+                          <a:latin typeface="Cambria Math" panose="02040503050406030204" pitchFamily="18" charset="0"/>
+                          <a:ea typeface="Calibri" panose="020F0502020204030204" pitchFamily="34" charset="0"/>
+                          <a:cs typeface="Calibri" panose="020F0502020204030204" pitchFamily="34" charset="0"/>
+                        </a:rPr>
+                        <m:t>𝑦</m:t>
+                      </m:r>
+                      <m:r>
+                        <a:rPr lang="en-US" sz="1400" b="0" i="1" smtClean="0">
+                          <a:effectLst/>
+                          <a:latin typeface="Cambria Math" panose="02040503050406030204" pitchFamily="18" charset="0"/>
+                          <a:ea typeface="Calibri" panose="020F0502020204030204" pitchFamily="34" charset="0"/>
+                          <a:cs typeface="Calibri" panose="020F0502020204030204" pitchFamily="34" charset="0"/>
+                        </a:rPr>
+                        <m:t>=1→</m:t>
+                      </m:r>
+                      <m:r>
+                        <a:rPr lang="en-US" sz="1400" b="1" i="1" smtClean="0">
+                          <a:effectLst/>
+                          <a:latin typeface="Cambria Math" panose="02040503050406030204" pitchFamily="18" charset="0"/>
+                          <a:ea typeface="Calibri" panose="020F0502020204030204" pitchFamily="34" charset="0"/>
+                          <a:cs typeface="Calibri" panose="020F0502020204030204" pitchFamily="34" charset="0"/>
+                        </a:rPr>
+                        <m:t>𝑨𝒍𝒍</m:t>
+                      </m:r>
+                      <m:r>
+                        <a:rPr lang="en-US" sz="1400" b="1" i="1" smtClean="0">
+                          <a:effectLst/>
+                          <a:latin typeface="Cambria Math" panose="02040503050406030204" pitchFamily="18" charset="0"/>
+                          <a:ea typeface="Calibri" panose="020F0502020204030204" pitchFamily="34" charset="0"/>
+                          <a:cs typeface="Calibri" panose="020F0502020204030204" pitchFamily="34" charset="0"/>
+                        </a:rPr>
+                        <m:t> </m:t>
+                      </m:r>
+                      <m:r>
+                        <a:rPr lang="en-US" sz="1400" b="1" i="1" smtClean="0">
+                          <a:effectLst/>
+                          <a:latin typeface="Cambria Math" panose="02040503050406030204" pitchFamily="18" charset="0"/>
+                          <a:ea typeface="Calibri" panose="020F0502020204030204" pitchFamily="34" charset="0"/>
+                          <a:cs typeface="Calibri" panose="020F0502020204030204" pitchFamily="34" charset="0"/>
+                        </a:rPr>
+                        <m:t>𝒑𝒓𝒆𝒅𝒊𝒄𝒕𝒊𝒐𝒏𝒔</m:t>
+                      </m:r>
+                      <m:r>
+                        <a:rPr lang="en-US" sz="1400" b="1" i="1" smtClean="0">
+                          <a:effectLst/>
+                          <a:latin typeface="Cambria Math" panose="02040503050406030204" pitchFamily="18" charset="0"/>
+                          <a:ea typeface="Calibri" panose="020F0502020204030204" pitchFamily="34" charset="0"/>
+                          <a:cs typeface="Calibri" panose="020F0502020204030204" pitchFamily="34" charset="0"/>
+                        </a:rPr>
+                        <m:t> </m:t>
+                      </m:r>
+                      <m:r>
+                        <a:rPr lang="en-US" sz="1400" b="1" i="1" smtClean="0">
+                          <a:effectLst/>
+                          <a:latin typeface="Cambria Math" panose="02040503050406030204" pitchFamily="18" charset="0"/>
+                          <a:ea typeface="Calibri" panose="020F0502020204030204" pitchFamily="34" charset="0"/>
+                          <a:cs typeface="Calibri" panose="020F0502020204030204" pitchFamily="34" charset="0"/>
+                        </a:rPr>
+                        <m:t>𝒂𝒓𝒆</m:t>
+                      </m:r>
+                      <m:r>
+                        <a:rPr lang="en-US" sz="1400" b="1" i="1" smtClean="0">
+                          <a:effectLst/>
+                          <a:latin typeface="Cambria Math" panose="02040503050406030204" pitchFamily="18" charset="0"/>
+                          <a:ea typeface="Calibri" panose="020F0502020204030204" pitchFamily="34" charset="0"/>
+                          <a:cs typeface="Calibri" panose="020F0502020204030204" pitchFamily="34" charset="0"/>
+                        </a:rPr>
+                        <m:t> </m:t>
+                      </m:r>
+                      <m:r>
+                        <a:rPr lang="en-US" sz="1400" b="1" i="1" smtClean="0">
+                          <a:effectLst/>
+                          <a:latin typeface="Cambria Math" panose="02040503050406030204" pitchFamily="18" charset="0"/>
+                          <a:ea typeface="Calibri" panose="020F0502020204030204" pitchFamily="34" charset="0"/>
+                          <a:cs typeface="Calibri" panose="020F0502020204030204" pitchFamily="34" charset="0"/>
+                        </a:rPr>
+                        <m:t>𝒄𝒐𝒓𝒓𝒆𝒄𝒕</m:t>
+                      </m:r>
+                    </m:oMath>
+                  </m:oMathPara>
+                </a14:m>
+                <a:endParaRPr lang="en-US" sz="1400" b="1" dirty="0" smtClean="0">
+                  <a:effectLst/>
+                  <a:latin typeface="Calibri" panose="020F0502020204030204" pitchFamily="34" charset="0"/>
+                  <a:ea typeface="Calibri" panose="020F0502020204030204" pitchFamily="34" charset="0"/>
+                  <a:cs typeface="Times New Roman" panose="02020603050405020304" pitchFamily="18" charset="0"/>
+                </a:endParaRPr>
+              </a:p>
+              <a:p>
+                <a:pPr algn="ctr">
+                  <a:lnSpc>
+                    <a:spcPct val="107000"/>
+                  </a:lnSpc>
+                  <a:spcAft>
+                    <a:spcPts val="800"/>
+                  </a:spcAft>
+                </a:pPr>
+                <a14:m>
+                  <m:oMathPara xmlns:m="http://schemas.openxmlformats.org/officeDocument/2006/math">
+                    <m:oMathParaPr>
+                      <m:jc m:val="center"/>
+                    </m:oMathParaPr>
+                    <m:oMath xmlns:m="http://schemas.openxmlformats.org/officeDocument/2006/math">
+                      <m:r>
+                        <a:rPr lang="en-US" sz="1400" b="1" i="1">
+                          <a:latin typeface="Cambria Math" panose="02040503050406030204" pitchFamily="18" charset="0"/>
+                        </a:rPr>
+                        <m:t>𝑭</m:t>
+                      </m:r>
+                      <m:r>
+                        <a:rPr lang="en-US" sz="1400" b="1" i="1">
+                          <a:latin typeface="Cambria Math" panose="02040503050406030204" pitchFamily="18" charset="0"/>
+                        </a:rPr>
+                        <m:t>𝟏</m:t>
+                      </m:r>
+                      <m:r>
+                        <a:rPr lang="en-US" sz="1400" b="0" i="0" smtClean="0">
+                          <a:latin typeface="Cambria Math" panose="02040503050406030204" pitchFamily="18" charset="0"/>
+                        </a:rPr>
+                        <m:t>=</m:t>
+                      </m:r>
+                      <m:r>
+                        <a:rPr lang="en-US" sz="1400" b="0" i="0" smtClean="0">
+                          <a:latin typeface="Cambria Math" panose="02040503050406030204" pitchFamily="18" charset="0"/>
+                        </a:rPr>
+                        <m:t>1</m:t>
+                      </m:r>
+                      <m:r>
+                        <a:rPr lang="en-US" sz="1400">
+                          <a:latin typeface="Cambria Math" panose="02040503050406030204" pitchFamily="18" charset="0"/>
+                        </a:rPr>
+                        <m:t>→</m:t>
+                      </m:r>
+                      <m:r>
+                        <a:rPr lang="en-US" sz="1400" b="1">
+                          <a:latin typeface="Cambria Math" panose="02040503050406030204" pitchFamily="18" charset="0"/>
+                        </a:rPr>
+                        <m:t>𝐓𝐡𝐞𝐫𝐞</m:t>
+                      </m:r>
+                      <m:r>
+                        <a:rPr lang="en-US" sz="1400" b="1">
+                          <a:latin typeface="Cambria Math" panose="02040503050406030204" pitchFamily="18" charset="0"/>
+                        </a:rPr>
+                        <m:t> </m:t>
+                      </m:r>
+                      <m:r>
+                        <a:rPr lang="en-US" sz="1400" b="1">
+                          <a:latin typeface="Cambria Math" panose="02040503050406030204" pitchFamily="18" charset="0"/>
+                        </a:rPr>
+                        <m:t>𝐰𝐞𝐫𝐞</m:t>
+                      </m:r>
+                      <m:r>
+                        <a:rPr lang="en-US" sz="1400" b="1">
+                          <a:latin typeface="Cambria Math" panose="02040503050406030204" pitchFamily="18" charset="0"/>
+                        </a:rPr>
+                        <m:t> </m:t>
+                      </m:r>
+                      <m:r>
+                        <a:rPr lang="en-US" sz="1400" b="1" i="1" smtClean="0">
+                          <a:latin typeface="Cambria Math" panose="02040503050406030204" pitchFamily="18" charset="0"/>
+                        </a:rPr>
+                        <m:t>𝒏𝒐</m:t>
+                      </m:r>
+                      <m:r>
+                        <a:rPr lang="en-US" sz="1400" b="1" i="1" smtClean="0">
+                          <a:latin typeface="Cambria Math" panose="02040503050406030204" pitchFamily="18" charset="0"/>
+                        </a:rPr>
+                        <m:t> </m:t>
+                      </m:r>
+                      <m:r>
+                        <a:rPr lang="en-US" sz="1400" b="1">
+                          <a:latin typeface="Cambria Math" panose="02040503050406030204" pitchFamily="18" charset="0"/>
+                        </a:rPr>
+                        <m:t>𝐟𝐚𝐥𝐬𝐞</m:t>
+                      </m:r>
+                      <m:r>
+                        <a:rPr lang="en-US" sz="1400" b="1">
+                          <a:latin typeface="Cambria Math" panose="02040503050406030204" pitchFamily="18" charset="0"/>
+                        </a:rPr>
+                        <m:t> </m:t>
+                      </m:r>
+                      <m:r>
+                        <a:rPr lang="en-US" sz="1400" b="1">
+                          <a:latin typeface="Cambria Math" panose="02040503050406030204" pitchFamily="18" charset="0"/>
+                        </a:rPr>
+                        <m:t>𝐩𝐨𝐬𝐢𝐭𝐢𝐯𝐞𝐬</m:t>
+                      </m:r>
+                      <m:r>
+                        <a:rPr lang="en-US" sz="1400" b="1">
+                          <a:latin typeface="Cambria Math" panose="02040503050406030204" pitchFamily="18" charset="0"/>
+                        </a:rPr>
+                        <m:t> </m:t>
+                      </m:r>
+                      <m:r>
+                        <a:rPr lang="en-US" sz="1400" b="1">
+                          <a:latin typeface="Cambria Math" panose="02040503050406030204" pitchFamily="18" charset="0"/>
+                        </a:rPr>
+                        <m:t>𝐨𝐫</m:t>
+                      </m:r>
+                      <m:r>
+                        <a:rPr lang="en-US" sz="1400" b="1">
+                          <a:latin typeface="Cambria Math" panose="02040503050406030204" pitchFamily="18" charset="0"/>
+                        </a:rPr>
+                        <m:t> </m:t>
+                      </m:r>
+                      <m:r>
+                        <a:rPr lang="en-US" sz="1400" b="1">
+                          <a:latin typeface="Cambria Math" panose="02040503050406030204" pitchFamily="18" charset="0"/>
+                        </a:rPr>
+                        <m:t>𝐟𝐚𝐥𝐬𝐞</m:t>
+                      </m:r>
+                      <m:r>
+                        <a:rPr lang="en-US" sz="1400" b="1">
+                          <a:latin typeface="Cambria Math" panose="02040503050406030204" pitchFamily="18" charset="0"/>
+                        </a:rPr>
+                        <m:t> </m:t>
+                      </m:r>
+                      <m:r>
+                        <a:rPr lang="en-US" sz="1400" b="1">
+                          <a:latin typeface="Cambria Math" panose="02040503050406030204" pitchFamily="18" charset="0"/>
+                        </a:rPr>
+                        <m:t>𝐧𝐞𝐠𝐚𝐭𝐢𝐯𝐞𝐬</m:t>
+                      </m:r>
+                    </m:oMath>
+                  </m:oMathPara>
+                </a14:m>
+                <a:endParaRPr lang="en-US" sz="1400" b="1" dirty="0"/>
+              </a:p>
+              <a:p>
+                <a:pPr algn="ctr">
+                  <a:lnSpc>
+                    <a:spcPct val="107000"/>
+                  </a:lnSpc>
+                  <a:spcAft>
+                    <a:spcPts val="800"/>
+                  </a:spcAft>
+                </a:pPr>
+                <a:r>
+                  <a:rPr lang="en-US" sz="1400" b="1" dirty="0" smtClean="0"/>
+                  <a:t> AUC </a:t>
+                </a:r>
+                <a:r>
+                  <a:rPr lang="en-US" sz="1400" b="1" dirty="0" smtClean="0"/>
+                  <a:t>&gt; 1-&gt; </a:t>
+                </a:r>
+                <a:r>
+                  <a:rPr lang="en-US" sz="1400" b="1" dirty="0" smtClean="0"/>
+                  <a:t>The model is </a:t>
+                </a:r>
+                <a:r>
+                  <a:rPr lang="en-US" sz="1400" b="1" dirty="0" smtClean="0"/>
+                  <a:t>classifying perfectly</a:t>
+                </a:r>
+                <a:endParaRPr lang="en-US" sz="1400" b="1" dirty="0" smtClean="0"/>
+              </a:p>
+              <a:p>
+                <a:pPr algn="ctr">
+                  <a:lnSpc>
+                    <a:spcPct val="107000"/>
+                  </a:lnSpc>
+                  <a:spcAft>
+                    <a:spcPts val="800"/>
+                  </a:spcAft>
+                </a:pPr>
+                <a:endParaRPr lang="en-US" sz="1600" dirty="0">
+                  <a:effectLst/>
+                  <a:latin typeface="Calibri" panose="020F0502020204030204" pitchFamily="34" charset="0"/>
+                  <a:ea typeface="Calibri" panose="020F0502020204030204" pitchFamily="34" charset="0"/>
+                  <a:cs typeface="Times New Roman" panose="02020603050405020304" pitchFamily="18" charset="0"/>
+                </a:endParaRPr>
+              </a:p>
+            </p:txBody>
+          </p:sp>
+        </mc:Choice>
+        <mc:Fallback>
+          <p:sp>
+            <p:nvSpPr>
+              <p:cNvPr id="8" name="Rectangle 7"/>
+              <p:cNvSpPr>
+                <a:spLocks noRot="1" noChangeAspect="1" noMove="1" noResize="1" noEditPoints="1" noAdjustHandles="1" noChangeArrowheads="1" noChangeShapeType="1" noTextEdit="1"/>
+              </p:cNvSpPr>
+              <p:nvPr/>
+            </p:nvSpPr>
+            <p:spPr>
+              <a:xfrm>
+                <a:off x="132347" y="5279686"/>
+                <a:ext cx="11747358" cy="2009589"/>
+              </a:xfrm>
+              <a:prstGeom prst="rect">
+                <a:avLst/>
+              </a:prstGeom>
+              <a:blipFill>
+                <a:blip r:embed="rId2"/>
+                <a:stretch>
+                  <a:fillRect/>
+                </a:stretch>
+              </a:blipFill>
+            </p:spPr>
+            <p:txBody>
+              <a:bodyPr/>
+              <a:lstStyle/>
+              <a:p>
+                <a:r>
+                  <a:rPr lang="en-US">
+                    <a:noFill/>
+                  </a:rPr>
+                  <a:t> </a:t>
+                </a:r>
+              </a:p>
+            </p:txBody>
+          </p:sp>
+        </mc:Fallback>
+      </mc:AlternateContent>
+      <p:pic>
+        <p:nvPicPr>
+          <p:cNvPr id="4" name="Picture 3"/>
+          <p:cNvPicPr>
+            <a:picLocks noChangeAspect="1"/>
+          </p:cNvPicPr>
+          <p:nvPr/>
+        </p:nvPicPr>
+        <p:blipFill rotWithShape="1">
+          <a:blip r:embed="rId3">
+            <a:extLst>
+              <a:ext uri="{28A0092B-C50C-407E-A947-70E740481C1C}">
+                <a14:useLocalDpi xmlns:a14="http://schemas.microsoft.com/office/drawing/2010/main" val="0"/>
+              </a:ext>
+            </a:extLst>
+          </a:blip>
+          <a:srcRect l="5495" t="9578" r="6275" b="3967"/>
+          <a:stretch/>
+        </p:blipFill>
+        <p:spPr>
+          <a:xfrm>
+            <a:off x="629587" y="2677878"/>
+            <a:ext cx="4069830" cy="2658619"/>
+          </a:xfrm>
+          <a:prstGeom prst="rect">
+            <a:avLst/>
+          </a:prstGeom>
+        </p:spPr>
+      </p:pic>
+      <p:pic>
+        <p:nvPicPr>
+          <p:cNvPr id="5" name="Picture 4"/>
+          <p:cNvPicPr>
+            <a:picLocks noChangeAspect="1"/>
+          </p:cNvPicPr>
+          <p:nvPr/>
+        </p:nvPicPr>
+        <p:blipFill rotWithShape="1">
+          <a:blip r:embed="rId3">
+            <a:extLst>
+              <a:ext uri="{28A0092B-C50C-407E-A947-70E740481C1C}">
+                <a14:useLocalDpi xmlns:a14="http://schemas.microsoft.com/office/drawing/2010/main" val="0"/>
+              </a:ext>
+            </a:extLst>
+          </a:blip>
+          <a:srcRect l="6920" t="9144" r="7444" b="6245"/>
+          <a:stretch/>
+        </p:blipFill>
+        <p:spPr>
+          <a:xfrm>
+            <a:off x="6498237" y="2663903"/>
+            <a:ext cx="3971176" cy="2615783"/>
+          </a:xfrm>
+          <a:prstGeom prst="rect">
+            <a:avLst/>
+          </a:prstGeom>
+        </p:spPr>
+      </p:pic>
+      <p:sp>
+        <p:nvSpPr>
+          <p:cNvPr id="9" name="TextBox 8"/>
+          <p:cNvSpPr txBox="1"/>
+          <p:nvPr/>
+        </p:nvSpPr>
+        <p:spPr>
+          <a:xfrm>
+            <a:off x="514291" y="2441381"/>
+            <a:ext cx="4300421" cy="369332"/>
+          </a:xfrm>
+          <a:prstGeom prst="rect">
+            <a:avLst/>
+          </a:prstGeom>
+          <a:noFill/>
+        </p:spPr>
+        <p:txBody>
+          <a:bodyPr wrap="square" rtlCol="0">
+            <a:spAutoFit/>
+          </a:bodyPr>
+          <a:lstStyle/>
+          <a:p>
+            <a:pPr algn="ctr"/>
+            <a:r>
               <a:rPr lang="en-US" dirty="0" smtClean="0"/>
-              <a:t>Since the subset of data used in this experiment has proven to be highly separable, distinguishing between the hole and no hole is a linear problem.</a:t>
-            </a:r>
-          </a:p>
-          <a:p>
+              <a:t>Validation</a:t>
+            </a:r>
+            <a:endParaRPr lang="en-US" dirty="0"/>
+          </a:p>
+        </p:txBody>
+      </p:sp>
+      <p:sp>
+        <p:nvSpPr>
+          <p:cNvPr id="10" name="TextBox 9"/>
+          <p:cNvSpPr txBox="1"/>
+          <p:nvPr/>
+        </p:nvSpPr>
+        <p:spPr>
+          <a:xfrm>
+            <a:off x="6389404" y="2441381"/>
+            <a:ext cx="4300421" cy="369332"/>
+          </a:xfrm>
+          <a:prstGeom prst="rect">
+            <a:avLst/>
+          </a:prstGeom>
+          <a:noFill/>
+        </p:spPr>
+        <p:txBody>
+          <a:bodyPr wrap="square" rtlCol="0">
+            <a:spAutoFit/>
+          </a:bodyPr>
+          <a:lstStyle/>
+          <a:p>
+            <a:pPr algn="ctr"/>
             <a:r>
               <a:rPr lang="en-US" dirty="0" smtClean="0"/>
-              <a:t>Since all models where able to perform a perfect classification, all models are a good selection for classification of this data and whichever is able to perform the classification using the least resources should be selected.</a:t>
+              <a:t>Testing</a:t>
             </a:r>
             <a:endParaRPr lang="en-US" dirty="0"/>
           </a:p>
@@ -7146,7 +7712,7 @@
     </p:spTree>
     <p:extLst>
       <p:ext uri="{BB962C8B-B14F-4D97-AF65-F5344CB8AC3E}">
-        <p14:creationId xmlns:p14="http://schemas.microsoft.com/office/powerpoint/2010/main" val="705933254"/>
+        <p14:creationId xmlns:p14="http://schemas.microsoft.com/office/powerpoint/2010/main" val="133941773"/>
       </p:ext>
     </p:extLst>
   </p:cSld>
@@ -7219,20 +7785,13 @@
             </a:pPr>
             <a:r>
               <a:rPr lang="en-US" dirty="0" smtClean="0"/>
-              <a:t>Brittney </a:t>
-            </a:r>
-            <a:r>
-              <a:rPr lang="en-US" dirty="0" err="1" smtClean="0"/>
-              <a:t>Jarreau</a:t>
+              <a:t>Brittney Jarreau - Dataset formation, Data Preprocessing, SVM, SVM </a:t>
             </a:r>
             <a:r>
               <a:rPr lang="en-US" dirty="0" smtClean="0"/>
-              <a:t> - Dataset formation, Data Preprocessing, </a:t>
-            </a:r>
-            <a:r>
-              <a:rPr lang="en-US" dirty="0" smtClean="0"/>
-              <a:t>SVM, SVM Analysis</a:t>
-            </a:r>
+              <a:t>Analysis</a:t>
+            </a:r>
+            <a:endParaRPr lang="en-US" dirty="0" smtClean="0"/>
           </a:p>
           <a:p>
             <a:pPr>
@@ -7242,11 +7801,7 @@
             </a:pPr>
             <a:r>
               <a:rPr lang="en-US" dirty="0" smtClean="0"/>
-              <a:t>Caleb Charpentier </a:t>
-            </a:r>
-            <a:r>
-              <a:rPr lang="en-US" dirty="0" smtClean="0"/>
-              <a:t>– Data Preprocessing refactor, Command line design, ANN, ANN Analysis</a:t>
+              <a:t>Caleb Charpentier – Data Preprocessing refactor, Command line design, ANN, ANN Analysis</a:t>
             </a:r>
           </a:p>
           <a:p>
@@ -7276,6 +7831,130 @@
     <p:extLst>
       <p:ext uri="{BB962C8B-B14F-4D97-AF65-F5344CB8AC3E}">
         <p14:creationId xmlns:p14="http://schemas.microsoft.com/office/powerpoint/2010/main" val="1188225704"/>
+      </p:ext>
+    </p:extLst>
+  </p:cSld>
+  <p:clrMapOvr>
+    <a:masterClrMapping/>
+  </p:clrMapOvr>
+</p:sld>
+</file>
+
+<file path=ppt/slides/slide20.xml><?xml version="1.0" encoding="utf-8"?>
+<p:sld xmlns:a="http://schemas.openxmlformats.org/drawingml/2006/main" xmlns:r="http://schemas.openxmlformats.org/officeDocument/2006/relationships" xmlns:p="http://schemas.openxmlformats.org/presentationml/2006/main">
+  <p:cSld>
+    <p:spTree>
+      <p:nvGrpSpPr>
+        <p:cNvPr id="1" name=""/>
+        <p:cNvGrpSpPr/>
+        <p:nvPr/>
+      </p:nvGrpSpPr>
+      <p:grpSpPr>
+        <a:xfrm>
+          <a:off x="0" y="0"/>
+          <a:ext cx="0" cy="0"/>
+          <a:chOff x="0" y="0"/>
+          <a:chExt cx="0" cy="0"/>
+        </a:xfrm>
+      </p:grpSpPr>
+      <p:sp>
+        <p:nvSpPr>
+          <p:cNvPr id="2" name="Title 1"/>
+          <p:cNvSpPr>
+            <a:spLocks noGrp="1"/>
+          </p:cNvSpPr>
+          <p:nvPr>
+            <p:ph type="title"/>
+          </p:nvPr>
+        </p:nvSpPr>
+        <p:spPr/>
+        <p:txBody>
+          <a:bodyPr/>
+          <a:lstStyle/>
+          <a:p>
+            <a:r>
+              <a:rPr lang="en-US" dirty="0" smtClean="0"/>
+              <a:t>Conclusions	</a:t>
+            </a:r>
+            <a:endParaRPr lang="en-US" dirty="0"/>
+          </a:p>
+        </p:txBody>
+      </p:sp>
+      <p:sp>
+        <p:nvSpPr>
+          <p:cNvPr id="3" name="Content Placeholder 2"/>
+          <p:cNvSpPr>
+            <a:spLocks noGrp="1"/>
+          </p:cNvSpPr>
+          <p:nvPr>
+            <p:ph idx="1"/>
+          </p:nvPr>
+        </p:nvSpPr>
+        <p:spPr/>
+        <p:txBody>
+          <a:bodyPr>
+            <a:normAutofit lnSpcReduction="10000"/>
+          </a:bodyPr>
+          <a:lstStyle/>
+          <a:p>
+            <a:r>
+              <a:rPr lang="en-US" dirty="0" smtClean="0"/>
+              <a:t>Since the subset of data used in this experiment has proven to be highly separable, distinguishing between the hole and no hole is a linear problem.</a:t>
+            </a:r>
+          </a:p>
+          <a:p>
+            <a:r>
+              <a:rPr lang="en-US" dirty="0" smtClean="0"/>
+              <a:t>All models </a:t>
+            </a:r>
+            <a:r>
+              <a:rPr lang="en-US" dirty="0" smtClean="0"/>
+              <a:t>where able to perform </a:t>
+            </a:r>
+            <a:r>
+              <a:rPr lang="en-US" dirty="0" smtClean="0"/>
+              <a:t>very well on this </a:t>
+            </a:r>
+            <a:r>
+              <a:rPr lang="en-US" dirty="0" smtClean="0"/>
+              <a:t>classification problem</a:t>
+            </a:r>
+          </a:p>
+          <a:p>
+            <a:r>
+              <a:rPr lang="en-US" dirty="0" smtClean="0"/>
+              <a:t>The performance of the SVM and DT</a:t>
+            </a:r>
+            <a:r>
+              <a:rPr lang="en-US" dirty="0" smtClean="0"/>
+              <a:t> </a:t>
+            </a:r>
+            <a:r>
+              <a:rPr lang="en-US" dirty="0" smtClean="0"/>
+              <a:t>models are a good selection for classification of this data </a:t>
+            </a:r>
+            <a:r>
+              <a:rPr lang="en-US" dirty="0" smtClean="0"/>
+              <a:t>because both perform perfectly on the test and validation data</a:t>
+            </a:r>
+          </a:p>
+          <a:p>
+            <a:r>
+              <a:rPr lang="en-US" dirty="0" smtClean="0"/>
+              <a:t>It is clear from the Decision Tree that the labels can be distinguished using only 2 attributes, this </a:t>
+            </a:r>
+            <a:r>
+              <a:rPr lang="en-US" dirty="0" smtClean="0"/>
+              <a:t>can be used in the future to reduce the dataset further</a:t>
+            </a:r>
+            <a:endParaRPr lang="en-US" dirty="0"/>
+          </a:p>
+        </p:txBody>
+      </p:sp>
+    </p:spTree>
+    <p:extLst>
+      <p:ext uri="{BB962C8B-B14F-4D97-AF65-F5344CB8AC3E}">
+        <p14:creationId xmlns:p14="http://schemas.microsoft.com/office/powerpoint/2010/main" val="705933254"/>
       </p:ext>
     </p:extLst>
   </p:cSld>

</xml_diff>

<commit_message>
change repo in slide
</commit_message>
<xml_diff>
--- a/Project (1).pptx
+++ b/Project (1).pptx
@@ -260,7 +260,7 @@
           <a:p>
             <a:fld id="{0EF72338-4246-47CB-95B5-D03CAD77A9D7}" type="datetimeFigureOut">
               <a:rPr lang="en-US" smtClean="0"/>
-              <a:t>5/4/2022</a:t>
+              <a:t>5/5/2022</a:t>
             </a:fld>
             <a:endParaRPr lang="en-US"/>
           </a:p>
@@ -428,7 +428,7 @@
           <a:p>
             <a:fld id="{0EF72338-4246-47CB-95B5-D03CAD77A9D7}" type="datetimeFigureOut">
               <a:rPr lang="en-US" smtClean="0"/>
-              <a:t>5/4/2022</a:t>
+              <a:t>5/5/2022</a:t>
             </a:fld>
             <a:endParaRPr lang="en-US"/>
           </a:p>
@@ -606,7 +606,7 @@
           <a:p>
             <a:fld id="{0EF72338-4246-47CB-95B5-D03CAD77A9D7}" type="datetimeFigureOut">
               <a:rPr lang="en-US" smtClean="0"/>
-              <a:t>5/4/2022</a:t>
+              <a:t>5/5/2022</a:t>
             </a:fld>
             <a:endParaRPr lang="en-US"/>
           </a:p>
@@ -774,7 +774,7 @@
           <a:p>
             <a:fld id="{0EF72338-4246-47CB-95B5-D03CAD77A9D7}" type="datetimeFigureOut">
               <a:rPr lang="en-US" smtClean="0"/>
-              <a:t>5/4/2022</a:t>
+              <a:t>5/5/2022</a:t>
             </a:fld>
             <a:endParaRPr lang="en-US"/>
           </a:p>
@@ -1019,7 +1019,7 @@
           <a:p>
             <a:fld id="{0EF72338-4246-47CB-95B5-D03CAD77A9D7}" type="datetimeFigureOut">
               <a:rPr lang="en-US" smtClean="0"/>
-              <a:t>5/4/2022</a:t>
+              <a:t>5/5/2022</a:t>
             </a:fld>
             <a:endParaRPr lang="en-US"/>
           </a:p>
@@ -1248,7 +1248,7 @@
           <a:p>
             <a:fld id="{0EF72338-4246-47CB-95B5-D03CAD77A9D7}" type="datetimeFigureOut">
               <a:rPr lang="en-US" smtClean="0"/>
-              <a:t>5/4/2022</a:t>
+              <a:t>5/5/2022</a:t>
             </a:fld>
             <a:endParaRPr lang="en-US"/>
           </a:p>
@@ -1612,7 +1612,7 @@
           <a:p>
             <a:fld id="{0EF72338-4246-47CB-95B5-D03CAD77A9D7}" type="datetimeFigureOut">
               <a:rPr lang="en-US" smtClean="0"/>
-              <a:t>5/4/2022</a:t>
+              <a:t>5/5/2022</a:t>
             </a:fld>
             <a:endParaRPr lang="en-US"/>
           </a:p>
@@ -1729,7 +1729,7 @@
           <a:p>
             <a:fld id="{0EF72338-4246-47CB-95B5-D03CAD77A9D7}" type="datetimeFigureOut">
               <a:rPr lang="en-US" smtClean="0"/>
-              <a:t>5/4/2022</a:t>
+              <a:t>5/5/2022</a:t>
             </a:fld>
             <a:endParaRPr lang="en-US"/>
           </a:p>
@@ -1824,7 +1824,7 @@
           <a:p>
             <a:fld id="{0EF72338-4246-47CB-95B5-D03CAD77A9D7}" type="datetimeFigureOut">
               <a:rPr lang="en-US" smtClean="0"/>
-              <a:t>5/4/2022</a:t>
+              <a:t>5/5/2022</a:t>
             </a:fld>
             <a:endParaRPr lang="en-US"/>
           </a:p>
@@ -2099,7 +2099,7 @@
           <a:p>
             <a:fld id="{0EF72338-4246-47CB-95B5-D03CAD77A9D7}" type="datetimeFigureOut">
               <a:rPr lang="en-US" smtClean="0"/>
-              <a:t>5/4/2022</a:t>
+              <a:t>5/5/2022</a:t>
             </a:fld>
             <a:endParaRPr lang="en-US"/>
           </a:p>
@@ -2351,7 +2351,7 @@
           <a:p>
             <a:fld id="{0EF72338-4246-47CB-95B5-D03CAD77A9D7}" type="datetimeFigureOut">
               <a:rPr lang="en-US" smtClean="0"/>
-              <a:t>5/4/2022</a:t>
+              <a:t>5/5/2022</a:t>
             </a:fld>
             <a:endParaRPr lang="en-US"/>
           </a:p>
@@ -2562,7 +2562,7 @@
           <a:p>
             <a:fld id="{0EF72338-4246-47CB-95B5-D03CAD77A9D7}" type="datetimeFigureOut">
               <a:rPr lang="en-US" smtClean="0"/>
-              <a:t>5/4/2022</a:t>
+              <a:t>5/5/2022</a:t>
             </a:fld>
             <a:endParaRPr lang="en-US"/>
           </a:p>
@@ -3107,20 +3107,11 @@
               <a:rPr lang="en-US" dirty="0" smtClean="0"/>
               <a:t>Run with entropy measure</a:t>
             </a:r>
-            <a:endParaRPr lang="en-US" dirty="0" smtClean="0"/>
           </a:p>
           <a:p>
             <a:r>
               <a:rPr lang="en-US" dirty="0" smtClean="0"/>
-              <a:t>Cutoff was </a:t>
-            </a:r>
-            <a:r>
-              <a:rPr lang="en-US" dirty="0" smtClean="0"/>
-              <a:t>5 </a:t>
-            </a:r>
-            <a:r>
-              <a:rPr lang="en-US" dirty="0" smtClean="0"/>
-              <a:t>levels</a:t>
+              <a:t>Cutoff was 5 levels</a:t>
             </a:r>
           </a:p>
           <a:p>
@@ -4976,11 +4967,7 @@
           <a:p>
             <a:r>
               <a:rPr lang="en-US" dirty="0" smtClean="0"/>
-              <a:t>ANN </a:t>
-            </a:r>
-            <a:r>
-              <a:rPr lang="en-US" dirty="0" smtClean="0"/>
-              <a:t>Training Curves</a:t>
+              <a:t>ANN Training Curves</a:t>
             </a:r>
             <a:endParaRPr lang="en-US" dirty="0"/>
           </a:p>
@@ -5155,11 +5142,7 @@
           <a:p>
             <a:r>
               <a:rPr lang="en-US" dirty="0" smtClean="0"/>
-              <a:t>ANN </a:t>
-            </a:r>
-            <a:r>
-              <a:rPr lang="en-US" dirty="0" smtClean="0"/>
-              <a:t>Training Curves</a:t>
+              <a:t>ANN Training Curves</a:t>
             </a:r>
             <a:endParaRPr lang="en-US" dirty="0"/>
           </a:p>
@@ -5187,11 +5170,7 @@
           <a:p>
             <a:r>
               <a:rPr lang="en-US" i="1" dirty="0" smtClean="0"/>
-              <a:t>This model was assessed using the F1-score, Sensitivity, Specificity, Accuracy, and the </a:t>
-            </a:r>
-            <a:r>
-              <a:rPr lang="en-US" i="1" dirty="0" smtClean="0"/>
-              <a:t>ROC</a:t>
+              <a:t>This model was assessed using the F1-score, Sensitivity, Specificity, Accuracy, and the ROC</a:t>
             </a:r>
             <a:r>
               <a:rPr lang="en-US" dirty="0"/>
@@ -5267,8 +5246,8 @@
           </a:p>
         </p:txBody>
       </p:sp>
-      <mc:AlternateContent xmlns:mc="http://schemas.openxmlformats.org/markup-compatibility/2006">
-        <mc:Choice xmlns:a14="http://schemas.microsoft.com/office/drawing/2010/main" Requires="a14">
+      <mc:AlternateContent xmlns:mc="http://schemas.openxmlformats.org/markup-compatibility/2006" xmlns:a14="http://schemas.microsoft.com/office/drawing/2010/main">
+        <mc:Choice Requires="a14">
           <p:sp>
             <p:nvSpPr>
               <p:cNvPr id="11" name="Rectangle 10"/>
@@ -5889,21 +5868,8 @@
                 </a:pPr>
                 <a:r>
                   <a:rPr lang="en-US" sz="1400" b="1" dirty="0" smtClean="0"/>
-                  <a:t> AUC </a:t>
+                  <a:t> AUC &gt; 0.96 -&gt; The model is classifying very well</a:t>
                 </a:r>
-                <a:r>
-                  <a:rPr lang="en-US" sz="1400" b="1" dirty="0" smtClean="0"/>
-                  <a:t>&gt; 0.96 -&gt; </a:t>
-                </a:r>
-                <a:r>
-                  <a:rPr lang="en-US" sz="1400" b="1" dirty="0" smtClean="0"/>
-                  <a:t>The model is </a:t>
-                </a:r>
-                <a:r>
-                  <a:rPr lang="en-US" sz="1400" b="1" dirty="0" smtClean="0"/>
-                  <a:t>classifying very well</a:t>
-                </a:r>
-                <a:endParaRPr lang="en-US" sz="1400" b="1" dirty="0" smtClean="0"/>
               </a:p>
               <a:p>
                 <a:pPr>
@@ -5924,7 +5890,7 @@
             </p:txBody>
           </p:sp>
         </mc:Choice>
-        <mc:Fallback>
+        <mc:Fallback xmlns="">
           <p:sp>
             <p:nvSpPr>
               <p:cNvPr id="11" name="Rectangle 10"/>
@@ -5963,8 +5929,8 @@
           </p:sp>
         </mc:Fallback>
       </mc:AlternateContent>
-      <mc:AlternateContent xmlns:mc="http://schemas.openxmlformats.org/markup-compatibility/2006">
-        <mc:Choice xmlns:a14="http://schemas.microsoft.com/office/drawing/2010/main" Requires="a14">
+      <mc:AlternateContent xmlns:mc="http://schemas.openxmlformats.org/markup-compatibility/2006" xmlns:a14="http://schemas.microsoft.com/office/drawing/2010/main">
+        <mc:Choice Requires="a14">
           <p:sp>
             <p:nvSpPr>
               <p:cNvPr id="16" name="Rectangle 15"/>
@@ -6434,13 +6400,7 @@
                         <a:rPr lang="en-US" sz="1400" b="0" i="0" smtClean="0">
                           <a:latin typeface="Cambria Math" panose="02040503050406030204" pitchFamily="18" charset="0"/>
                         </a:rPr>
-                        <m:t>=</m:t>
-                      </m:r>
-                      <m:r>
-                        <a:rPr lang="en-US" sz="1400" b="0" i="0" smtClean="0">
-                          <a:latin typeface="Cambria Math" panose="02040503050406030204" pitchFamily="18" charset="0"/>
-                        </a:rPr>
-                        <m:t>1</m:t>
+                        <m:t>=1</m:t>
                       </m:r>
                       <m:r>
                         <a:rPr lang="en-US" sz="1400">
@@ -6554,21 +6514,8 @@
                 </a:pPr>
                 <a:r>
                   <a:rPr lang="en-US" sz="1400" b="1" dirty="0" smtClean="0"/>
-                  <a:t> AUC </a:t>
+                  <a:t> AUC &gt; 1-&gt; The model is classifying perfectly</a:t>
                 </a:r>
-                <a:r>
-                  <a:rPr lang="en-US" sz="1400" b="1" dirty="0" smtClean="0"/>
-                  <a:t>&gt; 1-&gt; </a:t>
-                </a:r>
-                <a:r>
-                  <a:rPr lang="en-US" sz="1400" b="1" dirty="0" smtClean="0"/>
-                  <a:t>The model is </a:t>
-                </a:r>
-                <a:r>
-                  <a:rPr lang="en-US" sz="1400" b="1" dirty="0" smtClean="0"/>
-                  <a:t>classifying perfectly</a:t>
-                </a:r>
-                <a:endParaRPr lang="en-US" sz="1400" b="1" dirty="0" smtClean="0"/>
               </a:p>
               <a:p>
                 <a:pPr algn="ctr">
@@ -6589,7 +6536,7 @@
             </p:txBody>
           </p:sp>
         </mc:Choice>
-        <mc:Fallback>
+        <mc:Fallback xmlns="">
           <p:sp>
             <p:nvSpPr>
               <p:cNvPr id="16" name="Rectangle 15"/>
@@ -6729,50 +6676,13 @@
           <a:p>
             <a:r>
               <a:rPr lang="en-US" dirty="0" smtClean="0"/>
-              <a:t>The SVM used applies a linear </a:t>
-            </a:r>
+              <a:t>The SVM used applies a linear kernel and C=1</a:t>
+            </a:r>
+          </a:p>
+          <a:p>
             <a:r>
               <a:rPr lang="en-US" dirty="0" smtClean="0"/>
-              <a:t>kernel and C=1</a:t>
-            </a:r>
-            <a:endParaRPr lang="en-US" dirty="0" smtClean="0"/>
-          </a:p>
-          <a:p>
-            <a:r>
-              <a:rPr lang="en-US" dirty="0" smtClean="0"/>
-              <a:t>Data was split into </a:t>
-            </a:r>
-            <a:r>
-              <a:rPr lang="en-US" dirty="0" smtClean="0"/>
-              <a:t>60</a:t>
-            </a:r>
-            <a:r>
-              <a:rPr lang="en-US" dirty="0" smtClean="0"/>
-              <a:t>% training </a:t>
-            </a:r>
-            <a:r>
-              <a:rPr lang="en-US" dirty="0" smtClean="0"/>
-              <a:t>data, 20% testing, </a:t>
-            </a:r>
-            <a:r>
-              <a:rPr lang="en-US" dirty="0" smtClean="0"/>
-              <a:t>and </a:t>
-            </a:r>
-            <a:r>
-              <a:rPr lang="en-US" dirty="0" smtClean="0"/>
-              <a:t>20</a:t>
-            </a:r>
-            <a:r>
-              <a:rPr lang="en-US" dirty="0" smtClean="0"/>
-              <a:t>% </a:t>
-            </a:r>
-            <a:r>
-              <a:rPr lang="en-US" dirty="0" smtClean="0"/>
-              <a:t>validation </a:t>
-            </a:r>
-            <a:r>
-              <a:rPr lang="en-US" dirty="0" smtClean="0"/>
-              <a:t>data</a:t>
+              <a:t>Data was split into 60% training data, 20% testing, and 20% validation data</a:t>
             </a:r>
             <a:endParaRPr lang="en-US" dirty="0"/>
           </a:p>
@@ -6887,34 +6797,14 @@
             </a:r>
             <a:r>
               <a:rPr lang="en-US" i="1" dirty="0" smtClean="0"/>
-              <a:t> using </a:t>
-            </a:r>
+              <a:t> using the F1-score, Sensitivity, Specificity, and Accuracy</a:t>
+            </a:r>
+            <a:endParaRPr lang="en-US" i="1" dirty="0"/>
+          </a:p>
+          <a:p>
             <a:r>
               <a:rPr lang="en-US" i="1" dirty="0" smtClean="0"/>
-              <a:t>the F1-score, Sensitivity, Specificity, and Accuracy</a:t>
-            </a:r>
-            <a:endParaRPr lang="en-US" i="1" dirty="0"/>
-          </a:p>
-          <a:p>
-            <a:r>
-              <a:rPr lang="en-US" i="1" dirty="0" smtClean="0"/>
-              <a:t>Training data was </a:t>
-            </a:r>
-            <a:r>
-              <a:rPr lang="en-US" i="1" dirty="0" smtClean="0"/>
-              <a:t>60%, Testing was 20%, </a:t>
-            </a:r>
-            <a:r>
-              <a:rPr lang="en-US" i="1" dirty="0" smtClean="0"/>
-              <a:t>and Validation data was </a:t>
-            </a:r>
-            <a:r>
-              <a:rPr lang="en-US" i="1" dirty="0" smtClean="0"/>
-              <a:t>20</a:t>
-            </a:r>
-            <a:r>
-              <a:rPr lang="en-US" i="1" dirty="0" smtClean="0"/>
-              <a:t>%</a:t>
+              <a:t>Training data was 60%, Testing was 20%, and Validation data was 20%</a:t>
             </a:r>
             <a:endParaRPr lang="en-US" dirty="0"/>
           </a:p>
@@ -6924,8 +6814,8 @@
           </a:p>
         </p:txBody>
       </p:sp>
-      <mc:AlternateContent xmlns:mc="http://schemas.openxmlformats.org/markup-compatibility/2006">
-        <mc:Choice xmlns:a14="http://schemas.microsoft.com/office/drawing/2010/main" Requires="a14">
+      <mc:AlternateContent xmlns:mc="http://schemas.openxmlformats.org/markup-compatibility/2006" xmlns:a14="http://schemas.microsoft.com/office/drawing/2010/main">
+        <mc:Choice Requires="a14">
           <p:sp>
             <p:nvSpPr>
               <p:cNvPr id="8" name="Rectangle 7"/>
@@ -7395,13 +7285,7 @@
                         <a:rPr lang="en-US" sz="1400" b="0" i="0" smtClean="0">
                           <a:latin typeface="Cambria Math" panose="02040503050406030204" pitchFamily="18" charset="0"/>
                         </a:rPr>
-                        <m:t>=</m:t>
-                      </m:r>
-                      <m:r>
-                        <a:rPr lang="en-US" sz="1400" b="0" i="0" smtClean="0">
-                          <a:latin typeface="Cambria Math" panose="02040503050406030204" pitchFamily="18" charset="0"/>
-                        </a:rPr>
-                        <m:t>1</m:t>
+                        <m:t>=1</m:t>
                       </m:r>
                       <m:r>
                         <a:rPr lang="en-US" sz="1400">
@@ -7515,21 +7399,8 @@
                 </a:pPr>
                 <a:r>
                   <a:rPr lang="en-US" sz="1400" b="1" dirty="0" smtClean="0"/>
-                  <a:t> AUC </a:t>
+                  <a:t> AUC &gt; 1-&gt; The model is classifying perfectly</a:t>
                 </a:r>
-                <a:r>
-                  <a:rPr lang="en-US" sz="1400" b="1" dirty="0" smtClean="0"/>
-                  <a:t>&gt; 1-&gt; </a:t>
-                </a:r>
-                <a:r>
-                  <a:rPr lang="en-US" sz="1400" b="1" dirty="0" smtClean="0"/>
-                  <a:t>The model is </a:t>
-                </a:r>
-                <a:r>
-                  <a:rPr lang="en-US" sz="1400" b="1" dirty="0" smtClean="0"/>
-                  <a:t>classifying perfectly</a:t>
-                </a:r>
-                <a:endParaRPr lang="en-US" sz="1400" b="1" dirty="0" smtClean="0"/>
               </a:p>
               <a:p>
                 <a:pPr algn="ctr">
@@ -7550,7 +7421,7 @@
             </p:txBody>
           </p:sp>
         </mc:Choice>
-        <mc:Fallback>
+        <mc:Fallback xmlns="">
           <p:sp>
             <p:nvSpPr>
               <p:cNvPr id="8" name="Rectangle 7"/>
@@ -7785,13 +7656,8 @@
             </a:pPr>
             <a:r>
               <a:rPr lang="en-US" dirty="0" smtClean="0"/>
-              <a:t>Brittney Jarreau - Dataset formation, Data Preprocessing, SVM, SVM </a:t>
-            </a:r>
-            <a:r>
-              <a:rPr lang="en-US" dirty="0" smtClean="0"/>
-              <a:t>Analysis</a:t>
-            </a:r>
-            <a:endParaRPr lang="en-US" dirty="0" smtClean="0"/>
+              <a:t>Brittney Jarreau - Dataset formation, Data Preprocessing, SVM, SVM Analysis</a:t>
+            </a:r>
           </a:p>
           <a:p>
             <a:pPr>
@@ -7905,47 +7771,19 @@
           <a:p>
             <a:r>
               <a:rPr lang="en-US" dirty="0" smtClean="0"/>
-              <a:t>All models </a:t>
-            </a:r>
+              <a:t>All models where able to perform very well on this classification problem</a:t>
+            </a:r>
+          </a:p>
+          <a:p>
             <a:r>
               <a:rPr lang="en-US" dirty="0" smtClean="0"/>
-              <a:t>where able to perform </a:t>
-            </a:r>
+              <a:t>The performance of the SVM and DT models are a good selection for classification of this data because both perform perfectly on the test and validation data</a:t>
+            </a:r>
+          </a:p>
+          <a:p>
             <a:r>
               <a:rPr lang="en-US" dirty="0" smtClean="0"/>
-              <a:t>very well on this </a:t>
-            </a:r>
-            <a:r>
-              <a:rPr lang="en-US" dirty="0" smtClean="0"/>
-              <a:t>classification problem</a:t>
-            </a:r>
-          </a:p>
-          <a:p>
-            <a:r>
-              <a:rPr lang="en-US" dirty="0" smtClean="0"/>
-              <a:t>The performance of the SVM and DT</a:t>
-            </a:r>
-            <a:r>
-              <a:rPr lang="en-US" dirty="0" smtClean="0"/>
-              <a:t> </a:t>
-            </a:r>
-            <a:r>
-              <a:rPr lang="en-US" dirty="0" smtClean="0"/>
-              <a:t>models are a good selection for classification of this data </a:t>
-            </a:r>
-            <a:r>
-              <a:rPr lang="en-US" dirty="0" smtClean="0"/>
-              <a:t>because both perform perfectly on the test and validation data</a:t>
-            </a:r>
-          </a:p>
-          <a:p>
-            <a:r>
-              <a:rPr lang="en-US" dirty="0" smtClean="0"/>
-              <a:t>It is clear from the Decision Tree that the labels can be distinguished using only 2 attributes, this </a:t>
-            </a:r>
-            <a:r>
-              <a:rPr lang="en-US" dirty="0" smtClean="0"/>
-              <a:t>can be used in the future to reduce the dataset further</a:t>
+              <a:t>It is clear from the Decision Tree that the labels can be distinguished using only 2 attributes, this can be used in the future to reduce the dataset further</a:t>
             </a:r>
             <a:endParaRPr lang="en-US" dirty="0"/>
           </a:p>
@@ -8126,7 +7964,7 @@
         <p:spPr>
           <a:xfrm>
             <a:off x="7029450" y="194409"/>
-            <a:ext cx="5286375" cy="1631216"/>
+            <a:ext cx="5286375" cy="1815882"/>
           </a:xfrm>
           <a:prstGeom prst="rect">
             <a:avLst/>
@@ -8161,16 +7999,24 @@
               </a:spcAft>
             </a:pPr>
             <a:r>
-              <a:rPr lang="en-US" sz="1200" b="1" u="sng" dirty="0">
-                <a:solidFill>
-                  <a:srgbClr val="1C3678"/>
-                </a:solidFill>
-                <a:latin typeface="Lato"/>
+              <a:rPr lang="en-US" sz="1200" dirty="0" err="1">
                 <a:hlinkClick r:id="rId2"/>
               </a:rPr>
-              <a:t>https://github.com/bjarreau/ML4MI/blob/main/Acoustic_Probing.csv</a:t>
-            </a:r>
-            <a:endParaRPr lang="en-US" sz="1200" dirty="0"/>
+              <a:t>bjarreau</a:t>
+            </a:r>
+            <a:r>
+              <a:rPr lang="en-US" sz="1200" dirty="0">
+                <a:hlinkClick r:id="rId2"/>
+              </a:rPr>
+              <a:t>/ML4MI: This is the project repository for Team B.C.'s class project. (github.com</a:t>
+            </a:r>
+            <a:r>
+              <a:rPr lang="en-US" sz="1200" dirty="0" smtClean="0">
+                <a:hlinkClick r:id="rId2"/>
+              </a:rPr>
+              <a:t>)</a:t>
+            </a:r>
+            <a:endParaRPr lang="en-US" sz="1200" dirty="0" smtClean="0"/>
           </a:p>
           <a:p>
             <a:pPr>
@@ -8185,25 +8031,7 @@
                 </a:solidFill>
                 <a:latin typeface="Lato"/>
               </a:rPr>
-              <a:t>Samples: 540                                                                   </a:t>
-            </a:r>
-            <a:r>
-              <a:rPr lang="en-US" sz="1200" b="1" dirty="0">
-                <a:solidFill>
-                  <a:srgbClr val="595959"/>
-                </a:solidFill>
-                <a:latin typeface="Lato"/>
-              </a:rPr>
-              <a:t>Attributes: </a:t>
-            </a:r>
-            <a:r>
-              <a:rPr lang="en-US" sz="1200" b="1" dirty="0" smtClean="0">
-                <a:solidFill>
-                  <a:srgbClr val="595959"/>
-                </a:solidFill>
-                <a:latin typeface="Lato"/>
-              </a:rPr>
-              <a:t>63</a:t>
+              <a:t>Samples: 540                                                                   Attributes: 63</a:t>
             </a:r>
           </a:p>
           <a:p>

</xml_diff>